<commit_message>
Update on Goals and Expected Contributions.
</commit_message>
<xml_diff>
--- a/Ap Prep Tese.pptx
+++ b/Ap Prep Tese.pptx
@@ -5282,8 +5282,8 @@
         </p:nvSpPr>
         <p:spPr>
           <a:xfrm>
-            <a:off x="317157" y="2392574"/>
-            <a:ext cx="8509686" cy="1200329"/>
+            <a:off x="469557" y="2400812"/>
+            <a:ext cx="6128951" cy="1200329"/>
           </a:xfrm>
           <a:prstGeom prst="rect">
             <a:avLst/>
@@ -5315,26 +5315,12 @@
               <a:buChar char="•"/>
             </a:pPr>
             <a:r>
-              <a:rPr lang="en-US" sz="2400" noProof="0" dirty="0">
-                <a:solidFill>
-                  <a:srgbClr val="002060"/>
-                </a:solidFill>
-              </a:rPr>
-              <a:t>Proof that two programs are equivalent</a:t>
-            </a:r>
-          </a:p>
-          <a:p>
-            <a:pPr marL="342900" indent="-342900">
-              <a:buFont typeface="Arial" panose="020B0604020202020204" pitchFamily="34" charset="0"/>
-              <a:buChar char="•"/>
-            </a:pPr>
-            <a:r>
               <a:rPr lang="en-US" sz="2400" dirty="0">
                 <a:solidFill>
                   <a:srgbClr val="002060"/>
                 </a:solidFill>
               </a:rPr>
-              <a:t>Facilitate the proof of the hardest through the simplest proof</a:t>
+              <a:t>Facilitate the proof of the hardest program by using the proof of the simplest one</a:t>
             </a:r>
             <a:endParaRPr lang="en-US" sz="2400" noProof="0" dirty="0">
               <a:solidFill>

</xml_diff>

<commit_message>
added slides of almost all of the background
</commit_message>
<xml_diff>
--- a/Ap Prep Tese.pptx
+++ b/Ap Prep Tese.pptx
@@ -4,6 +4,9 @@
   <p:sldMasterIdLst>
     <p:sldMasterId id="2147483672" r:id="rId1"/>
   </p:sldMasterIdLst>
+  <p:notesMasterIdLst>
+    <p:notesMasterId r:id="rId27"/>
+  </p:notesMasterIdLst>
   <p:sldIdLst>
     <p:sldId id="256" r:id="rId2"/>
     <p:sldId id="257" r:id="rId3"/>
@@ -13,21 +16,23 @@
     <p:sldId id="282" r:id="rId7"/>
     <p:sldId id="259" r:id="rId8"/>
     <p:sldId id="269" r:id="rId9"/>
-    <p:sldId id="270" r:id="rId10"/>
-    <p:sldId id="268" r:id="rId11"/>
-    <p:sldId id="271" r:id="rId12"/>
-    <p:sldId id="272" r:id="rId13"/>
-    <p:sldId id="273" r:id="rId14"/>
-    <p:sldId id="260" r:id="rId15"/>
-    <p:sldId id="274" r:id="rId16"/>
-    <p:sldId id="275" r:id="rId17"/>
-    <p:sldId id="276" r:id="rId18"/>
-    <p:sldId id="277" r:id="rId19"/>
-    <p:sldId id="261" r:id="rId20"/>
-    <p:sldId id="278" r:id="rId21"/>
-    <p:sldId id="279" r:id="rId22"/>
-    <p:sldId id="262" r:id="rId23"/>
-    <p:sldId id="263" r:id="rId24"/>
+    <p:sldId id="283" r:id="rId10"/>
+    <p:sldId id="270" r:id="rId11"/>
+    <p:sldId id="268" r:id="rId12"/>
+    <p:sldId id="271" r:id="rId13"/>
+    <p:sldId id="272" r:id="rId14"/>
+    <p:sldId id="284" r:id="rId15"/>
+    <p:sldId id="273" r:id="rId16"/>
+    <p:sldId id="260" r:id="rId17"/>
+    <p:sldId id="274" r:id="rId18"/>
+    <p:sldId id="275" r:id="rId19"/>
+    <p:sldId id="276" r:id="rId20"/>
+    <p:sldId id="277" r:id="rId21"/>
+    <p:sldId id="261" r:id="rId22"/>
+    <p:sldId id="278" r:id="rId23"/>
+    <p:sldId id="279" r:id="rId24"/>
+    <p:sldId id="262" r:id="rId25"/>
+    <p:sldId id="263" r:id="rId26"/>
   </p:sldIdLst>
   <p:sldSz cx="9144000" cy="5715000" type="screen16x10"/>
   <p:notesSz cx="6858000" cy="9144000"/>
@@ -134,6 +139,355 @@
 </p:presentation>
 </file>
 
+<file path=ppt/notesMasters/notesMaster1.xml><?xml version="1.0" encoding="utf-8"?>
+<p:notesMaster xmlns:a="http://schemas.openxmlformats.org/drawingml/2006/main" xmlns:r="http://schemas.openxmlformats.org/officeDocument/2006/relationships" xmlns:p="http://schemas.openxmlformats.org/presentationml/2006/main">
+  <p:cSld>
+    <p:bg>
+      <p:bgRef idx="1001">
+        <a:schemeClr val="bg1"/>
+      </p:bgRef>
+    </p:bg>
+    <p:spTree>
+      <p:nvGrpSpPr>
+        <p:cNvPr id="1" name=""/>
+        <p:cNvGrpSpPr/>
+        <p:nvPr/>
+      </p:nvGrpSpPr>
+      <p:grpSpPr>
+        <a:xfrm>
+          <a:off x="0" y="0"/>
+          <a:ext cx="0" cy="0"/>
+          <a:chOff x="0" y="0"/>
+          <a:chExt cx="0" cy="0"/>
+        </a:xfrm>
+      </p:grpSpPr>
+      <p:sp>
+        <p:nvSpPr>
+          <p:cNvPr id="2" name="Header Placeholder 1"/>
+          <p:cNvSpPr>
+            <a:spLocks noGrp="1"/>
+          </p:cNvSpPr>
+          <p:nvPr>
+            <p:ph type="hdr" sz="quarter"/>
+          </p:nvPr>
+        </p:nvSpPr>
+        <p:spPr>
+          <a:xfrm>
+            <a:off x="0" y="0"/>
+            <a:ext cx="2971800" cy="458788"/>
+          </a:xfrm>
+          <a:prstGeom prst="rect">
+            <a:avLst/>
+          </a:prstGeom>
+        </p:spPr>
+        <p:txBody>
+          <a:bodyPr vert="horz" lIns="91440" tIns="45720" rIns="91440" bIns="45720" rtlCol="0"/>
+          <a:lstStyle>
+            <a:lvl1pPr algn="l">
+              <a:defRPr sz="1200"/>
+            </a:lvl1pPr>
+          </a:lstStyle>
+          <a:p>
+            <a:endParaRPr lang="en-US"/>
+          </a:p>
+        </p:txBody>
+      </p:sp>
+      <p:sp>
+        <p:nvSpPr>
+          <p:cNvPr id="3" name="Date Placeholder 2"/>
+          <p:cNvSpPr>
+            <a:spLocks noGrp="1"/>
+          </p:cNvSpPr>
+          <p:nvPr>
+            <p:ph type="dt" idx="1"/>
+          </p:nvPr>
+        </p:nvSpPr>
+        <p:spPr>
+          <a:xfrm>
+            <a:off x="3884613" y="0"/>
+            <a:ext cx="2971800" cy="458788"/>
+          </a:xfrm>
+          <a:prstGeom prst="rect">
+            <a:avLst/>
+          </a:prstGeom>
+        </p:spPr>
+        <p:txBody>
+          <a:bodyPr vert="horz" lIns="91440" tIns="45720" rIns="91440" bIns="45720" rtlCol="0"/>
+          <a:lstStyle>
+            <a:lvl1pPr algn="r">
+              <a:defRPr sz="1200"/>
+            </a:lvl1pPr>
+          </a:lstStyle>
+          <a:p>
+            <a:fld id="{374D7271-F55A-4686-93D9-9528AEDA1906}" type="datetimeFigureOut">
+              <a:rPr lang="en-US" smtClean="0"/>
+              <a:t>2/15/2025</a:t>
+            </a:fld>
+            <a:endParaRPr lang="en-US"/>
+          </a:p>
+        </p:txBody>
+      </p:sp>
+      <p:sp>
+        <p:nvSpPr>
+          <p:cNvPr id="4" name="Slide Image Placeholder 3"/>
+          <p:cNvSpPr>
+            <a:spLocks noGrp="1" noRot="1" noChangeAspect="1"/>
+          </p:cNvSpPr>
+          <p:nvPr>
+            <p:ph type="sldImg" idx="2"/>
+          </p:nvPr>
+        </p:nvSpPr>
+        <p:spPr>
+          <a:xfrm>
+            <a:off x="960438" y="1143000"/>
+            <a:ext cx="4937125" cy="3086100"/>
+          </a:xfrm>
+          <a:prstGeom prst="rect">
+            <a:avLst/>
+          </a:prstGeom>
+          <a:noFill/>
+          <a:ln w="12700">
+            <a:solidFill>
+              <a:prstClr val="black"/>
+            </a:solidFill>
+          </a:ln>
+        </p:spPr>
+        <p:txBody>
+          <a:bodyPr vert="horz" lIns="91440" tIns="45720" rIns="91440" bIns="45720" rtlCol="0" anchor="ctr"/>
+          <a:lstStyle/>
+          <a:p>
+            <a:endParaRPr lang="en-US"/>
+          </a:p>
+        </p:txBody>
+      </p:sp>
+      <p:sp>
+        <p:nvSpPr>
+          <p:cNvPr id="5" name="Notes Placeholder 4"/>
+          <p:cNvSpPr>
+            <a:spLocks noGrp="1"/>
+          </p:cNvSpPr>
+          <p:nvPr>
+            <p:ph type="body" sz="quarter" idx="3"/>
+          </p:nvPr>
+        </p:nvSpPr>
+        <p:spPr>
+          <a:xfrm>
+            <a:off x="685800" y="4400550"/>
+            <a:ext cx="5486400" cy="3600450"/>
+          </a:xfrm>
+          <a:prstGeom prst="rect">
+            <a:avLst/>
+          </a:prstGeom>
+        </p:spPr>
+        <p:txBody>
+          <a:bodyPr vert="horz" lIns="91440" tIns="45720" rIns="91440" bIns="45720" rtlCol="0"/>
+          <a:lstStyle/>
+          <a:p>
+            <a:pPr lvl="0"/>
+            <a:r>
+              <a:rPr lang="en-US"/>
+              <a:t>Click to edit Master text styles</a:t>
+            </a:r>
+          </a:p>
+          <a:p>
+            <a:pPr lvl="1"/>
+            <a:r>
+              <a:rPr lang="en-US"/>
+              <a:t>Second level</a:t>
+            </a:r>
+          </a:p>
+          <a:p>
+            <a:pPr lvl="2"/>
+            <a:r>
+              <a:rPr lang="en-US"/>
+              <a:t>Third level</a:t>
+            </a:r>
+          </a:p>
+          <a:p>
+            <a:pPr lvl="3"/>
+            <a:r>
+              <a:rPr lang="en-US"/>
+              <a:t>Fourth level</a:t>
+            </a:r>
+          </a:p>
+          <a:p>
+            <a:pPr lvl="4"/>
+            <a:r>
+              <a:rPr lang="en-US"/>
+              <a:t>Fifth level</a:t>
+            </a:r>
+          </a:p>
+        </p:txBody>
+      </p:sp>
+      <p:sp>
+        <p:nvSpPr>
+          <p:cNvPr id="6" name="Footer Placeholder 5"/>
+          <p:cNvSpPr>
+            <a:spLocks noGrp="1"/>
+          </p:cNvSpPr>
+          <p:nvPr>
+            <p:ph type="ftr" sz="quarter" idx="4"/>
+          </p:nvPr>
+        </p:nvSpPr>
+        <p:spPr>
+          <a:xfrm>
+            <a:off x="0" y="8685213"/>
+            <a:ext cx="2971800" cy="458787"/>
+          </a:xfrm>
+          <a:prstGeom prst="rect">
+            <a:avLst/>
+          </a:prstGeom>
+        </p:spPr>
+        <p:txBody>
+          <a:bodyPr vert="horz" lIns="91440" tIns="45720" rIns="91440" bIns="45720" rtlCol="0" anchor="b"/>
+          <a:lstStyle>
+            <a:lvl1pPr algn="l">
+              <a:defRPr sz="1200"/>
+            </a:lvl1pPr>
+          </a:lstStyle>
+          <a:p>
+            <a:endParaRPr lang="en-US"/>
+          </a:p>
+        </p:txBody>
+      </p:sp>
+      <p:sp>
+        <p:nvSpPr>
+          <p:cNvPr id="7" name="Slide Number Placeholder 6"/>
+          <p:cNvSpPr>
+            <a:spLocks noGrp="1"/>
+          </p:cNvSpPr>
+          <p:nvPr>
+            <p:ph type="sldNum" sz="quarter" idx="5"/>
+          </p:nvPr>
+        </p:nvSpPr>
+        <p:spPr>
+          <a:xfrm>
+            <a:off x="3884613" y="8685213"/>
+            <a:ext cx="2971800" cy="458787"/>
+          </a:xfrm>
+          <a:prstGeom prst="rect">
+            <a:avLst/>
+          </a:prstGeom>
+        </p:spPr>
+        <p:txBody>
+          <a:bodyPr vert="horz" lIns="91440" tIns="45720" rIns="91440" bIns="45720" rtlCol="0" anchor="b"/>
+          <a:lstStyle>
+            <a:lvl1pPr algn="r">
+              <a:defRPr sz="1200"/>
+            </a:lvl1pPr>
+          </a:lstStyle>
+          <a:p>
+            <a:fld id="{0B3F2602-38FE-4418-A7EF-ADB22DAE42F9}" type="slidenum">
+              <a:rPr lang="en-US" smtClean="0"/>
+              <a:t>‹#›</a:t>
+            </a:fld>
+            <a:endParaRPr lang="en-US"/>
+          </a:p>
+        </p:txBody>
+      </p:sp>
+    </p:spTree>
+    <p:extLst>
+      <p:ext uri="{BB962C8B-B14F-4D97-AF65-F5344CB8AC3E}">
+        <p14:creationId xmlns:p14="http://schemas.microsoft.com/office/powerpoint/2010/main" val="955389934"/>
+      </p:ext>
+    </p:extLst>
+  </p:cSld>
+  <p:clrMap bg1="lt1" tx1="dk1" bg2="lt2" tx2="dk2" accent1="accent1" accent2="accent2" accent3="accent3" accent4="accent4" accent5="accent5" accent6="accent6" hlink="hlink" folHlink="folHlink"/>
+  <p:notesStyle>
+    <a:lvl1pPr marL="0" algn="l" defTabSz="914400" rtl="0" eaLnBrk="1" latinLnBrk="0" hangingPunct="1">
+      <a:defRPr sz="1200" kern="1200">
+        <a:solidFill>
+          <a:schemeClr val="tx1"/>
+        </a:solidFill>
+        <a:latin typeface="+mn-lt"/>
+        <a:ea typeface="+mn-ea"/>
+        <a:cs typeface="+mn-cs"/>
+      </a:defRPr>
+    </a:lvl1pPr>
+    <a:lvl2pPr marL="457200" algn="l" defTabSz="914400" rtl="0" eaLnBrk="1" latinLnBrk="0" hangingPunct="1">
+      <a:defRPr sz="1200" kern="1200">
+        <a:solidFill>
+          <a:schemeClr val="tx1"/>
+        </a:solidFill>
+        <a:latin typeface="+mn-lt"/>
+        <a:ea typeface="+mn-ea"/>
+        <a:cs typeface="+mn-cs"/>
+      </a:defRPr>
+    </a:lvl2pPr>
+    <a:lvl3pPr marL="914400" algn="l" defTabSz="914400" rtl="0" eaLnBrk="1" latinLnBrk="0" hangingPunct="1">
+      <a:defRPr sz="1200" kern="1200">
+        <a:solidFill>
+          <a:schemeClr val="tx1"/>
+        </a:solidFill>
+        <a:latin typeface="+mn-lt"/>
+        <a:ea typeface="+mn-ea"/>
+        <a:cs typeface="+mn-cs"/>
+      </a:defRPr>
+    </a:lvl3pPr>
+    <a:lvl4pPr marL="1371600" algn="l" defTabSz="914400" rtl="0" eaLnBrk="1" latinLnBrk="0" hangingPunct="1">
+      <a:defRPr sz="1200" kern="1200">
+        <a:solidFill>
+          <a:schemeClr val="tx1"/>
+        </a:solidFill>
+        <a:latin typeface="+mn-lt"/>
+        <a:ea typeface="+mn-ea"/>
+        <a:cs typeface="+mn-cs"/>
+      </a:defRPr>
+    </a:lvl4pPr>
+    <a:lvl5pPr marL="1828800" algn="l" defTabSz="914400" rtl="0" eaLnBrk="1" latinLnBrk="0" hangingPunct="1">
+      <a:defRPr sz="1200" kern="1200">
+        <a:solidFill>
+          <a:schemeClr val="tx1"/>
+        </a:solidFill>
+        <a:latin typeface="+mn-lt"/>
+        <a:ea typeface="+mn-ea"/>
+        <a:cs typeface="+mn-cs"/>
+      </a:defRPr>
+    </a:lvl5pPr>
+    <a:lvl6pPr marL="2286000" algn="l" defTabSz="914400" rtl="0" eaLnBrk="1" latinLnBrk="0" hangingPunct="1">
+      <a:defRPr sz="1200" kern="1200">
+        <a:solidFill>
+          <a:schemeClr val="tx1"/>
+        </a:solidFill>
+        <a:latin typeface="+mn-lt"/>
+        <a:ea typeface="+mn-ea"/>
+        <a:cs typeface="+mn-cs"/>
+      </a:defRPr>
+    </a:lvl6pPr>
+    <a:lvl7pPr marL="2743200" algn="l" defTabSz="914400" rtl="0" eaLnBrk="1" latinLnBrk="0" hangingPunct="1">
+      <a:defRPr sz="1200" kern="1200">
+        <a:solidFill>
+          <a:schemeClr val="tx1"/>
+        </a:solidFill>
+        <a:latin typeface="+mn-lt"/>
+        <a:ea typeface="+mn-ea"/>
+        <a:cs typeface="+mn-cs"/>
+      </a:defRPr>
+    </a:lvl7pPr>
+    <a:lvl8pPr marL="3200400" algn="l" defTabSz="914400" rtl="0" eaLnBrk="1" latinLnBrk="0" hangingPunct="1">
+      <a:defRPr sz="1200" kern="1200">
+        <a:solidFill>
+          <a:schemeClr val="tx1"/>
+        </a:solidFill>
+        <a:latin typeface="+mn-lt"/>
+        <a:ea typeface="+mn-ea"/>
+        <a:cs typeface="+mn-cs"/>
+      </a:defRPr>
+    </a:lvl8pPr>
+    <a:lvl9pPr marL="3657600" algn="l" defTabSz="914400" rtl="0" eaLnBrk="1" latinLnBrk="0" hangingPunct="1">
+      <a:defRPr sz="1200" kern="1200">
+        <a:solidFill>
+          <a:schemeClr val="tx1"/>
+        </a:solidFill>
+        <a:latin typeface="+mn-lt"/>
+        <a:ea typeface="+mn-ea"/>
+        <a:cs typeface="+mn-cs"/>
+      </a:defRPr>
+    </a:lvl9pPr>
+  </p:notesStyle>
+</p:notesMaster>
+</file>
+
 <file path=ppt/slideLayouts/slideLayout1.xml><?xml version="1.0" encoding="utf-8"?>
 <p:sldLayout xmlns:a="http://schemas.openxmlformats.org/drawingml/2006/main" xmlns:r="http://schemas.openxmlformats.org/officeDocument/2006/relationships" xmlns:p="http://schemas.openxmlformats.org/presentationml/2006/main" type="title" preserve="1">
   <p:cSld name="Diapositivo de Título">
@@ -263,9 +617,9 @@
           <a:bodyPr/>
           <a:lstStyle/>
           <a:p>
-            <a:fld id="{4A9F23BD-4EE9-4CF1-9C2B-049393FC1D0F}" type="datetimeFigureOut">
+            <a:fld id="{1E5BF2F9-84AD-46CB-8486-EB732804F762}" type="datetime1">
               <a:rPr lang="en-US" smtClean="0"/>
-              <a:t>2/14/2025</a:t>
+              <a:t>2/15/2025</a:t>
             </a:fld>
             <a:endParaRPr lang="en-US"/>
           </a:p>
@@ -303,13 +657,22 @@
         <p:spPr/>
         <p:txBody>
           <a:bodyPr/>
-          <a:lstStyle/>
+          <a:lstStyle>
+            <a:lvl1pPr>
+              <a:defRPr sz="2000">
+                <a:solidFill>
+                  <a:srgbClr val="002060"/>
+                </a:solidFill>
+              </a:defRPr>
+            </a:lvl1pPr>
+          </a:lstStyle>
           <a:p>
             <a:fld id="{292A9FD8-515A-4698-9313-0AB17EE9632B}" type="slidenum">
               <a:rPr lang="en-US" smtClean="0"/>
+              <a:pPr/>
               <a:t>‹#›</a:t>
             </a:fld>
-            <a:endParaRPr lang="en-US"/>
+            <a:endParaRPr lang="en-US" dirty="0"/>
           </a:p>
         </p:txBody>
       </p:sp>
@@ -433,9 +796,9 @@
           <a:bodyPr/>
           <a:lstStyle/>
           <a:p>
-            <a:fld id="{4A9F23BD-4EE9-4CF1-9C2B-049393FC1D0F}" type="datetimeFigureOut">
+            <a:fld id="{23618752-90E6-4B57-86C0-C43DD2320A2D}" type="datetime1">
               <a:rPr lang="en-US" smtClean="0"/>
-              <a:t>2/14/2025</a:t>
+              <a:t>2/15/2025</a:t>
             </a:fld>
             <a:endParaRPr lang="en-US"/>
           </a:p>
@@ -613,9 +976,9 @@
           <a:bodyPr/>
           <a:lstStyle/>
           <a:p>
-            <a:fld id="{4A9F23BD-4EE9-4CF1-9C2B-049393FC1D0F}" type="datetimeFigureOut">
+            <a:fld id="{85BE5269-252E-4ABC-B047-AD967E98EA5E}" type="datetime1">
               <a:rPr lang="en-US" smtClean="0"/>
-              <a:t>2/14/2025</a:t>
+              <a:t>2/15/2025</a:t>
             </a:fld>
             <a:endParaRPr lang="en-US"/>
           </a:p>
@@ -783,9 +1146,9 @@
           <a:bodyPr/>
           <a:lstStyle/>
           <a:p>
-            <a:fld id="{4A9F23BD-4EE9-4CF1-9C2B-049393FC1D0F}" type="datetimeFigureOut">
+            <a:fld id="{C4D54784-9B75-4DBC-ACA0-9F51227CD78F}" type="datetime1">
               <a:rPr lang="en-US" smtClean="0"/>
-              <a:t>2/14/2025</a:t>
+              <a:t>2/15/2025</a:t>
             </a:fld>
             <a:endParaRPr lang="en-US"/>
           </a:p>
@@ -1029,9 +1392,9 @@
           <a:bodyPr/>
           <a:lstStyle/>
           <a:p>
-            <a:fld id="{4A9F23BD-4EE9-4CF1-9C2B-049393FC1D0F}" type="datetimeFigureOut">
+            <a:fld id="{3D9E4D52-32DE-4F35-8CB6-5A44573D3FC9}" type="datetime1">
               <a:rPr lang="en-US" smtClean="0"/>
-              <a:t>2/14/2025</a:t>
+              <a:t>2/15/2025</a:t>
             </a:fld>
             <a:endParaRPr lang="en-US"/>
           </a:p>
@@ -1261,9 +1624,9 @@
           <a:bodyPr/>
           <a:lstStyle/>
           <a:p>
-            <a:fld id="{4A9F23BD-4EE9-4CF1-9C2B-049393FC1D0F}" type="datetimeFigureOut">
+            <a:fld id="{D0FFB22E-8A21-4AF6-BDE0-993A2F9B14BB}" type="datetime1">
               <a:rPr lang="en-US" smtClean="0"/>
-              <a:t>2/14/2025</a:t>
+              <a:t>2/15/2025</a:t>
             </a:fld>
             <a:endParaRPr lang="en-US"/>
           </a:p>
@@ -1628,9 +1991,9 @@
           <a:bodyPr/>
           <a:lstStyle/>
           <a:p>
-            <a:fld id="{4A9F23BD-4EE9-4CF1-9C2B-049393FC1D0F}" type="datetimeFigureOut">
+            <a:fld id="{AC41D9E4-527D-47F1-B47F-963D62CCBC76}" type="datetime1">
               <a:rPr lang="en-US" smtClean="0"/>
-              <a:t>2/14/2025</a:t>
+              <a:t>2/15/2025</a:t>
             </a:fld>
             <a:endParaRPr lang="en-US"/>
           </a:p>
@@ -1746,9 +2109,9 @@
           <a:bodyPr/>
           <a:lstStyle/>
           <a:p>
-            <a:fld id="{4A9F23BD-4EE9-4CF1-9C2B-049393FC1D0F}" type="datetimeFigureOut">
+            <a:fld id="{9906A608-925A-4874-BCA4-36BA40FADF76}" type="datetime1">
               <a:rPr lang="en-US" smtClean="0"/>
-              <a:t>2/14/2025</a:t>
+              <a:t>2/15/2025</a:t>
             </a:fld>
             <a:endParaRPr lang="en-US"/>
           </a:p>
@@ -1841,9 +2204,9 @@
           <a:bodyPr/>
           <a:lstStyle/>
           <a:p>
-            <a:fld id="{4A9F23BD-4EE9-4CF1-9C2B-049393FC1D0F}" type="datetimeFigureOut">
+            <a:fld id="{45CCB426-3683-4E7C-B869-5155B20F8BC6}" type="datetime1">
               <a:rPr lang="en-US" smtClean="0"/>
-              <a:t>2/14/2025</a:t>
+              <a:t>2/15/2025</a:t>
             </a:fld>
             <a:endParaRPr lang="en-US"/>
           </a:p>
@@ -2118,9 +2481,9 @@
           <a:bodyPr/>
           <a:lstStyle/>
           <a:p>
-            <a:fld id="{4A9F23BD-4EE9-4CF1-9C2B-049393FC1D0F}" type="datetimeFigureOut">
+            <a:fld id="{3351EA60-24F6-40E8-A0D7-2067F6ECA6B2}" type="datetime1">
               <a:rPr lang="en-US" smtClean="0"/>
-              <a:t>2/14/2025</a:t>
+              <a:t>2/15/2025</a:t>
             </a:fld>
             <a:endParaRPr lang="en-US"/>
           </a:p>
@@ -2375,9 +2738,9 @@
           <a:bodyPr/>
           <a:lstStyle/>
           <a:p>
-            <a:fld id="{4A9F23BD-4EE9-4CF1-9C2B-049393FC1D0F}" type="datetimeFigureOut">
+            <a:fld id="{C6106440-8C5F-4111-9AD5-D0C1FDF01CE9}" type="datetime1">
               <a:rPr lang="en-US" smtClean="0"/>
-              <a:t>2/14/2025</a:t>
+              <a:t>2/15/2025</a:t>
             </a:fld>
             <a:endParaRPr lang="en-US"/>
           </a:p>
@@ -2588,9 +2951,9 @@
             </a:lvl1pPr>
           </a:lstStyle>
           <a:p>
-            <a:fld id="{4A9F23BD-4EE9-4CF1-9C2B-049393FC1D0F}" type="datetimeFigureOut">
+            <a:fld id="{2A16FEB8-5B01-4F5E-B573-CC516A2AD5E4}" type="datetime1">
               <a:rPr lang="en-US" smtClean="0"/>
-              <a:t>2/14/2025</a:t>
+              <a:t>2/15/2025</a:t>
             </a:fld>
             <a:endParaRPr lang="en-US"/>
           </a:p>
@@ -2695,6 +3058,7 @@
     <p:sldLayoutId id="2147483682" r:id="rId10"/>
     <p:sldLayoutId id="2147483683" r:id="rId11"/>
   </p:sldLayoutIdLst>
+  <p:hf hdr="0" ftr="0" dt="0"/>
   <p:txStyles>
     <p:titleStyle>
       <a:lvl1pPr algn="l" defTabSz="685800" rtl="0" eaLnBrk="1" latinLnBrk="0" hangingPunct="1">
@@ -3106,6 +3470,35 @@
           </a:p>
         </p:txBody>
       </p:sp>
+      <p:sp>
+        <p:nvSpPr>
+          <p:cNvPr id="4" name="Slide Number Placeholder 3">
+            <a:extLst>
+              <a:ext uri="{FF2B5EF4-FFF2-40B4-BE49-F238E27FC236}">
+                <a16:creationId xmlns:a16="http://schemas.microsoft.com/office/drawing/2014/main" id="{F9777CF3-8E6D-455B-29AC-2426301587E0}"/>
+              </a:ext>
+            </a:extLst>
+          </p:cNvPr>
+          <p:cNvSpPr>
+            <a:spLocks noGrp="1"/>
+          </p:cNvSpPr>
+          <p:nvPr>
+            <p:ph type="sldNum" sz="quarter" idx="12"/>
+          </p:nvPr>
+        </p:nvSpPr>
+        <p:spPr/>
+        <p:txBody>
+          <a:bodyPr/>
+          <a:lstStyle/>
+          <a:p>
+            <a:fld id="{292A9FD8-515A-4698-9313-0AB17EE9632B}" type="slidenum">
+              <a:rPr lang="en-US" smtClean="0"/>
+              <a:t>1</a:t>
+            </a:fld>
+            <a:endParaRPr lang="en-US" dirty="0"/>
+          </a:p>
+        </p:txBody>
+      </p:sp>
     </p:spTree>
     <p:extLst>
       <p:ext uri="{BB962C8B-B14F-4D97-AF65-F5344CB8AC3E}">
@@ -3120,6 +3513,426 @@
 </file>
 
 <file path=ppt/slides/slide10.xml><?xml version="1.0" encoding="utf-8"?>
+<p:sld xmlns:a="http://schemas.openxmlformats.org/drawingml/2006/main" xmlns:r="http://schemas.openxmlformats.org/officeDocument/2006/relationships" xmlns:p="http://schemas.openxmlformats.org/presentationml/2006/main">
+  <p:cSld>
+    <p:bg>
+      <p:bgPr>
+        <a:solidFill>
+          <a:srgbClr val="ACCFEE"/>
+        </a:solidFill>
+        <a:effectLst/>
+      </p:bgPr>
+    </p:bg>
+    <p:spTree>
+      <p:nvGrpSpPr>
+        <p:cNvPr id="1" name="">
+          <a:extLst>
+            <a:ext uri="{FF2B5EF4-FFF2-40B4-BE49-F238E27FC236}">
+              <a16:creationId xmlns:a16="http://schemas.microsoft.com/office/drawing/2014/main" id="{0AEC5163-8B4A-9448-D160-468C46A77920}"/>
+            </a:ext>
+          </a:extLst>
+        </p:cNvPr>
+        <p:cNvGrpSpPr/>
+        <p:nvPr/>
+      </p:nvGrpSpPr>
+      <p:grpSpPr>
+        <a:xfrm>
+          <a:off x="0" y="0"/>
+          <a:ext cx="0" cy="0"/>
+          <a:chOff x="0" y="0"/>
+          <a:chExt cx="0" cy="0"/>
+        </a:xfrm>
+      </p:grpSpPr>
+      <p:sp>
+        <p:nvSpPr>
+          <p:cNvPr id="2" name="TextBox 1">
+            <a:extLst>
+              <a:ext uri="{FF2B5EF4-FFF2-40B4-BE49-F238E27FC236}">
+                <a16:creationId xmlns:a16="http://schemas.microsoft.com/office/drawing/2014/main" id="{084A08B0-3664-D7CB-8048-31AD204A1E71}"/>
+              </a:ext>
+            </a:extLst>
+          </p:cNvPr>
+          <p:cNvSpPr txBox="1"/>
+          <p:nvPr/>
+        </p:nvSpPr>
+        <p:spPr>
+          <a:xfrm>
+            <a:off x="469556" y="626071"/>
+            <a:ext cx="4572000" cy="523220"/>
+          </a:xfrm>
+          <a:prstGeom prst="rect">
+            <a:avLst/>
+          </a:prstGeom>
+          <a:noFill/>
+        </p:spPr>
+        <p:txBody>
+          <a:bodyPr wrap="square" rtlCol="0">
+            <a:spAutoFit/>
+          </a:bodyPr>
+          <a:lstStyle/>
+          <a:p>
+            <a:r>
+              <a:rPr lang="en-US" sz="2800" noProof="0" dirty="0">
+                <a:solidFill>
+                  <a:srgbClr val="002060"/>
+                </a:solidFill>
+              </a:rPr>
+              <a:t>Relational Hoare Logic (2/2)</a:t>
+            </a:r>
+            <a:endParaRPr lang="en-US" sz="2800" noProof="0" dirty="0"/>
+          </a:p>
+        </p:txBody>
+      </p:sp>
+      <p:sp>
+        <p:nvSpPr>
+          <p:cNvPr id="6" name="TextBox 5">
+            <a:extLst>
+              <a:ext uri="{FF2B5EF4-FFF2-40B4-BE49-F238E27FC236}">
+                <a16:creationId xmlns:a16="http://schemas.microsoft.com/office/drawing/2014/main" id="{DD235E25-71AF-B58E-1C90-37D4E783AAB3}"/>
+              </a:ext>
+            </a:extLst>
+          </p:cNvPr>
+          <p:cNvSpPr txBox="1"/>
+          <p:nvPr/>
+        </p:nvSpPr>
+        <p:spPr>
+          <a:xfrm>
+            <a:off x="469555" y="1272966"/>
+            <a:ext cx="2193325" cy="492443"/>
+          </a:xfrm>
+          <a:prstGeom prst="rect">
+            <a:avLst/>
+          </a:prstGeom>
+          <a:noFill/>
+        </p:spPr>
+        <p:txBody>
+          <a:bodyPr wrap="square" rtlCol="0">
+            <a:spAutoFit/>
+          </a:bodyPr>
+          <a:lstStyle/>
+          <a:p>
+            <a:r>
+              <a:rPr lang="en-US" sz="2600" noProof="0" dirty="0">
+                <a:solidFill>
+                  <a:srgbClr val="002060"/>
+                </a:solidFill>
+              </a:rPr>
+              <a:t>Example</a:t>
+            </a:r>
+          </a:p>
+        </p:txBody>
+      </p:sp>
+      <p:sp>
+        <p:nvSpPr>
+          <p:cNvPr id="34" name="TextBox 33">
+            <a:extLst>
+              <a:ext uri="{FF2B5EF4-FFF2-40B4-BE49-F238E27FC236}">
+                <a16:creationId xmlns:a16="http://schemas.microsoft.com/office/drawing/2014/main" id="{89CF4719-4A30-9D88-86C2-0AE1EA1F12B9}"/>
+              </a:ext>
+            </a:extLst>
+          </p:cNvPr>
+          <p:cNvSpPr txBox="1"/>
+          <p:nvPr/>
+        </p:nvSpPr>
+        <p:spPr>
+          <a:xfrm>
+            <a:off x="2755556" y="2072670"/>
+            <a:ext cx="2193325" cy="1569660"/>
+          </a:xfrm>
+          <a:prstGeom prst="rect">
+            <a:avLst/>
+          </a:prstGeom>
+          <a:noFill/>
+        </p:spPr>
+        <p:txBody>
+          <a:bodyPr wrap="square" rtlCol="0">
+            <a:spAutoFit/>
+          </a:bodyPr>
+          <a:lstStyle/>
+          <a:p>
+            <a:r>
+              <a:rPr lang="en-US" sz="2400" i="1" noProof="0" dirty="0">
+                <a:solidFill>
+                  <a:srgbClr val="002060"/>
+                </a:solidFill>
+              </a:rPr>
+              <a:t>P1</a:t>
+            </a:r>
+          </a:p>
+          <a:p>
+            <a:r>
+              <a:rPr lang="en-US" sz="2400" i="1" noProof="0" dirty="0">
+                <a:solidFill>
+                  <a:srgbClr val="002060"/>
+                </a:solidFill>
+              </a:rPr>
+              <a:t>y := x + 1;</a:t>
+            </a:r>
+          </a:p>
+          <a:p>
+            <a:r>
+              <a:rPr lang="en-US" sz="2400" i="1" dirty="0">
+                <a:solidFill>
+                  <a:srgbClr val="002060"/>
+                </a:solidFill>
+              </a:rPr>
+              <a:t>z := y + 1; </a:t>
+            </a:r>
+            <a:endParaRPr lang="en-US" sz="2400" i="1" noProof="0" dirty="0">
+              <a:solidFill>
+                <a:srgbClr val="002060"/>
+              </a:solidFill>
+            </a:endParaRPr>
+          </a:p>
+          <a:p>
+            <a:endParaRPr lang="en-US" sz="2400" i="1" noProof="0" dirty="0">
+              <a:solidFill>
+                <a:srgbClr val="002060"/>
+              </a:solidFill>
+            </a:endParaRPr>
+          </a:p>
+        </p:txBody>
+      </p:sp>
+      <p:sp>
+        <p:nvSpPr>
+          <p:cNvPr id="35" name="TextBox 34">
+            <a:extLst>
+              <a:ext uri="{FF2B5EF4-FFF2-40B4-BE49-F238E27FC236}">
+                <a16:creationId xmlns:a16="http://schemas.microsoft.com/office/drawing/2014/main" id="{5A44DFCB-44F5-76A0-F45F-D4925D1330BD}"/>
+              </a:ext>
+            </a:extLst>
+          </p:cNvPr>
+          <p:cNvSpPr txBox="1"/>
+          <p:nvPr/>
+        </p:nvSpPr>
+        <p:spPr>
+          <a:xfrm>
+            <a:off x="4572000" y="2072670"/>
+            <a:ext cx="2193325" cy="1569660"/>
+          </a:xfrm>
+          <a:prstGeom prst="rect">
+            <a:avLst/>
+          </a:prstGeom>
+          <a:noFill/>
+        </p:spPr>
+        <p:txBody>
+          <a:bodyPr wrap="square" rtlCol="0">
+            <a:spAutoFit/>
+          </a:bodyPr>
+          <a:lstStyle/>
+          <a:p>
+            <a:r>
+              <a:rPr lang="en-US" sz="2400" i="1" noProof="0" dirty="0">
+                <a:solidFill>
+                  <a:srgbClr val="002060"/>
+                </a:solidFill>
+              </a:rPr>
+              <a:t>P2</a:t>
+            </a:r>
+          </a:p>
+          <a:p>
+            <a:r>
+              <a:rPr lang="en-US" sz="2400" i="1" noProof="0" dirty="0">
+                <a:solidFill>
+                  <a:srgbClr val="002060"/>
+                </a:solidFill>
+              </a:rPr>
+              <a:t>z := x + 2;</a:t>
+            </a:r>
+          </a:p>
+          <a:p>
+            <a:r>
+              <a:rPr lang="en-US" sz="2400" i="1" dirty="0">
+                <a:solidFill>
+                  <a:srgbClr val="002060"/>
+                </a:solidFill>
+              </a:rPr>
+              <a:t>y := z - 1; </a:t>
+            </a:r>
+            <a:endParaRPr lang="en-US" sz="2400" i="1" noProof="0" dirty="0">
+              <a:solidFill>
+                <a:srgbClr val="002060"/>
+              </a:solidFill>
+            </a:endParaRPr>
+          </a:p>
+          <a:p>
+            <a:endParaRPr lang="en-US" sz="2400" i="1" noProof="0" dirty="0">
+              <a:solidFill>
+                <a:srgbClr val="002060"/>
+              </a:solidFill>
+            </a:endParaRPr>
+          </a:p>
+        </p:txBody>
+      </p:sp>
+      <p:sp>
+        <p:nvSpPr>
+          <p:cNvPr id="37" name="TextBox 36">
+            <a:extLst>
+              <a:ext uri="{FF2B5EF4-FFF2-40B4-BE49-F238E27FC236}">
+                <a16:creationId xmlns:a16="http://schemas.microsoft.com/office/drawing/2014/main" id="{BB3D3B06-90BA-7A6F-F13F-E4D33F69DD64}"/>
+              </a:ext>
+            </a:extLst>
+          </p:cNvPr>
+          <p:cNvSpPr txBox="1"/>
+          <p:nvPr/>
+        </p:nvSpPr>
+        <p:spPr>
+          <a:xfrm>
+            <a:off x="1433384" y="3882993"/>
+            <a:ext cx="6277232" cy="830997"/>
+          </a:xfrm>
+          <a:prstGeom prst="rect">
+            <a:avLst/>
+          </a:prstGeom>
+          <a:noFill/>
+        </p:spPr>
+        <p:txBody>
+          <a:bodyPr wrap="square" rtlCol="0">
+            <a:spAutoFit/>
+          </a:bodyPr>
+          <a:lstStyle/>
+          <a:p>
+            <a:r>
+              <a:rPr lang="el-GR" sz="2400" dirty="0">
+                <a:solidFill>
+                  <a:srgbClr val="002060"/>
+                </a:solidFill>
+              </a:rPr>
+              <a:t>Φ</a:t>
+            </a:r>
+            <a:r>
+              <a:rPr lang="pt-PT" sz="2400" dirty="0">
+                <a:solidFill>
+                  <a:srgbClr val="002060"/>
+                </a:solidFill>
+              </a:rPr>
+              <a:t> </a:t>
+            </a:r>
+            <a:r>
+              <a:rPr lang="en-US" sz="2400" dirty="0"/>
+              <a:t>≜</a:t>
+            </a:r>
+            <a:r>
+              <a:rPr lang="pt-PT" sz="2400" dirty="0">
+                <a:solidFill>
+                  <a:srgbClr val="002060"/>
+                </a:solidFill>
+              </a:rPr>
+              <a:t> P1.x = P2.x </a:t>
+            </a:r>
+          </a:p>
+          <a:p>
+            <a:r>
+              <a:rPr lang="el-GR" sz="2400" dirty="0">
+                <a:solidFill>
+                  <a:srgbClr val="002060"/>
+                </a:solidFill>
+              </a:rPr>
+              <a:t>Ψ</a:t>
+            </a:r>
+            <a:r>
+              <a:rPr lang="pt-PT" sz="2400" dirty="0">
+                <a:solidFill>
+                  <a:srgbClr val="002060"/>
+                </a:solidFill>
+              </a:rPr>
+              <a:t> </a:t>
+            </a:r>
+            <a:r>
+              <a:rPr lang="en-US" sz="2400" dirty="0"/>
+              <a:t>≜</a:t>
+            </a:r>
+            <a:r>
+              <a:rPr lang="pt-PT" sz="2400" dirty="0">
+                <a:solidFill>
+                  <a:srgbClr val="002060"/>
+                </a:solidFill>
+              </a:rPr>
+              <a:t> P1.x = P2.x </a:t>
+            </a:r>
+            <a:r>
+              <a:rPr lang="en-US" sz="2400" dirty="0">
+                <a:solidFill>
+                  <a:srgbClr val="002060"/>
+                </a:solidFill>
+              </a:rPr>
+              <a:t>∧ </a:t>
+            </a:r>
+            <a:r>
+              <a:rPr lang="pt-PT" sz="2400" dirty="0">
+                <a:solidFill>
+                  <a:srgbClr val="002060"/>
+                </a:solidFill>
+              </a:rPr>
+              <a:t>P1.y = P2.y </a:t>
+            </a:r>
+            <a:r>
+              <a:rPr lang="en-US" sz="2400" dirty="0">
+                <a:solidFill>
+                  <a:srgbClr val="002060"/>
+                </a:solidFill>
+              </a:rPr>
+              <a:t>∧ </a:t>
+            </a:r>
+            <a:r>
+              <a:rPr lang="pt-PT" sz="2400" dirty="0">
+                <a:solidFill>
+                  <a:srgbClr val="002060"/>
+                </a:solidFill>
+              </a:rPr>
+              <a:t>P1.z = P2.z  </a:t>
+            </a:r>
+            <a:endParaRPr lang="en-US" sz="2400" dirty="0">
+              <a:solidFill>
+                <a:srgbClr val="002060"/>
+              </a:solidFill>
+            </a:endParaRPr>
+          </a:p>
+        </p:txBody>
+      </p:sp>
+      <p:sp>
+        <p:nvSpPr>
+          <p:cNvPr id="38" name="Slide Number Placeholder 37">
+            <a:extLst>
+              <a:ext uri="{FF2B5EF4-FFF2-40B4-BE49-F238E27FC236}">
+                <a16:creationId xmlns:a16="http://schemas.microsoft.com/office/drawing/2014/main" id="{7AEF7FC6-A282-CC28-EEC0-C9180C487B7F}"/>
+              </a:ext>
+            </a:extLst>
+          </p:cNvPr>
+          <p:cNvSpPr>
+            <a:spLocks noGrp="1"/>
+          </p:cNvSpPr>
+          <p:nvPr>
+            <p:ph type="sldNum" sz="quarter" idx="12"/>
+          </p:nvPr>
+        </p:nvSpPr>
+        <p:spPr/>
+        <p:txBody>
+          <a:bodyPr/>
+          <a:lstStyle/>
+          <a:p>
+            <a:fld id="{292A9FD8-515A-4698-9313-0AB17EE9632B}" type="slidenum">
+              <a:rPr lang="en-US" smtClean="0"/>
+              <a:t>10</a:t>
+            </a:fld>
+            <a:endParaRPr lang="en-US"/>
+          </a:p>
+        </p:txBody>
+      </p:sp>
+    </p:spTree>
+    <p:extLst>
+      <p:ext uri="{BB962C8B-B14F-4D97-AF65-F5344CB8AC3E}">
+        <p14:creationId xmlns:p14="http://schemas.microsoft.com/office/powerpoint/2010/main" val="939911291"/>
+      </p:ext>
+    </p:extLst>
+  </p:cSld>
+  <p:clrMapOvr>
+    <a:masterClrMapping/>
+  </p:clrMapOvr>
+</p:sld>
+</file>
+
+<file path=ppt/slides/slide11.xml><?xml version="1.0" encoding="utf-8"?>
 <p:sld xmlns:a="http://schemas.openxmlformats.org/drawingml/2006/main" xmlns:r="http://schemas.openxmlformats.org/officeDocument/2006/relationships" xmlns:p="http://schemas.openxmlformats.org/presentationml/2006/main">
   <p:cSld>
     <p:bg>
@@ -3190,6 +4003,456 @@
           </a:p>
         </p:txBody>
       </p:sp>
+      <p:sp>
+        <p:nvSpPr>
+          <p:cNvPr id="3" name="TextBox 2">
+            <a:extLst>
+              <a:ext uri="{FF2B5EF4-FFF2-40B4-BE49-F238E27FC236}">
+                <a16:creationId xmlns:a16="http://schemas.microsoft.com/office/drawing/2014/main" id="{DFE1C460-8768-4812-5AF4-EF2037D27808}"/>
+              </a:ext>
+            </a:extLst>
+          </p:cNvPr>
+          <p:cNvSpPr txBox="1"/>
+          <p:nvPr/>
+        </p:nvSpPr>
+        <p:spPr>
+          <a:xfrm>
+            <a:off x="469556" y="1609536"/>
+            <a:ext cx="5132174" cy="1785104"/>
+          </a:xfrm>
+          <a:prstGeom prst="rect">
+            <a:avLst/>
+          </a:prstGeom>
+          <a:noFill/>
+        </p:spPr>
+        <p:txBody>
+          <a:bodyPr wrap="square" rtlCol="0">
+            <a:spAutoFit/>
+          </a:bodyPr>
+          <a:lstStyle/>
+          <a:p>
+            <a:pPr marL="342900" indent="-342900">
+              <a:buFont typeface="Arial" panose="020B0604020202020204" pitchFamily="34" charset="0"/>
+              <a:buChar char="•"/>
+            </a:pPr>
+            <a:r>
+              <a:rPr lang="en-US" sz="2200" noProof="0" dirty="0">
+                <a:solidFill>
+                  <a:srgbClr val="002060"/>
+                </a:solidFill>
+              </a:rPr>
+              <a:t>Multi-paradigm, interpreted or compiled, strongly and statically typed with type inference</a:t>
+            </a:r>
+          </a:p>
+          <a:p>
+            <a:pPr marL="342900" indent="-342900">
+              <a:buFont typeface="Arial" panose="020B0604020202020204" pitchFamily="34" charset="0"/>
+              <a:buChar char="•"/>
+            </a:pPr>
+            <a:r>
+              <a:rPr lang="en-US" sz="2200" dirty="0">
+                <a:solidFill>
+                  <a:srgbClr val="002060"/>
+                </a:solidFill>
+              </a:rPr>
+              <a:t>Used in: Meta, Microsoft, Bloomberg, Docker, Coq…</a:t>
+            </a:r>
+          </a:p>
+        </p:txBody>
+      </p:sp>
+      <p:sp>
+        <p:nvSpPr>
+          <p:cNvPr id="4" name="TextBox 3">
+            <a:extLst>
+              <a:ext uri="{FF2B5EF4-FFF2-40B4-BE49-F238E27FC236}">
+                <a16:creationId xmlns:a16="http://schemas.microsoft.com/office/drawing/2014/main" id="{6B2C040B-C006-E980-511D-62DEEFA598D2}"/>
+              </a:ext>
+            </a:extLst>
+          </p:cNvPr>
+          <p:cNvSpPr txBox="1"/>
+          <p:nvPr/>
+        </p:nvSpPr>
+        <p:spPr>
+          <a:xfrm>
+            <a:off x="469556" y="3714842"/>
+            <a:ext cx="4394887" cy="1107996"/>
+          </a:xfrm>
+          <a:prstGeom prst="rect">
+            <a:avLst/>
+          </a:prstGeom>
+          <a:noFill/>
+        </p:spPr>
+        <p:txBody>
+          <a:bodyPr wrap="square" rtlCol="0">
+            <a:spAutoFit/>
+          </a:bodyPr>
+          <a:lstStyle/>
+          <a:p>
+            <a:r>
+              <a:rPr lang="en-US" sz="2200" dirty="0">
+                <a:solidFill>
+                  <a:srgbClr val="002060"/>
+                </a:solidFill>
+              </a:rPr>
+              <a:t>let rec </a:t>
+            </a:r>
+            <a:r>
+              <a:rPr lang="en-US" sz="2200" dirty="0" err="1">
+                <a:solidFill>
+                  <a:srgbClr val="002060"/>
+                </a:solidFill>
+              </a:rPr>
+              <a:t>gcd</a:t>
+            </a:r>
+            <a:r>
+              <a:rPr lang="en-US" sz="2200" dirty="0">
+                <a:solidFill>
+                  <a:srgbClr val="002060"/>
+                </a:solidFill>
+              </a:rPr>
+              <a:t> (a: int) (</a:t>
+            </a:r>
+            <a:r>
+              <a:rPr lang="en-US" sz="2200" dirty="0" err="1">
+                <a:solidFill>
+                  <a:srgbClr val="002060"/>
+                </a:solidFill>
+              </a:rPr>
+              <a:t>b:int</a:t>
+            </a:r>
+            <a:r>
+              <a:rPr lang="en-US" sz="2200" dirty="0">
+                <a:solidFill>
+                  <a:srgbClr val="002060"/>
+                </a:solidFill>
+              </a:rPr>
+              <a:t>) : int =</a:t>
+            </a:r>
+          </a:p>
+          <a:p>
+            <a:r>
+              <a:rPr lang="en-US" sz="2200" dirty="0">
+                <a:solidFill>
+                  <a:srgbClr val="002060"/>
+                </a:solidFill>
+              </a:rPr>
+              <a:t>   if b = 0 then a</a:t>
+            </a:r>
+          </a:p>
+          <a:p>
+            <a:r>
+              <a:rPr lang="en-US" sz="2200" dirty="0">
+                <a:solidFill>
+                  <a:srgbClr val="002060"/>
+                </a:solidFill>
+              </a:rPr>
+              <a:t>   else </a:t>
+            </a:r>
+            <a:r>
+              <a:rPr lang="en-US" sz="2200" dirty="0" err="1">
+                <a:solidFill>
+                  <a:srgbClr val="002060"/>
+                </a:solidFill>
+              </a:rPr>
+              <a:t>gcd</a:t>
+            </a:r>
+            <a:r>
+              <a:rPr lang="en-US" sz="2200" dirty="0">
+                <a:solidFill>
+                  <a:srgbClr val="002060"/>
+                </a:solidFill>
+              </a:rPr>
+              <a:t> b (mod a b)</a:t>
+            </a:r>
+          </a:p>
+        </p:txBody>
+      </p:sp>
+      <p:sp>
+        <p:nvSpPr>
+          <p:cNvPr id="5" name="TextBox 4">
+            <a:extLst>
+              <a:ext uri="{FF2B5EF4-FFF2-40B4-BE49-F238E27FC236}">
+                <a16:creationId xmlns:a16="http://schemas.microsoft.com/office/drawing/2014/main" id="{6C410D09-5AEC-1BD8-E438-96931AD9F734}"/>
+              </a:ext>
+            </a:extLst>
+          </p:cNvPr>
+          <p:cNvSpPr txBox="1"/>
+          <p:nvPr/>
+        </p:nvSpPr>
+        <p:spPr>
+          <a:xfrm>
+            <a:off x="5898293" y="2023947"/>
+            <a:ext cx="3245707" cy="3539430"/>
+          </a:xfrm>
+          <a:prstGeom prst="rect">
+            <a:avLst/>
+          </a:prstGeom>
+          <a:noFill/>
+        </p:spPr>
+        <p:txBody>
+          <a:bodyPr wrap="square" rtlCol="0">
+            <a:spAutoFit/>
+          </a:bodyPr>
+          <a:lstStyle/>
+          <a:p>
+            <a:r>
+              <a:rPr lang="en-US" sz="2200" dirty="0">
+                <a:solidFill>
+                  <a:srgbClr val="002060"/>
+                </a:solidFill>
+              </a:rPr>
+              <a:t>let </a:t>
+            </a:r>
+            <a:r>
+              <a:rPr lang="en-US" sz="2200" dirty="0" err="1">
+                <a:solidFill>
+                  <a:srgbClr val="002060"/>
+                </a:solidFill>
+              </a:rPr>
+              <a:t>gcd_iter</a:t>
+            </a:r>
+            <a:r>
+              <a:rPr lang="en-US" sz="2200" dirty="0">
+                <a:solidFill>
+                  <a:srgbClr val="002060"/>
+                </a:solidFill>
+              </a:rPr>
+              <a:t> (a0: int)      (b0: int) : int =   </a:t>
+            </a:r>
+          </a:p>
+          <a:p>
+            <a:r>
+              <a:rPr lang="en-US" sz="2200" dirty="0">
+                <a:solidFill>
+                  <a:srgbClr val="002060"/>
+                </a:solidFill>
+              </a:rPr>
+              <a:t>      let b = ref b0 in</a:t>
+            </a:r>
+          </a:p>
+          <a:p>
+            <a:r>
+              <a:rPr lang="en-US" sz="2200" dirty="0">
+                <a:solidFill>
+                  <a:srgbClr val="002060"/>
+                </a:solidFill>
+              </a:rPr>
+              <a:t>      let a = ref a0 in</a:t>
+            </a:r>
+          </a:p>
+          <a:p>
+            <a:r>
+              <a:rPr lang="en-US" sz="2200" dirty="0">
+                <a:solidFill>
+                  <a:srgbClr val="002060"/>
+                </a:solidFill>
+              </a:rPr>
+              <a:t>      while !b &lt;&gt; 0 do</a:t>
+            </a:r>
+          </a:p>
+          <a:p>
+            <a:r>
+              <a:rPr lang="en-US" sz="2200" dirty="0">
+                <a:solidFill>
+                  <a:srgbClr val="002060"/>
+                </a:solidFill>
+              </a:rPr>
+              <a:t>          let </a:t>
+            </a:r>
+            <a:r>
+              <a:rPr lang="en-US" sz="2200" dirty="0" err="1">
+                <a:solidFill>
+                  <a:srgbClr val="002060"/>
+                </a:solidFill>
+              </a:rPr>
+              <a:t>tmp</a:t>
+            </a:r>
+            <a:r>
+              <a:rPr lang="en-US" sz="2200" dirty="0">
+                <a:solidFill>
+                  <a:srgbClr val="002060"/>
+                </a:solidFill>
+              </a:rPr>
+              <a:t> = !a in</a:t>
+            </a:r>
+          </a:p>
+          <a:p>
+            <a:r>
+              <a:rPr lang="en-US" sz="2200" dirty="0">
+                <a:solidFill>
+                  <a:srgbClr val="002060"/>
+                </a:solidFill>
+              </a:rPr>
+              <a:t>          a := !b;</a:t>
+            </a:r>
+          </a:p>
+          <a:p>
+            <a:r>
+              <a:rPr lang="en-US" sz="2200" dirty="0">
+                <a:solidFill>
+                  <a:srgbClr val="002060"/>
+                </a:solidFill>
+              </a:rPr>
+              <a:t>          b := </a:t>
+            </a:r>
+            <a:r>
+              <a:rPr lang="en-US" sz="2200" dirty="0" err="1">
+                <a:solidFill>
+                  <a:srgbClr val="002060"/>
+                </a:solidFill>
+              </a:rPr>
+              <a:t>tmp</a:t>
+            </a:r>
+            <a:r>
+              <a:rPr lang="en-US" sz="2200" dirty="0">
+                <a:solidFill>
+                  <a:srgbClr val="002060"/>
+                </a:solidFill>
+              </a:rPr>
+              <a:t> mod !b</a:t>
+            </a:r>
+          </a:p>
+          <a:p>
+            <a:r>
+              <a:rPr lang="en-US" sz="2200" dirty="0">
+                <a:solidFill>
+                  <a:srgbClr val="002060"/>
+                </a:solidFill>
+              </a:rPr>
+              <a:t>      done;</a:t>
+            </a:r>
+          </a:p>
+          <a:p>
+            <a:r>
+              <a:rPr lang="en-US" sz="2200" dirty="0">
+                <a:solidFill>
+                  <a:srgbClr val="002060"/>
+                </a:solidFill>
+              </a:rPr>
+              <a:t>      !a</a:t>
+            </a:r>
+          </a:p>
+        </p:txBody>
+      </p:sp>
+      <p:sp>
+        <p:nvSpPr>
+          <p:cNvPr id="6" name="TextBox 5">
+            <a:extLst>
+              <a:ext uri="{FF2B5EF4-FFF2-40B4-BE49-F238E27FC236}">
+                <a16:creationId xmlns:a16="http://schemas.microsoft.com/office/drawing/2014/main" id="{7DB3CD8C-EBA8-4863-BA1A-160F3A9C0CE3}"/>
+              </a:ext>
+            </a:extLst>
+          </p:cNvPr>
+          <p:cNvSpPr txBox="1"/>
+          <p:nvPr/>
+        </p:nvSpPr>
+        <p:spPr>
+          <a:xfrm>
+            <a:off x="6639696" y="1394092"/>
+            <a:ext cx="1762899" cy="430887"/>
+          </a:xfrm>
+          <a:prstGeom prst="rect">
+            <a:avLst/>
+          </a:prstGeom>
+          <a:noFill/>
+        </p:spPr>
+        <p:txBody>
+          <a:bodyPr wrap="square" rtlCol="0">
+            <a:spAutoFit/>
+          </a:bodyPr>
+          <a:lstStyle/>
+          <a:p>
+            <a:pPr algn="ctr"/>
+            <a:r>
+              <a:rPr lang="pt-PT" sz="2200" b="1" dirty="0" err="1">
+                <a:solidFill>
+                  <a:srgbClr val="002060"/>
+                </a:solidFill>
+              </a:rPr>
+              <a:t>Imperative</a:t>
+            </a:r>
+            <a:endParaRPr lang="en-US" sz="2200" b="1" dirty="0">
+              <a:solidFill>
+                <a:srgbClr val="002060"/>
+              </a:solidFill>
+            </a:endParaRPr>
+          </a:p>
+        </p:txBody>
+      </p:sp>
+      <p:sp>
+        <p:nvSpPr>
+          <p:cNvPr id="7" name="TextBox 6">
+            <a:extLst>
+              <a:ext uri="{FF2B5EF4-FFF2-40B4-BE49-F238E27FC236}">
+                <a16:creationId xmlns:a16="http://schemas.microsoft.com/office/drawing/2014/main" id="{94072401-A1C1-359C-C546-091985F0A347}"/>
+              </a:ext>
+            </a:extLst>
+          </p:cNvPr>
+          <p:cNvSpPr txBox="1"/>
+          <p:nvPr/>
+        </p:nvSpPr>
+        <p:spPr>
+          <a:xfrm>
+            <a:off x="1396312" y="4927596"/>
+            <a:ext cx="1762899" cy="430887"/>
+          </a:xfrm>
+          <a:prstGeom prst="rect">
+            <a:avLst/>
+          </a:prstGeom>
+          <a:noFill/>
+        </p:spPr>
+        <p:txBody>
+          <a:bodyPr wrap="square" rtlCol="0">
+            <a:spAutoFit/>
+          </a:bodyPr>
+          <a:lstStyle/>
+          <a:p>
+            <a:pPr algn="ctr"/>
+            <a:r>
+              <a:rPr lang="pt-PT" sz="2200" b="1" dirty="0" err="1">
+                <a:solidFill>
+                  <a:srgbClr val="002060"/>
+                </a:solidFill>
+              </a:rPr>
+              <a:t>Functional</a:t>
+            </a:r>
+            <a:endParaRPr lang="en-US" sz="2200" b="1" dirty="0">
+              <a:solidFill>
+                <a:srgbClr val="002060"/>
+              </a:solidFill>
+            </a:endParaRPr>
+          </a:p>
+        </p:txBody>
+      </p:sp>
+      <p:sp>
+        <p:nvSpPr>
+          <p:cNvPr id="8" name="Slide Number Placeholder 7">
+            <a:extLst>
+              <a:ext uri="{FF2B5EF4-FFF2-40B4-BE49-F238E27FC236}">
+                <a16:creationId xmlns:a16="http://schemas.microsoft.com/office/drawing/2014/main" id="{DC9AD30C-DB5E-2DFA-F5B7-F95F0D78E2B7}"/>
+              </a:ext>
+            </a:extLst>
+          </p:cNvPr>
+          <p:cNvSpPr>
+            <a:spLocks noGrp="1"/>
+          </p:cNvSpPr>
+          <p:nvPr>
+            <p:ph type="sldNum" sz="quarter" idx="12"/>
+          </p:nvPr>
+        </p:nvSpPr>
+        <p:spPr/>
+        <p:txBody>
+          <a:bodyPr/>
+          <a:lstStyle/>
+          <a:p>
+            <a:fld id="{292A9FD8-515A-4698-9313-0AB17EE9632B}" type="slidenum">
+              <a:rPr lang="en-US" smtClean="0"/>
+              <a:t>11</a:t>
+            </a:fld>
+            <a:endParaRPr lang="en-US"/>
+          </a:p>
+        </p:txBody>
+      </p:sp>
     </p:spTree>
     <p:extLst>
       <p:ext uri="{BB962C8B-B14F-4D97-AF65-F5344CB8AC3E}">
@@ -3203,7 +4466,7 @@
 </p:sld>
 </file>
 
-<file path=ppt/slides/slide11.xml><?xml version="1.0" encoding="utf-8"?>
+<file path=ppt/slides/slide12.xml><?xml version="1.0" encoding="utf-8"?>
 <p:sld xmlns:a="http://schemas.openxmlformats.org/drawingml/2006/main" xmlns:r="http://schemas.openxmlformats.org/officeDocument/2006/relationships" xmlns:p="http://schemas.openxmlformats.org/presentationml/2006/main">
   <p:cSld>
     <p:bg>
@@ -3274,6 +4537,149 @@
           </a:p>
         </p:txBody>
       </p:sp>
+      <p:sp>
+        <p:nvSpPr>
+          <p:cNvPr id="3" name="Slide Number Placeholder 2">
+            <a:extLst>
+              <a:ext uri="{FF2B5EF4-FFF2-40B4-BE49-F238E27FC236}">
+                <a16:creationId xmlns:a16="http://schemas.microsoft.com/office/drawing/2014/main" id="{3E38234B-8853-1DF1-F048-BFB6D3B4420F}"/>
+              </a:ext>
+            </a:extLst>
+          </p:cNvPr>
+          <p:cNvSpPr>
+            <a:spLocks noGrp="1"/>
+          </p:cNvSpPr>
+          <p:nvPr>
+            <p:ph type="sldNum" sz="quarter" idx="12"/>
+          </p:nvPr>
+        </p:nvSpPr>
+        <p:spPr/>
+        <p:txBody>
+          <a:bodyPr/>
+          <a:lstStyle/>
+          <a:p>
+            <a:fld id="{292A9FD8-515A-4698-9313-0AB17EE9632B}" type="slidenum">
+              <a:rPr lang="en-US" smtClean="0"/>
+              <a:t>12</a:t>
+            </a:fld>
+            <a:endParaRPr lang="en-US"/>
+          </a:p>
+        </p:txBody>
+      </p:sp>
+      <p:sp>
+        <p:nvSpPr>
+          <p:cNvPr id="4" name="TextBox 3">
+            <a:extLst>
+              <a:ext uri="{FF2B5EF4-FFF2-40B4-BE49-F238E27FC236}">
+                <a16:creationId xmlns:a16="http://schemas.microsoft.com/office/drawing/2014/main" id="{C49B67B2-AF0C-816F-9EDC-164D968E96C3}"/>
+              </a:ext>
+            </a:extLst>
+          </p:cNvPr>
+          <p:cNvSpPr txBox="1"/>
+          <p:nvPr/>
+        </p:nvSpPr>
+        <p:spPr>
+          <a:xfrm>
+            <a:off x="469556" y="1857106"/>
+            <a:ext cx="7710617" cy="2646878"/>
+          </a:xfrm>
+          <a:prstGeom prst="rect">
+            <a:avLst/>
+          </a:prstGeom>
+          <a:noFill/>
+        </p:spPr>
+        <p:txBody>
+          <a:bodyPr wrap="square" rtlCol="0">
+            <a:spAutoFit/>
+          </a:bodyPr>
+          <a:lstStyle/>
+          <a:p>
+            <a:pPr marL="342900" indent="-342900">
+              <a:buFont typeface="Arial" panose="020B0604020202020204" pitchFamily="34" charset="0"/>
+              <a:buChar char="•"/>
+            </a:pPr>
+            <a:r>
+              <a:rPr lang="en-US" sz="2400" dirty="0">
+                <a:solidFill>
+                  <a:srgbClr val="002060"/>
+                </a:solidFill>
+              </a:rPr>
+              <a:t>Open source deductive verification platform</a:t>
+            </a:r>
+          </a:p>
+          <a:p>
+            <a:pPr marL="342900" indent="-342900">
+              <a:buFont typeface="Arial" panose="020B0604020202020204" pitchFamily="34" charset="0"/>
+              <a:buChar char="•"/>
+            </a:pPr>
+            <a:r>
+              <a:rPr lang="en-US" sz="2400" noProof="0" dirty="0">
+                <a:solidFill>
+                  <a:srgbClr val="002060"/>
+                </a:solidFill>
+              </a:rPr>
+              <a:t>Establishes the bridge </a:t>
+            </a:r>
+            <a:r>
+              <a:rPr lang="en-US" sz="2400" dirty="0">
+                <a:solidFill>
+                  <a:srgbClr val="002060"/>
+                </a:solidFill>
+              </a:rPr>
+              <a:t>between the programmer and different types of theorem provers:</a:t>
+            </a:r>
+          </a:p>
+          <a:p>
+            <a:pPr marL="800100" lvl="1" indent="-342900">
+              <a:buFont typeface="Wingdings" panose="05000000000000000000" pitchFamily="2" charset="2"/>
+              <a:buChar char="Ø"/>
+            </a:pPr>
+            <a:r>
+              <a:rPr lang="en-US" sz="2400" dirty="0">
+                <a:solidFill>
+                  <a:srgbClr val="002060"/>
+                </a:solidFill>
+              </a:rPr>
+              <a:t>SMT solvers (Z3, cvc5, Alt-Ergo…)</a:t>
+            </a:r>
+          </a:p>
+          <a:p>
+            <a:pPr marL="800100" lvl="1" indent="-342900">
+              <a:buFont typeface="Wingdings" panose="05000000000000000000" pitchFamily="2" charset="2"/>
+              <a:buChar char="Ø"/>
+            </a:pPr>
+            <a:r>
+              <a:rPr lang="en-US" sz="2400" dirty="0">
+                <a:solidFill>
+                  <a:srgbClr val="002060"/>
+                </a:solidFill>
+              </a:rPr>
+              <a:t>Interactive proof assistants (Coq, Isabelle…)</a:t>
+            </a:r>
+          </a:p>
+          <a:p>
+            <a:pPr marL="800100" lvl="1" indent="-342900">
+              <a:buFont typeface="Wingdings" panose="05000000000000000000" pitchFamily="2" charset="2"/>
+              <a:buChar char="Ø"/>
+            </a:pPr>
+            <a:r>
+              <a:rPr lang="en-US" sz="2400" dirty="0">
+                <a:solidFill>
+                  <a:srgbClr val="002060"/>
+                </a:solidFill>
+              </a:rPr>
+              <a:t>TPTP provers</a:t>
+            </a:r>
+          </a:p>
+          <a:p>
+            <a:endParaRPr lang="en-US" sz="2200" noProof="0" dirty="0">
+              <a:solidFill>
+                <a:srgbClr val="002060"/>
+              </a:solidFill>
+            </a:endParaRPr>
+          </a:p>
+        </p:txBody>
+      </p:sp>
     </p:spTree>
     <p:extLst>
       <p:ext uri="{BB962C8B-B14F-4D97-AF65-F5344CB8AC3E}">
@@ -3287,7 +4693,7 @@
 </p:sld>
 </file>
 
-<file path=ppt/slides/slide12.xml><?xml version="1.0" encoding="utf-8"?>
+<file path=ppt/slides/slide13.xml><?xml version="1.0" encoding="utf-8"?>
 <p:sld xmlns:a="http://schemas.openxmlformats.org/drawingml/2006/main" xmlns:r="http://schemas.openxmlformats.org/officeDocument/2006/relationships" xmlns:p="http://schemas.openxmlformats.org/presentationml/2006/main">
   <p:cSld>
     <p:bg>
@@ -3352,9 +4758,155 @@
                   <a:srgbClr val="002060"/>
                 </a:solidFill>
               </a:rPr>
-              <a:t>GOSPEL</a:t>
+              <a:t>GOSPEL (1/2)</a:t>
             </a:r>
             <a:endParaRPr lang="en-US" sz="2800" noProof="0" dirty="0"/>
+          </a:p>
+        </p:txBody>
+      </p:sp>
+      <p:sp>
+        <p:nvSpPr>
+          <p:cNvPr id="3" name="Slide Number Placeholder 2">
+            <a:extLst>
+              <a:ext uri="{FF2B5EF4-FFF2-40B4-BE49-F238E27FC236}">
+                <a16:creationId xmlns:a16="http://schemas.microsoft.com/office/drawing/2014/main" id="{27724ABA-31BB-719D-DEBF-ACDE275300DC}"/>
+              </a:ext>
+            </a:extLst>
+          </p:cNvPr>
+          <p:cNvSpPr>
+            <a:spLocks noGrp="1"/>
+          </p:cNvSpPr>
+          <p:nvPr>
+            <p:ph type="sldNum" sz="quarter" idx="12"/>
+          </p:nvPr>
+        </p:nvSpPr>
+        <p:spPr/>
+        <p:txBody>
+          <a:bodyPr/>
+          <a:lstStyle/>
+          <a:p>
+            <a:fld id="{292A9FD8-515A-4698-9313-0AB17EE9632B}" type="slidenum">
+              <a:rPr lang="en-US" smtClean="0"/>
+              <a:t>13</a:t>
+            </a:fld>
+            <a:endParaRPr lang="en-US"/>
+          </a:p>
+        </p:txBody>
+      </p:sp>
+      <p:sp>
+        <p:nvSpPr>
+          <p:cNvPr id="4" name="TextBox 3">
+            <a:extLst>
+              <a:ext uri="{FF2B5EF4-FFF2-40B4-BE49-F238E27FC236}">
+                <a16:creationId xmlns:a16="http://schemas.microsoft.com/office/drawing/2014/main" id="{D643DD99-F8E6-4314-CA0C-0FDCCDFDA6AB}"/>
+              </a:ext>
+            </a:extLst>
+          </p:cNvPr>
+          <p:cNvSpPr txBox="1"/>
+          <p:nvPr/>
+        </p:nvSpPr>
+        <p:spPr>
+          <a:xfrm>
+            <a:off x="469557" y="1914771"/>
+            <a:ext cx="6862120" cy="1938992"/>
+          </a:xfrm>
+          <a:prstGeom prst="rect">
+            <a:avLst/>
+          </a:prstGeom>
+          <a:noFill/>
+        </p:spPr>
+        <p:txBody>
+          <a:bodyPr wrap="square" rtlCol="0">
+            <a:spAutoFit/>
+          </a:bodyPr>
+          <a:lstStyle/>
+          <a:p>
+            <a:pPr marL="342900" indent="-342900">
+              <a:buFont typeface="Arial" panose="020B0604020202020204" pitchFamily="34" charset="0"/>
+              <a:buChar char="•"/>
+            </a:pPr>
+            <a:r>
+              <a:rPr lang="en-US" sz="2400" dirty="0">
+                <a:solidFill>
+                  <a:srgbClr val="002060"/>
+                </a:solidFill>
+              </a:rPr>
+              <a:t>Generic </a:t>
+            </a:r>
+            <a:r>
+              <a:rPr lang="en-US" sz="2400" dirty="0" err="1">
+                <a:solidFill>
+                  <a:srgbClr val="002060"/>
+                </a:solidFill>
+              </a:rPr>
+              <a:t>Ocaml</a:t>
+            </a:r>
+            <a:r>
+              <a:rPr lang="en-US" sz="2400" dirty="0">
+                <a:solidFill>
+                  <a:srgbClr val="002060"/>
+                </a:solidFill>
+              </a:rPr>
+              <a:t> </a:t>
+            </a:r>
+            <a:r>
+              <a:rPr lang="en-US" sz="2400" dirty="0" err="1">
+                <a:solidFill>
+                  <a:srgbClr val="002060"/>
+                </a:solidFill>
+              </a:rPr>
+              <a:t>SPEcification</a:t>
+            </a:r>
+            <a:r>
+              <a:rPr lang="en-US" sz="2400" dirty="0">
+                <a:solidFill>
+                  <a:srgbClr val="002060"/>
+                </a:solidFill>
+              </a:rPr>
+              <a:t> Language</a:t>
+            </a:r>
+          </a:p>
+          <a:p>
+            <a:pPr marL="342900" indent="-342900">
+              <a:buFont typeface="Arial" panose="020B0604020202020204" pitchFamily="34" charset="0"/>
+              <a:buChar char="•"/>
+            </a:pPr>
+            <a:r>
+              <a:rPr lang="en-US" sz="2400" dirty="0">
+                <a:solidFill>
+                  <a:srgbClr val="002060"/>
+                </a:solidFill>
+              </a:rPr>
+              <a:t>Specification language for OCaml </a:t>
+            </a:r>
+          </a:p>
+          <a:p>
+            <a:pPr marL="342900" indent="-342900">
+              <a:buFont typeface="Arial" panose="020B0604020202020204" pitchFamily="34" charset="0"/>
+              <a:buChar char="•"/>
+            </a:pPr>
+            <a:r>
+              <a:rPr lang="en-US" sz="2400" dirty="0">
+                <a:solidFill>
+                  <a:srgbClr val="002060"/>
+                </a:solidFill>
+              </a:rPr>
+              <a:t>Allows program correctness verification</a:t>
+            </a:r>
+          </a:p>
+          <a:p>
+            <a:pPr marL="342900" indent="-342900">
+              <a:buFont typeface="Arial" panose="020B0604020202020204" pitchFamily="34" charset="0"/>
+              <a:buChar char="•"/>
+            </a:pPr>
+            <a:r>
+              <a:rPr lang="en-US" sz="2400" dirty="0">
+                <a:solidFill>
+                  <a:srgbClr val="002060"/>
+                </a:solidFill>
+              </a:rPr>
+              <a:t>Created to significantly improve conciseness and accessibility</a:t>
+            </a:r>
           </a:p>
         </p:txBody>
       </p:sp>
@@ -3371,7 +4923,164 @@
 </p:sld>
 </file>
 
-<file path=ppt/slides/slide13.xml><?xml version="1.0" encoding="utf-8"?>
+<file path=ppt/slides/slide14.xml><?xml version="1.0" encoding="utf-8"?>
+<p:sld xmlns:a="http://schemas.openxmlformats.org/drawingml/2006/main" xmlns:r="http://schemas.openxmlformats.org/officeDocument/2006/relationships" xmlns:p="http://schemas.openxmlformats.org/presentationml/2006/main">
+  <p:cSld>
+    <p:bg>
+      <p:bgPr>
+        <a:solidFill>
+          <a:srgbClr val="ACCFEE"/>
+        </a:solidFill>
+        <a:effectLst/>
+      </p:bgPr>
+    </p:bg>
+    <p:spTree>
+      <p:nvGrpSpPr>
+        <p:cNvPr id="1" name="">
+          <a:extLst>
+            <a:ext uri="{FF2B5EF4-FFF2-40B4-BE49-F238E27FC236}">
+              <a16:creationId xmlns:a16="http://schemas.microsoft.com/office/drawing/2014/main" id="{B78ABA0D-E7B8-D37A-9CAA-85B443DC6408}"/>
+            </a:ext>
+          </a:extLst>
+        </p:cNvPr>
+        <p:cNvGrpSpPr/>
+        <p:nvPr/>
+      </p:nvGrpSpPr>
+      <p:grpSpPr>
+        <a:xfrm>
+          <a:off x="0" y="0"/>
+          <a:ext cx="0" cy="0"/>
+          <a:chOff x="0" y="0"/>
+          <a:chExt cx="0" cy="0"/>
+        </a:xfrm>
+      </p:grpSpPr>
+      <p:sp>
+        <p:nvSpPr>
+          <p:cNvPr id="2" name="TextBox 1">
+            <a:extLst>
+              <a:ext uri="{FF2B5EF4-FFF2-40B4-BE49-F238E27FC236}">
+                <a16:creationId xmlns:a16="http://schemas.microsoft.com/office/drawing/2014/main" id="{964BFAD8-DE2F-306C-E460-00FC8DAEF77E}"/>
+              </a:ext>
+            </a:extLst>
+          </p:cNvPr>
+          <p:cNvSpPr txBox="1"/>
+          <p:nvPr/>
+        </p:nvSpPr>
+        <p:spPr>
+          <a:xfrm>
+            <a:off x="469556" y="626071"/>
+            <a:ext cx="4572000" cy="523220"/>
+          </a:xfrm>
+          <a:prstGeom prst="rect">
+            <a:avLst/>
+          </a:prstGeom>
+          <a:noFill/>
+        </p:spPr>
+        <p:txBody>
+          <a:bodyPr wrap="square" rtlCol="0">
+            <a:spAutoFit/>
+          </a:bodyPr>
+          <a:lstStyle/>
+          <a:p>
+            <a:r>
+              <a:rPr lang="en-US" sz="2800" noProof="0" dirty="0">
+                <a:solidFill>
+                  <a:srgbClr val="002060"/>
+                </a:solidFill>
+              </a:rPr>
+              <a:t>GOSPEL (2/2)</a:t>
+            </a:r>
+            <a:endParaRPr lang="en-US" sz="2800" noProof="0" dirty="0"/>
+          </a:p>
+        </p:txBody>
+      </p:sp>
+      <p:sp>
+        <p:nvSpPr>
+          <p:cNvPr id="3" name="Slide Number Placeholder 2">
+            <a:extLst>
+              <a:ext uri="{FF2B5EF4-FFF2-40B4-BE49-F238E27FC236}">
+                <a16:creationId xmlns:a16="http://schemas.microsoft.com/office/drawing/2014/main" id="{FB26C1B1-D7BF-5CD7-9CB6-125F0CD313F3}"/>
+              </a:ext>
+            </a:extLst>
+          </p:cNvPr>
+          <p:cNvSpPr>
+            <a:spLocks noGrp="1"/>
+          </p:cNvSpPr>
+          <p:nvPr>
+            <p:ph type="sldNum" sz="quarter" idx="12"/>
+          </p:nvPr>
+        </p:nvSpPr>
+        <p:spPr/>
+        <p:txBody>
+          <a:bodyPr/>
+          <a:lstStyle/>
+          <a:p>
+            <a:fld id="{292A9FD8-515A-4698-9313-0AB17EE9632B}" type="slidenum">
+              <a:rPr lang="en-US" smtClean="0"/>
+              <a:t>14</a:t>
+            </a:fld>
+            <a:endParaRPr lang="en-US"/>
+          </a:p>
+        </p:txBody>
+      </p:sp>
+      <p:sp>
+        <p:nvSpPr>
+          <p:cNvPr id="4" name="TextBox 3">
+            <a:extLst>
+              <a:ext uri="{FF2B5EF4-FFF2-40B4-BE49-F238E27FC236}">
+                <a16:creationId xmlns:a16="http://schemas.microsoft.com/office/drawing/2014/main" id="{45D2751A-C2A3-F300-EF75-02B8F62BD904}"/>
+              </a:ext>
+            </a:extLst>
+          </p:cNvPr>
+          <p:cNvSpPr txBox="1"/>
+          <p:nvPr/>
+        </p:nvSpPr>
+        <p:spPr>
+          <a:xfrm>
+            <a:off x="804733" y="2170144"/>
+            <a:ext cx="7710617" cy="461665"/>
+          </a:xfrm>
+          <a:prstGeom prst="rect">
+            <a:avLst/>
+          </a:prstGeom>
+          <a:noFill/>
+        </p:spPr>
+        <p:txBody>
+          <a:bodyPr wrap="square" rtlCol="0">
+            <a:spAutoFit/>
+          </a:bodyPr>
+          <a:lstStyle/>
+          <a:p>
+            <a:r>
+              <a:rPr lang="pt-PT" sz="2400" dirty="0">
+                <a:solidFill>
+                  <a:srgbClr val="002060"/>
+                </a:solidFill>
+              </a:rPr>
+              <a:t>METER CODIGO AQUI!!!</a:t>
+            </a:r>
+            <a:endParaRPr lang="en-US" sz="2400" dirty="0">
+              <a:solidFill>
+                <a:srgbClr val="002060"/>
+              </a:solidFill>
+            </a:endParaRPr>
+          </a:p>
+        </p:txBody>
+      </p:sp>
+    </p:spTree>
+    <p:extLst>
+      <p:ext uri="{BB962C8B-B14F-4D97-AF65-F5344CB8AC3E}">
+        <p14:creationId xmlns:p14="http://schemas.microsoft.com/office/powerpoint/2010/main" val="3908196888"/>
+      </p:ext>
+    </p:extLst>
+  </p:cSld>
+  <p:clrMapOvr>
+    <a:masterClrMapping/>
+  </p:clrMapOvr>
+</p:sld>
+</file>
+
+<file path=ppt/slides/slide15.xml><?xml version="1.0" encoding="utf-8"?>
 <p:sld xmlns:a="http://schemas.openxmlformats.org/drawingml/2006/main" xmlns:r="http://schemas.openxmlformats.org/officeDocument/2006/relationships" xmlns:p="http://schemas.openxmlformats.org/presentationml/2006/main">
   <p:cSld>
     <p:bg>
@@ -3442,6 +5151,35 @@
           </a:p>
         </p:txBody>
       </p:sp>
+      <p:sp>
+        <p:nvSpPr>
+          <p:cNvPr id="3" name="Slide Number Placeholder 2">
+            <a:extLst>
+              <a:ext uri="{FF2B5EF4-FFF2-40B4-BE49-F238E27FC236}">
+                <a16:creationId xmlns:a16="http://schemas.microsoft.com/office/drawing/2014/main" id="{D222C82B-2F77-7A79-7DDA-1242235B5E86}"/>
+              </a:ext>
+            </a:extLst>
+          </p:cNvPr>
+          <p:cNvSpPr>
+            <a:spLocks noGrp="1"/>
+          </p:cNvSpPr>
+          <p:nvPr>
+            <p:ph type="sldNum" sz="quarter" idx="12"/>
+          </p:nvPr>
+        </p:nvSpPr>
+        <p:spPr/>
+        <p:txBody>
+          <a:bodyPr/>
+          <a:lstStyle/>
+          <a:p>
+            <a:fld id="{292A9FD8-515A-4698-9313-0AB17EE9632B}" type="slidenum">
+              <a:rPr lang="en-US" smtClean="0"/>
+              <a:t>15</a:t>
+            </a:fld>
+            <a:endParaRPr lang="en-US"/>
+          </a:p>
+        </p:txBody>
+      </p:sp>
     </p:spTree>
     <p:extLst>
       <p:ext uri="{BB962C8B-B14F-4D97-AF65-F5344CB8AC3E}">
@@ -3455,7 +5193,7 @@
 </p:sld>
 </file>
 
-<file path=ppt/slides/slide14.xml><?xml version="1.0" encoding="utf-8"?>
+<file path=ppt/slides/slide16.xml><?xml version="1.0" encoding="utf-8"?>
 <p:sld xmlns:a="http://schemas.openxmlformats.org/drawingml/2006/main" xmlns:r="http://schemas.openxmlformats.org/officeDocument/2006/relationships" xmlns:p="http://schemas.openxmlformats.org/presentationml/2006/main">
   <p:cSld>
     <p:bg>
@@ -3527,6 +5265,35 @@
           </a:p>
         </p:txBody>
       </p:sp>
+      <p:sp>
+        <p:nvSpPr>
+          <p:cNvPr id="3" name="Slide Number Placeholder 2">
+            <a:extLst>
+              <a:ext uri="{FF2B5EF4-FFF2-40B4-BE49-F238E27FC236}">
+                <a16:creationId xmlns:a16="http://schemas.microsoft.com/office/drawing/2014/main" id="{0AB1438E-8A6B-6697-DA47-26A58669505D}"/>
+              </a:ext>
+            </a:extLst>
+          </p:cNvPr>
+          <p:cNvSpPr>
+            <a:spLocks noGrp="1"/>
+          </p:cNvSpPr>
+          <p:nvPr>
+            <p:ph type="sldNum" sz="quarter" idx="12"/>
+          </p:nvPr>
+        </p:nvSpPr>
+        <p:spPr/>
+        <p:txBody>
+          <a:bodyPr/>
+          <a:lstStyle/>
+          <a:p>
+            <a:fld id="{292A9FD8-515A-4698-9313-0AB17EE9632B}" type="slidenum">
+              <a:rPr lang="en-US" smtClean="0"/>
+              <a:t>16</a:t>
+            </a:fld>
+            <a:endParaRPr lang="en-US"/>
+          </a:p>
+        </p:txBody>
+      </p:sp>
     </p:spTree>
     <p:extLst>
       <p:ext uri="{BB962C8B-B14F-4D97-AF65-F5344CB8AC3E}">
@@ -3540,7 +5307,7 @@
 </p:sld>
 </file>
 
-<file path=ppt/slides/slide15.xml><?xml version="1.0" encoding="utf-8"?>
+<file path=ppt/slides/slide17.xml><?xml version="1.0" encoding="utf-8"?>
 <p:sld xmlns:a="http://schemas.openxmlformats.org/drawingml/2006/main" xmlns:r="http://schemas.openxmlformats.org/officeDocument/2006/relationships" xmlns:p="http://schemas.openxmlformats.org/presentationml/2006/main">
   <p:cSld>
     <p:bg>
@@ -3611,6 +5378,35 @@
           </a:p>
         </p:txBody>
       </p:sp>
+      <p:sp>
+        <p:nvSpPr>
+          <p:cNvPr id="3" name="Slide Number Placeholder 2">
+            <a:extLst>
+              <a:ext uri="{FF2B5EF4-FFF2-40B4-BE49-F238E27FC236}">
+                <a16:creationId xmlns:a16="http://schemas.microsoft.com/office/drawing/2014/main" id="{1742F2B1-B8DC-7E54-228C-BF7A0E92C694}"/>
+              </a:ext>
+            </a:extLst>
+          </p:cNvPr>
+          <p:cNvSpPr>
+            <a:spLocks noGrp="1"/>
+          </p:cNvSpPr>
+          <p:nvPr>
+            <p:ph type="sldNum" sz="quarter" idx="12"/>
+          </p:nvPr>
+        </p:nvSpPr>
+        <p:spPr/>
+        <p:txBody>
+          <a:bodyPr/>
+          <a:lstStyle/>
+          <a:p>
+            <a:fld id="{292A9FD8-515A-4698-9313-0AB17EE9632B}" type="slidenum">
+              <a:rPr lang="en-US" smtClean="0"/>
+              <a:t>17</a:t>
+            </a:fld>
+            <a:endParaRPr lang="en-US"/>
+          </a:p>
+        </p:txBody>
+      </p:sp>
     </p:spTree>
     <p:extLst>
       <p:ext uri="{BB962C8B-B14F-4D97-AF65-F5344CB8AC3E}">
@@ -3624,7 +5420,7 @@
 </p:sld>
 </file>
 
-<file path=ppt/slides/slide16.xml><?xml version="1.0" encoding="utf-8"?>
+<file path=ppt/slides/slide18.xml><?xml version="1.0" encoding="utf-8"?>
 <p:sld xmlns:a="http://schemas.openxmlformats.org/drawingml/2006/main" xmlns:r="http://schemas.openxmlformats.org/officeDocument/2006/relationships" xmlns:p="http://schemas.openxmlformats.org/presentationml/2006/main">
   <p:cSld>
     <p:bg>
@@ -3695,6 +5491,35 @@
           </a:p>
         </p:txBody>
       </p:sp>
+      <p:sp>
+        <p:nvSpPr>
+          <p:cNvPr id="3" name="Slide Number Placeholder 2">
+            <a:extLst>
+              <a:ext uri="{FF2B5EF4-FFF2-40B4-BE49-F238E27FC236}">
+                <a16:creationId xmlns:a16="http://schemas.microsoft.com/office/drawing/2014/main" id="{716EBFA2-5D5A-6C82-B9B9-F3B1DAC2B03E}"/>
+              </a:ext>
+            </a:extLst>
+          </p:cNvPr>
+          <p:cNvSpPr>
+            <a:spLocks noGrp="1"/>
+          </p:cNvSpPr>
+          <p:nvPr>
+            <p:ph type="sldNum" sz="quarter" idx="12"/>
+          </p:nvPr>
+        </p:nvSpPr>
+        <p:spPr/>
+        <p:txBody>
+          <a:bodyPr/>
+          <a:lstStyle/>
+          <a:p>
+            <a:fld id="{292A9FD8-515A-4698-9313-0AB17EE9632B}" type="slidenum">
+              <a:rPr lang="en-US" smtClean="0"/>
+              <a:t>18</a:t>
+            </a:fld>
+            <a:endParaRPr lang="en-US"/>
+          </a:p>
+        </p:txBody>
+      </p:sp>
     </p:spTree>
     <p:extLst>
       <p:ext uri="{BB962C8B-B14F-4D97-AF65-F5344CB8AC3E}">
@@ -3708,7 +5533,7 @@
 </p:sld>
 </file>
 
-<file path=ppt/slides/slide17.xml><?xml version="1.0" encoding="utf-8"?>
+<file path=ppt/slides/slide19.xml><?xml version="1.0" encoding="utf-8"?>
 <p:sld xmlns:a="http://schemas.openxmlformats.org/drawingml/2006/main" xmlns:r="http://schemas.openxmlformats.org/officeDocument/2006/relationships" xmlns:p="http://schemas.openxmlformats.org/presentationml/2006/main">
   <p:cSld>
     <p:bg>
@@ -3779,179 +5604,39 @@
           </a:p>
         </p:txBody>
       </p:sp>
+      <p:sp>
+        <p:nvSpPr>
+          <p:cNvPr id="3" name="Slide Number Placeholder 2">
+            <a:extLst>
+              <a:ext uri="{FF2B5EF4-FFF2-40B4-BE49-F238E27FC236}">
+                <a16:creationId xmlns:a16="http://schemas.microsoft.com/office/drawing/2014/main" id="{C00DCCA8-A512-AF89-8E53-0E47BD0D13BB}"/>
+              </a:ext>
+            </a:extLst>
+          </p:cNvPr>
+          <p:cNvSpPr>
+            <a:spLocks noGrp="1"/>
+          </p:cNvSpPr>
+          <p:nvPr>
+            <p:ph type="sldNum" sz="quarter" idx="12"/>
+          </p:nvPr>
+        </p:nvSpPr>
+        <p:spPr/>
+        <p:txBody>
+          <a:bodyPr/>
+          <a:lstStyle/>
+          <a:p>
+            <a:fld id="{292A9FD8-515A-4698-9313-0AB17EE9632B}" type="slidenum">
+              <a:rPr lang="en-US" smtClean="0"/>
+              <a:t>19</a:t>
+            </a:fld>
+            <a:endParaRPr lang="en-US"/>
+          </a:p>
+        </p:txBody>
+      </p:sp>
     </p:spTree>
     <p:extLst>
       <p:ext uri="{BB962C8B-B14F-4D97-AF65-F5344CB8AC3E}">
         <p14:creationId xmlns:p14="http://schemas.microsoft.com/office/powerpoint/2010/main" val="3095269486"/>
-      </p:ext>
-    </p:extLst>
-  </p:cSld>
-  <p:clrMapOvr>
-    <a:masterClrMapping/>
-  </p:clrMapOvr>
-</p:sld>
-</file>
-
-<file path=ppt/slides/slide18.xml><?xml version="1.0" encoding="utf-8"?>
-<p:sld xmlns:a="http://schemas.openxmlformats.org/drawingml/2006/main" xmlns:r="http://schemas.openxmlformats.org/officeDocument/2006/relationships" xmlns:p="http://schemas.openxmlformats.org/presentationml/2006/main">
-  <p:cSld>
-    <p:bg>
-      <p:bgPr>
-        <a:solidFill>
-          <a:srgbClr val="ACCFEE"/>
-        </a:solidFill>
-        <a:effectLst/>
-      </p:bgPr>
-    </p:bg>
-    <p:spTree>
-      <p:nvGrpSpPr>
-        <p:cNvPr id="1" name="">
-          <a:extLst>
-            <a:ext uri="{FF2B5EF4-FFF2-40B4-BE49-F238E27FC236}">
-              <a16:creationId xmlns:a16="http://schemas.microsoft.com/office/drawing/2014/main" id="{D06BF774-DAF6-04AA-B846-88FEF29D648D}"/>
-            </a:ext>
-          </a:extLst>
-        </p:cNvPr>
-        <p:cNvGrpSpPr/>
-        <p:nvPr/>
-      </p:nvGrpSpPr>
-      <p:grpSpPr>
-        <a:xfrm>
-          <a:off x="0" y="0"/>
-          <a:ext cx="0" cy="0"/>
-          <a:chOff x="0" y="0"/>
-          <a:chExt cx="0" cy="0"/>
-        </a:xfrm>
-      </p:grpSpPr>
-      <p:sp>
-        <p:nvSpPr>
-          <p:cNvPr id="2" name="TextBox 1">
-            <a:extLst>
-              <a:ext uri="{FF2B5EF4-FFF2-40B4-BE49-F238E27FC236}">
-                <a16:creationId xmlns:a16="http://schemas.microsoft.com/office/drawing/2014/main" id="{BB6911FF-7AF3-1FFC-DC78-37B8865008FC}"/>
-              </a:ext>
-            </a:extLst>
-          </p:cNvPr>
-          <p:cNvSpPr txBox="1"/>
-          <p:nvPr/>
-        </p:nvSpPr>
-        <p:spPr>
-          <a:xfrm>
-            <a:off x="469556" y="626071"/>
-            <a:ext cx="4572000" cy="523220"/>
-          </a:xfrm>
-          <a:prstGeom prst="rect">
-            <a:avLst/>
-          </a:prstGeom>
-          <a:noFill/>
-        </p:spPr>
-        <p:txBody>
-          <a:bodyPr wrap="square" rtlCol="0">
-            <a:spAutoFit/>
-          </a:bodyPr>
-          <a:lstStyle/>
-          <a:p>
-            <a:r>
-              <a:rPr lang="en-US" sz="2800" noProof="0" dirty="0">
-                <a:solidFill>
-                  <a:srgbClr val="002060"/>
-                </a:solidFill>
-              </a:rPr>
-              <a:t>Program Equivalence</a:t>
-            </a:r>
-            <a:endParaRPr lang="en-US" sz="2800" noProof="0" dirty="0"/>
-          </a:p>
-        </p:txBody>
-      </p:sp>
-    </p:spTree>
-    <p:extLst>
-      <p:ext uri="{BB962C8B-B14F-4D97-AF65-F5344CB8AC3E}">
-        <p14:creationId xmlns:p14="http://schemas.microsoft.com/office/powerpoint/2010/main" val="2206171122"/>
-      </p:ext>
-    </p:extLst>
-  </p:cSld>
-  <p:clrMapOvr>
-    <a:masterClrMapping/>
-  </p:clrMapOvr>
-</p:sld>
-</file>
-
-<file path=ppt/slides/slide19.xml><?xml version="1.0" encoding="utf-8"?>
-<p:sld xmlns:a="http://schemas.openxmlformats.org/drawingml/2006/main" xmlns:r="http://schemas.openxmlformats.org/officeDocument/2006/relationships" xmlns:p="http://schemas.openxmlformats.org/presentationml/2006/main">
-  <p:cSld>
-    <p:bg>
-      <p:bgPr>
-        <a:solidFill>
-          <a:srgbClr val="ACCFEE"/>
-        </a:solidFill>
-        <a:effectLst/>
-      </p:bgPr>
-    </p:bg>
-    <p:spTree>
-      <p:nvGrpSpPr>
-        <p:cNvPr id="1" name="">
-          <a:extLst>
-            <a:ext uri="{FF2B5EF4-FFF2-40B4-BE49-F238E27FC236}">
-              <a16:creationId xmlns:a16="http://schemas.microsoft.com/office/drawing/2014/main" id="{34BB6573-AE68-E606-5028-F477F5DCABAB}"/>
-            </a:ext>
-          </a:extLst>
-        </p:cNvPr>
-        <p:cNvGrpSpPr/>
-        <p:nvPr/>
-      </p:nvGrpSpPr>
-      <p:grpSpPr>
-        <a:xfrm>
-          <a:off x="0" y="0"/>
-          <a:ext cx="0" cy="0"/>
-          <a:chOff x="0" y="0"/>
-          <a:chExt cx="0" cy="0"/>
-        </a:xfrm>
-      </p:grpSpPr>
-      <p:sp>
-        <p:nvSpPr>
-          <p:cNvPr id="2" name="TextBox 1">
-            <a:extLst>
-              <a:ext uri="{FF2B5EF4-FFF2-40B4-BE49-F238E27FC236}">
-                <a16:creationId xmlns:a16="http://schemas.microsoft.com/office/drawing/2014/main" id="{BAD11615-3F81-E543-EE9B-3433E85F0FD7}"/>
-              </a:ext>
-            </a:extLst>
-          </p:cNvPr>
-          <p:cNvSpPr txBox="1"/>
-          <p:nvPr/>
-        </p:nvSpPr>
-        <p:spPr>
-          <a:xfrm>
-            <a:off x="1190368" y="2026503"/>
-            <a:ext cx="6763264" cy="830997"/>
-          </a:xfrm>
-          <a:prstGeom prst="rect">
-            <a:avLst/>
-          </a:prstGeom>
-          <a:noFill/>
-        </p:spPr>
-        <p:txBody>
-          <a:bodyPr wrap="square" rtlCol="0">
-            <a:spAutoFit/>
-          </a:bodyPr>
-          <a:lstStyle/>
-          <a:p>
-            <a:pPr algn="ctr"/>
-            <a:r>
-              <a:rPr lang="en-US" sz="4800" noProof="0" dirty="0">
-                <a:solidFill>
-                  <a:srgbClr val="002060"/>
-                </a:solidFill>
-              </a:rPr>
-              <a:t>Preliminary Results</a:t>
-            </a:r>
-            <a:endParaRPr lang="en-US" sz="4800" noProof="0" dirty="0"/>
-          </a:p>
-        </p:txBody>
-      </p:sp>
-    </p:spTree>
-    <p:extLst>
-      <p:ext uri="{BB962C8B-B14F-4D97-AF65-F5344CB8AC3E}">
-        <p14:creationId xmlns:p14="http://schemas.microsoft.com/office/powerpoint/2010/main" val="3181731804"/>
       </p:ext>
     </p:extLst>
   </p:cSld>
@@ -4132,6 +5817,35 @@
           </a:p>
         </p:txBody>
       </p:sp>
+      <p:sp>
+        <p:nvSpPr>
+          <p:cNvPr id="4" name="Slide Number Placeholder 3">
+            <a:extLst>
+              <a:ext uri="{FF2B5EF4-FFF2-40B4-BE49-F238E27FC236}">
+                <a16:creationId xmlns:a16="http://schemas.microsoft.com/office/drawing/2014/main" id="{C8DA381D-06C1-EC60-F50A-82AED36CBF68}"/>
+              </a:ext>
+            </a:extLst>
+          </p:cNvPr>
+          <p:cNvSpPr>
+            <a:spLocks noGrp="1"/>
+          </p:cNvSpPr>
+          <p:nvPr>
+            <p:ph type="sldNum" sz="quarter" idx="12"/>
+          </p:nvPr>
+        </p:nvSpPr>
+        <p:spPr/>
+        <p:txBody>
+          <a:bodyPr/>
+          <a:lstStyle/>
+          <a:p>
+            <a:fld id="{292A9FD8-515A-4698-9313-0AB17EE9632B}" type="slidenum">
+              <a:rPr lang="en-US" smtClean="0"/>
+              <a:t>2</a:t>
+            </a:fld>
+            <a:endParaRPr lang="en-US"/>
+          </a:p>
+        </p:txBody>
+      </p:sp>
     </p:spTree>
     <p:extLst>
       <p:ext uri="{BB962C8B-B14F-4D97-AF65-F5344CB8AC3E}">
@@ -4146,6 +5860,233 @@
 </file>
 
 <file path=ppt/slides/slide20.xml><?xml version="1.0" encoding="utf-8"?>
+<p:sld xmlns:a="http://schemas.openxmlformats.org/drawingml/2006/main" xmlns:r="http://schemas.openxmlformats.org/officeDocument/2006/relationships" xmlns:p="http://schemas.openxmlformats.org/presentationml/2006/main">
+  <p:cSld>
+    <p:bg>
+      <p:bgPr>
+        <a:solidFill>
+          <a:srgbClr val="ACCFEE"/>
+        </a:solidFill>
+        <a:effectLst/>
+      </p:bgPr>
+    </p:bg>
+    <p:spTree>
+      <p:nvGrpSpPr>
+        <p:cNvPr id="1" name="">
+          <a:extLst>
+            <a:ext uri="{FF2B5EF4-FFF2-40B4-BE49-F238E27FC236}">
+              <a16:creationId xmlns:a16="http://schemas.microsoft.com/office/drawing/2014/main" id="{D06BF774-DAF6-04AA-B846-88FEF29D648D}"/>
+            </a:ext>
+          </a:extLst>
+        </p:cNvPr>
+        <p:cNvGrpSpPr/>
+        <p:nvPr/>
+      </p:nvGrpSpPr>
+      <p:grpSpPr>
+        <a:xfrm>
+          <a:off x="0" y="0"/>
+          <a:ext cx="0" cy="0"/>
+          <a:chOff x="0" y="0"/>
+          <a:chExt cx="0" cy="0"/>
+        </a:xfrm>
+      </p:grpSpPr>
+      <p:sp>
+        <p:nvSpPr>
+          <p:cNvPr id="2" name="TextBox 1">
+            <a:extLst>
+              <a:ext uri="{FF2B5EF4-FFF2-40B4-BE49-F238E27FC236}">
+                <a16:creationId xmlns:a16="http://schemas.microsoft.com/office/drawing/2014/main" id="{BB6911FF-7AF3-1FFC-DC78-37B8865008FC}"/>
+              </a:ext>
+            </a:extLst>
+          </p:cNvPr>
+          <p:cNvSpPr txBox="1"/>
+          <p:nvPr/>
+        </p:nvSpPr>
+        <p:spPr>
+          <a:xfrm>
+            <a:off x="469556" y="626071"/>
+            <a:ext cx="4572000" cy="523220"/>
+          </a:xfrm>
+          <a:prstGeom prst="rect">
+            <a:avLst/>
+          </a:prstGeom>
+          <a:noFill/>
+        </p:spPr>
+        <p:txBody>
+          <a:bodyPr wrap="square" rtlCol="0">
+            <a:spAutoFit/>
+          </a:bodyPr>
+          <a:lstStyle/>
+          <a:p>
+            <a:r>
+              <a:rPr lang="en-US" sz="2800" noProof="0" dirty="0">
+                <a:solidFill>
+                  <a:srgbClr val="002060"/>
+                </a:solidFill>
+              </a:rPr>
+              <a:t>Program Equivalence</a:t>
+            </a:r>
+            <a:endParaRPr lang="en-US" sz="2800" noProof="0" dirty="0"/>
+          </a:p>
+        </p:txBody>
+      </p:sp>
+      <p:sp>
+        <p:nvSpPr>
+          <p:cNvPr id="3" name="Slide Number Placeholder 2">
+            <a:extLst>
+              <a:ext uri="{FF2B5EF4-FFF2-40B4-BE49-F238E27FC236}">
+                <a16:creationId xmlns:a16="http://schemas.microsoft.com/office/drawing/2014/main" id="{5C57013F-A6E4-D132-5129-7FE416451B9B}"/>
+              </a:ext>
+            </a:extLst>
+          </p:cNvPr>
+          <p:cNvSpPr>
+            <a:spLocks noGrp="1"/>
+          </p:cNvSpPr>
+          <p:nvPr>
+            <p:ph type="sldNum" sz="quarter" idx="12"/>
+          </p:nvPr>
+        </p:nvSpPr>
+        <p:spPr/>
+        <p:txBody>
+          <a:bodyPr/>
+          <a:lstStyle/>
+          <a:p>
+            <a:fld id="{292A9FD8-515A-4698-9313-0AB17EE9632B}" type="slidenum">
+              <a:rPr lang="en-US" smtClean="0"/>
+              <a:t>20</a:t>
+            </a:fld>
+            <a:endParaRPr lang="en-US"/>
+          </a:p>
+        </p:txBody>
+      </p:sp>
+    </p:spTree>
+    <p:extLst>
+      <p:ext uri="{BB962C8B-B14F-4D97-AF65-F5344CB8AC3E}">
+        <p14:creationId xmlns:p14="http://schemas.microsoft.com/office/powerpoint/2010/main" val="2206171122"/>
+      </p:ext>
+    </p:extLst>
+  </p:cSld>
+  <p:clrMapOvr>
+    <a:masterClrMapping/>
+  </p:clrMapOvr>
+</p:sld>
+</file>
+
+<file path=ppt/slides/slide21.xml><?xml version="1.0" encoding="utf-8"?>
+<p:sld xmlns:a="http://schemas.openxmlformats.org/drawingml/2006/main" xmlns:r="http://schemas.openxmlformats.org/officeDocument/2006/relationships" xmlns:p="http://schemas.openxmlformats.org/presentationml/2006/main">
+  <p:cSld>
+    <p:bg>
+      <p:bgPr>
+        <a:solidFill>
+          <a:srgbClr val="ACCFEE"/>
+        </a:solidFill>
+        <a:effectLst/>
+      </p:bgPr>
+    </p:bg>
+    <p:spTree>
+      <p:nvGrpSpPr>
+        <p:cNvPr id="1" name="">
+          <a:extLst>
+            <a:ext uri="{FF2B5EF4-FFF2-40B4-BE49-F238E27FC236}">
+              <a16:creationId xmlns:a16="http://schemas.microsoft.com/office/drawing/2014/main" id="{34BB6573-AE68-E606-5028-F477F5DCABAB}"/>
+            </a:ext>
+          </a:extLst>
+        </p:cNvPr>
+        <p:cNvGrpSpPr/>
+        <p:nvPr/>
+      </p:nvGrpSpPr>
+      <p:grpSpPr>
+        <a:xfrm>
+          <a:off x="0" y="0"/>
+          <a:ext cx="0" cy="0"/>
+          <a:chOff x="0" y="0"/>
+          <a:chExt cx="0" cy="0"/>
+        </a:xfrm>
+      </p:grpSpPr>
+      <p:sp>
+        <p:nvSpPr>
+          <p:cNvPr id="2" name="TextBox 1">
+            <a:extLst>
+              <a:ext uri="{FF2B5EF4-FFF2-40B4-BE49-F238E27FC236}">
+                <a16:creationId xmlns:a16="http://schemas.microsoft.com/office/drawing/2014/main" id="{BAD11615-3F81-E543-EE9B-3433E85F0FD7}"/>
+              </a:ext>
+            </a:extLst>
+          </p:cNvPr>
+          <p:cNvSpPr txBox="1"/>
+          <p:nvPr/>
+        </p:nvSpPr>
+        <p:spPr>
+          <a:xfrm>
+            <a:off x="1190368" y="2026503"/>
+            <a:ext cx="6763264" cy="830997"/>
+          </a:xfrm>
+          <a:prstGeom prst="rect">
+            <a:avLst/>
+          </a:prstGeom>
+          <a:noFill/>
+        </p:spPr>
+        <p:txBody>
+          <a:bodyPr wrap="square" rtlCol="0">
+            <a:spAutoFit/>
+          </a:bodyPr>
+          <a:lstStyle/>
+          <a:p>
+            <a:pPr algn="ctr"/>
+            <a:r>
+              <a:rPr lang="en-US" sz="4800" noProof="0" dirty="0">
+                <a:solidFill>
+                  <a:srgbClr val="002060"/>
+                </a:solidFill>
+              </a:rPr>
+              <a:t>Preliminary Results</a:t>
+            </a:r>
+            <a:endParaRPr lang="en-US" sz="4800" noProof="0" dirty="0"/>
+          </a:p>
+        </p:txBody>
+      </p:sp>
+      <p:sp>
+        <p:nvSpPr>
+          <p:cNvPr id="3" name="Slide Number Placeholder 2">
+            <a:extLst>
+              <a:ext uri="{FF2B5EF4-FFF2-40B4-BE49-F238E27FC236}">
+                <a16:creationId xmlns:a16="http://schemas.microsoft.com/office/drawing/2014/main" id="{CCC4028F-0FBD-78C7-E826-C6832D4221AB}"/>
+              </a:ext>
+            </a:extLst>
+          </p:cNvPr>
+          <p:cNvSpPr>
+            <a:spLocks noGrp="1"/>
+          </p:cNvSpPr>
+          <p:nvPr>
+            <p:ph type="sldNum" sz="quarter" idx="12"/>
+          </p:nvPr>
+        </p:nvSpPr>
+        <p:spPr/>
+        <p:txBody>
+          <a:bodyPr/>
+          <a:lstStyle/>
+          <a:p>
+            <a:fld id="{292A9FD8-515A-4698-9313-0AB17EE9632B}" type="slidenum">
+              <a:rPr lang="en-US" smtClean="0"/>
+              <a:t>21</a:t>
+            </a:fld>
+            <a:endParaRPr lang="en-US"/>
+          </a:p>
+        </p:txBody>
+      </p:sp>
+    </p:spTree>
+    <p:extLst>
+      <p:ext uri="{BB962C8B-B14F-4D97-AF65-F5344CB8AC3E}">
+        <p14:creationId xmlns:p14="http://schemas.microsoft.com/office/powerpoint/2010/main" val="3181731804"/>
+      </p:ext>
+    </p:extLst>
+  </p:cSld>
+  <p:clrMapOvr>
+    <a:masterClrMapping/>
+  </p:clrMapOvr>
+</p:sld>
+</file>
+
+<file path=ppt/slides/slide22.xml><?xml version="1.0" encoding="utf-8"?>
 <p:sld xmlns:a="http://schemas.openxmlformats.org/drawingml/2006/main" xmlns:r="http://schemas.openxmlformats.org/officeDocument/2006/relationships" xmlns:p="http://schemas.openxmlformats.org/presentationml/2006/main">
   <p:cSld>
     <p:bg>
@@ -4216,6 +6157,35 @@
           </a:p>
         </p:txBody>
       </p:sp>
+      <p:sp>
+        <p:nvSpPr>
+          <p:cNvPr id="3" name="Slide Number Placeholder 2">
+            <a:extLst>
+              <a:ext uri="{FF2B5EF4-FFF2-40B4-BE49-F238E27FC236}">
+                <a16:creationId xmlns:a16="http://schemas.microsoft.com/office/drawing/2014/main" id="{032D9266-7A53-3653-0A3D-9BF387ACFD88}"/>
+              </a:ext>
+            </a:extLst>
+          </p:cNvPr>
+          <p:cNvSpPr>
+            <a:spLocks noGrp="1"/>
+          </p:cNvSpPr>
+          <p:nvPr>
+            <p:ph type="sldNum" sz="quarter" idx="12"/>
+          </p:nvPr>
+        </p:nvSpPr>
+        <p:spPr/>
+        <p:txBody>
+          <a:bodyPr/>
+          <a:lstStyle/>
+          <a:p>
+            <a:fld id="{292A9FD8-515A-4698-9313-0AB17EE9632B}" type="slidenum">
+              <a:rPr lang="en-US" smtClean="0"/>
+              <a:t>22</a:t>
+            </a:fld>
+            <a:endParaRPr lang="en-US"/>
+          </a:p>
+        </p:txBody>
+      </p:sp>
     </p:spTree>
     <p:extLst>
       <p:ext uri="{BB962C8B-B14F-4D97-AF65-F5344CB8AC3E}">
@@ -4229,7 +6199,7 @@
 </p:sld>
 </file>
 
-<file path=ppt/slides/slide21.xml><?xml version="1.0" encoding="utf-8"?>
+<file path=ppt/slides/slide23.xml><?xml version="1.0" encoding="utf-8"?>
 <p:sld xmlns:a="http://schemas.openxmlformats.org/drawingml/2006/main" xmlns:r="http://schemas.openxmlformats.org/officeDocument/2006/relationships" xmlns:p="http://schemas.openxmlformats.org/presentationml/2006/main">
   <p:cSld>
     <p:bg>
@@ -4300,6 +6270,35 @@
           </a:p>
         </p:txBody>
       </p:sp>
+      <p:sp>
+        <p:nvSpPr>
+          <p:cNvPr id="3" name="Slide Number Placeholder 2">
+            <a:extLst>
+              <a:ext uri="{FF2B5EF4-FFF2-40B4-BE49-F238E27FC236}">
+                <a16:creationId xmlns:a16="http://schemas.microsoft.com/office/drawing/2014/main" id="{A2790DA9-F599-59FB-0135-024CFF9CE765}"/>
+              </a:ext>
+            </a:extLst>
+          </p:cNvPr>
+          <p:cNvSpPr>
+            <a:spLocks noGrp="1"/>
+          </p:cNvSpPr>
+          <p:nvPr>
+            <p:ph type="sldNum" sz="quarter" idx="12"/>
+          </p:nvPr>
+        </p:nvSpPr>
+        <p:spPr/>
+        <p:txBody>
+          <a:bodyPr/>
+          <a:lstStyle/>
+          <a:p>
+            <a:fld id="{292A9FD8-515A-4698-9313-0AB17EE9632B}" type="slidenum">
+              <a:rPr lang="en-US" smtClean="0"/>
+              <a:t>23</a:t>
+            </a:fld>
+            <a:endParaRPr lang="en-US"/>
+          </a:p>
+        </p:txBody>
+      </p:sp>
     </p:spTree>
     <p:extLst>
       <p:ext uri="{BB962C8B-B14F-4D97-AF65-F5344CB8AC3E}">
@@ -4313,7 +6312,7 @@
 </p:sld>
 </file>
 
-<file path=ppt/slides/slide22.xml><?xml version="1.0" encoding="utf-8"?>
+<file path=ppt/slides/slide24.xml><?xml version="1.0" encoding="utf-8"?>
 <p:sld xmlns:a="http://schemas.openxmlformats.org/drawingml/2006/main" xmlns:r="http://schemas.openxmlformats.org/officeDocument/2006/relationships" xmlns:p="http://schemas.openxmlformats.org/presentationml/2006/main">
   <p:cSld>
     <p:bg>
@@ -4385,6 +6384,35 @@
           </a:p>
         </p:txBody>
       </p:sp>
+      <p:sp>
+        <p:nvSpPr>
+          <p:cNvPr id="3" name="Slide Number Placeholder 2">
+            <a:extLst>
+              <a:ext uri="{FF2B5EF4-FFF2-40B4-BE49-F238E27FC236}">
+                <a16:creationId xmlns:a16="http://schemas.microsoft.com/office/drawing/2014/main" id="{A15BE622-DA9D-6404-5ADC-95292C97057E}"/>
+              </a:ext>
+            </a:extLst>
+          </p:cNvPr>
+          <p:cNvSpPr>
+            <a:spLocks noGrp="1"/>
+          </p:cNvSpPr>
+          <p:nvPr>
+            <p:ph type="sldNum" sz="quarter" idx="12"/>
+          </p:nvPr>
+        </p:nvSpPr>
+        <p:spPr/>
+        <p:txBody>
+          <a:bodyPr/>
+          <a:lstStyle/>
+          <a:p>
+            <a:fld id="{292A9FD8-515A-4698-9313-0AB17EE9632B}" type="slidenum">
+              <a:rPr lang="en-US" smtClean="0"/>
+              <a:t>24</a:t>
+            </a:fld>
+            <a:endParaRPr lang="en-US"/>
+          </a:p>
+        </p:txBody>
+      </p:sp>
     </p:spTree>
     <p:extLst>
       <p:ext uri="{BB962C8B-B14F-4D97-AF65-F5344CB8AC3E}">
@@ -4398,7 +6426,7 @@
 </p:sld>
 </file>
 
-<file path=ppt/slides/slide23.xml><?xml version="1.0" encoding="utf-8"?>
+<file path=ppt/slides/slide25.xml><?xml version="1.0" encoding="utf-8"?>
 <p:sld xmlns:a="http://schemas.openxmlformats.org/drawingml/2006/main" xmlns:r="http://schemas.openxmlformats.org/officeDocument/2006/relationships" xmlns:p="http://schemas.openxmlformats.org/presentationml/2006/main">
   <p:cSld>
     <p:bg>
@@ -4618,6 +6646,35 @@
           </a:prstGeom>
         </p:spPr>
       </p:pic>
+      <p:sp>
+        <p:nvSpPr>
+          <p:cNvPr id="3" name="Slide Number Placeholder 2">
+            <a:extLst>
+              <a:ext uri="{FF2B5EF4-FFF2-40B4-BE49-F238E27FC236}">
+                <a16:creationId xmlns:a16="http://schemas.microsoft.com/office/drawing/2014/main" id="{16CEE43D-0441-A2DA-4517-2B20BDB562B4}"/>
+              </a:ext>
+            </a:extLst>
+          </p:cNvPr>
+          <p:cNvSpPr>
+            <a:spLocks noGrp="1"/>
+          </p:cNvSpPr>
+          <p:nvPr>
+            <p:ph type="sldNum" sz="quarter" idx="12"/>
+          </p:nvPr>
+        </p:nvSpPr>
+        <p:spPr/>
+        <p:txBody>
+          <a:bodyPr/>
+          <a:lstStyle/>
+          <a:p>
+            <a:fld id="{292A9FD8-515A-4698-9313-0AB17EE9632B}" type="slidenum">
+              <a:rPr lang="en-US" smtClean="0"/>
+              <a:t>25</a:t>
+            </a:fld>
+            <a:endParaRPr lang="en-US"/>
+          </a:p>
+        </p:txBody>
+      </p:sp>
     </p:spTree>
     <p:extLst>
       <p:ext uri="{BB962C8B-B14F-4D97-AF65-F5344CB8AC3E}">
@@ -4703,6 +6760,35 @@
           </a:p>
         </p:txBody>
       </p:sp>
+      <p:sp>
+        <p:nvSpPr>
+          <p:cNvPr id="3" name="Slide Number Placeholder 2">
+            <a:extLst>
+              <a:ext uri="{FF2B5EF4-FFF2-40B4-BE49-F238E27FC236}">
+                <a16:creationId xmlns:a16="http://schemas.microsoft.com/office/drawing/2014/main" id="{60E17B46-9576-9F39-6D43-F7A53EE407F8}"/>
+              </a:ext>
+            </a:extLst>
+          </p:cNvPr>
+          <p:cNvSpPr>
+            <a:spLocks noGrp="1"/>
+          </p:cNvSpPr>
+          <p:nvPr>
+            <p:ph type="sldNum" sz="quarter" idx="12"/>
+          </p:nvPr>
+        </p:nvSpPr>
+        <p:spPr/>
+        <p:txBody>
+          <a:bodyPr/>
+          <a:lstStyle/>
+          <a:p>
+            <a:fld id="{292A9FD8-515A-4698-9313-0AB17EE9632B}" type="slidenum">
+              <a:rPr lang="en-US" smtClean="0"/>
+              <a:t>3</a:t>
+            </a:fld>
+            <a:endParaRPr lang="en-US"/>
+          </a:p>
+        </p:txBody>
+      </p:sp>
     </p:spTree>
     <p:extLst>
       <p:ext uri="{BB962C8B-B14F-4D97-AF65-F5344CB8AC3E}">
@@ -5055,6 +7141,35 @@
           </a:p>
         </p:txBody>
       </p:sp>
+      <p:sp>
+        <p:nvSpPr>
+          <p:cNvPr id="5" name="Slide Number Placeholder 4">
+            <a:extLst>
+              <a:ext uri="{FF2B5EF4-FFF2-40B4-BE49-F238E27FC236}">
+                <a16:creationId xmlns:a16="http://schemas.microsoft.com/office/drawing/2014/main" id="{D2F622D3-7468-9FE5-A9F2-5AF134EA2DFD}"/>
+              </a:ext>
+            </a:extLst>
+          </p:cNvPr>
+          <p:cNvSpPr>
+            <a:spLocks noGrp="1"/>
+          </p:cNvSpPr>
+          <p:nvPr>
+            <p:ph type="sldNum" sz="quarter" idx="12"/>
+          </p:nvPr>
+        </p:nvSpPr>
+        <p:spPr/>
+        <p:txBody>
+          <a:bodyPr/>
+          <a:lstStyle/>
+          <a:p>
+            <a:fld id="{292A9FD8-515A-4698-9313-0AB17EE9632B}" type="slidenum">
+              <a:rPr lang="en-US" smtClean="0"/>
+              <a:t>4</a:t>
+            </a:fld>
+            <a:endParaRPr lang="en-US"/>
+          </a:p>
+        </p:txBody>
+      </p:sp>
     </p:spTree>
     <p:extLst>
       <p:ext uri="{BB962C8B-B14F-4D97-AF65-F5344CB8AC3E}">
@@ -5169,18 +7284,42 @@
           <a:p>
             <a:pPr algn="ctr"/>
             <a:r>
-              <a:rPr lang="en-US" sz="2400" i="1" dirty="0">
+              <a:rPr lang="en-US" sz="2400" i="1" noProof="0" dirty="0">
                 <a:solidFill>
                   <a:srgbClr val="002060"/>
                 </a:solidFill>
               </a:rPr>
               <a:t>Can we automatically prove that two programs P1 and P2 are correct and equivalent?</a:t>
             </a:r>
-            <a:endParaRPr lang="en-US" sz="2400" i="1" noProof="0" dirty="0">
-              <a:solidFill>
-                <a:srgbClr val="002060"/>
-              </a:solidFill>
-            </a:endParaRPr>
+          </a:p>
+        </p:txBody>
+      </p:sp>
+      <p:sp>
+        <p:nvSpPr>
+          <p:cNvPr id="4" name="Slide Number Placeholder 3">
+            <a:extLst>
+              <a:ext uri="{FF2B5EF4-FFF2-40B4-BE49-F238E27FC236}">
+                <a16:creationId xmlns:a16="http://schemas.microsoft.com/office/drawing/2014/main" id="{2DCAE083-10D5-D7CC-79B8-67AFA0135234}"/>
+              </a:ext>
+            </a:extLst>
+          </p:cNvPr>
+          <p:cNvSpPr>
+            <a:spLocks noGrp="1"/>
+          </p:cNvSpPr>
+          <p:nvPr>
+            <p:ph type="sldNum" sz="quarter" idx="12"/>
+          </p:nvPr>
+        </p:nvSpPr>
+        <p:spPr/>
+        <p:txBody>
+          <a:bodyPr/>
+          <a:lstStyle/>
+          <a:p>
+            <a:fld id="{292A9FD8-515A-4698-9313-0AB17EE9632B}" type="slidenum">
+              <a:rPr lang="en-US" smtClean="0"/>
+              <a:t>5</a:t>
+            </a:fld>
+            <a:endParaRPr lang="en-US"/>
           </a:p>
         </p:txBody>
       </p:sp>
@@ -5301,7 +7440,7 @@
               <a:buChar char="•"/>
             </a:pPr>
             <a:r>
-              <a:rPr lang="en-US" sz="2400" dirty="0">
+              <a:rPr lang="en-US" sz="2400" noProof="0" dirty="0">
                 <a:solidFill>
                   <a:srgbClr val="002060"/>
                 </a:solidFill>
@@ -5315,18 +7454,42 @@
               <a:buChar char="•"/>
             </a:pPr>
             <a:r>
-              <a:rPr lang="en-US" sz="2400" dirty="0">
+              <a:rPr lang="en-US" sz="2400" noProof="0" dirty="0">
                 <a:solidFill>
                   <a:srgbClr val="002060"/>
                 </a:solidFill>
               </a:rPr>
               <a:t>Facilitate the proof of the hardest program by using the proof of the simplest one</a:t>
             </a:r>
-            <a:endParaRPr lang="en-US" sz="2400" noProof="0" dirty="0">
-              <a:solidFill>
-                <a:srgbClr val="002060"/>
-              </a:solidFill>
-            </a:endParaRPr>
+          </a:p>
+        </p:txBody>
+      </p:sp>
+      <p:sp>
+        <p:nvSpPr>
+          <p:cNvPr id="4" name="Slide Number Placeholder 3">
+            <a:extLst>
+              <a:ext uri="{FF2B5EF4-FFF2-40B4-BE49-F238E27FC236}">
+                <a16:creationId xmlns:a16="http://schemas.microsoft.com/office/drawing/2014/main" id="{90E7CB5A-A900-3B1E-4E5D-321B1ACB04CC}"/>
+              </a:ext>
+            </a:extLst>
+          </p:cNvPr>
+          <p:cNvSpPr>
+            <a:spLocks noGrp="1"/>
+          </p:cNvSpPr>
+          <p:nvPr>
+            <p:ph type="sldNum" sz="quarter" idx="12"/>
+          </p:nvPr>
+        </p:nvSpPr>
+        <p:spPr/>
+        <p:txBody>
+          <a:bodyPr/>
+          <a:lstStyle/>
+          <a:p>
+            <a:fld id="{292A9FD8-515A-4698-9313-0AB17EE9632B}" type="slidenum">
+              <a:rPr lang="en-US" smtClean="0"/>
+              <a:t>6</a:t>
+            </a:fld>
+            <a:endParaRPr lang="en-US"/>
           </a:p>
         </p:txBody>
       </p:sp>
@@ -5415,6 +7578,35 @@
           </a:p>
         </p:txBody>
       </p:sp>
+      <p:sp>
+        <p:nvSpPr>
+          <p:cNvPr id="3" name="Slide Number Placeholder 2">
+            <a:extLst>
+              <a:ext uri="{FF2B5EF4-FFF2-40B4-BE49-F238E27FC236}">
+                <a16:creationId xmlns:a16="http://schemas.microsoft.com/office/drawing/2014/main" id="{5EDB8A9E-88E4-C7B2-12DF-6CD676CBDEE9}"/>
+              </a:ext>
+            </a:extLst>
+          </p:cNvPr>
+          <p:cNvSpPr>
+            <a:spLocks noGrp="1"/>
+          </p:cNvSpPr>
+          <p:nvPr>
+            <p:ph type="sldNum" sz="quarter" idx="12"/>
+          </p:nvPr>
+        </p:nvSpPr>
+        <p:spPr/>
+        <p:txBody>
+          <a:bodyPr/>
+          <a:lstStyle/>
+          <a:p>
+            <a:fld id="{292A9FD8-515A-4698-9313-0AB17EE9632B}" type="slidenum">
+              <a:rPr lang="en-US" smtClean="0"/>
+              <a:t>7</a:t>
+            </a:fld>
+            <a:endParaRPr lang="en-US"/>
+          </a:p>
+        </p:txBody>
+      </p:sp>
     </p:spTree>
     <p:extLst>
       <p:ext uri="{BB962C8B-B14F-4D97-AF65-F5344CB8AC3E}">
@@ -5499,6 +7691,420 @@
           </a:p>
         </p:txBody>
       </p:sp>
+      <p:sp>
+        <p:nvSpPr>
+          <p:cNvPr id="3" name="TextBox 2">
+            <a:extLst>
+              <a:ext uri="{FF2B5EF4-FFF2-40B4-BE49-F238E27FC236}">
+                <a16:creationId xmlns:a16="http://schemas.microsoft.com/office/drawing/2014/main" id="{0729EFAC-5AD1-86F5-677E-66941FBADA4B}"/>
+              </a:ext>
+            </a:extLst>
+          </p:cNvPr>
+          <p:cNvSpPr txBox="1"/>
+          <p:nvPr/>
+        </p:nvSpPr>
+        <p:spPr>
+          <a:xfrm>
+            <a:off x="469556" y="1732855"/>
+            <a:ext cx="7331676" cy="1785104"/>
+          </a:xfrm>
+          <a:prstGeom prst="rect">
+            <a:avLst/>
+          </a:prstGeom>
+          <a:noFill/>
+        </p:spPr>
+        <p:txBody>
+          <a:bodyPr wrap="square" rtlCol="0">
+            <a:spAutoFit/>
+          </a:bodyPr>
+          <a:lstStyle/>
+          <a:p>
+            <a:pPr marL="342900" indent="-342900">
+              <a:buFont typeface="Arial" panose="020B0604020202020204" pitchFamily="34" charset="0"/>
+              <a:buChar char="•"/>
+            </a:pPr>
+            <a:r>
+              <a:rPr lang="en-US" sz="2200" noProof="0" dirty="0">
+                <a:solidFill>
+                  <a:srgbClr val="002060"/>
+                </a:solidFill>
+              </a:rPr>
+              <a:t>Fundamental in deductive verification</a:t>
+            </a:r>
+          </a:p>
+          <a:p>
+            <a:pPr marL="342900" indent="-342900">
+              <a:buFont typeface="Arial" panose="020B0604020202020204" pitchFamily="34" charset="0"/>
+              <a:buChar char="•"/>
+            </a:pPr>
+            <a:r>
+              <a:rPr lang="en-US" sz="2200" noProof="0" dirty="0">
+                <a:solidFill>
+                  <a:srgbClr val="002060"/>
+                </a:solidFill>
+              </a:rPr>
+              <a:t>Allows reasoning about the correctness of a program</a:t>
+            </a:r>
+          </a:p>
+          <a:p>
+            <a:pPr marL="342900" indent="-342900">
+              <a:buFont typeface="Arial" panose="020B0604020202020204" pitchFamily="34" charset="0"/>
+              <a:buChar char="•"/>
+            </a:pPr>
+            <a:r>
+              <a:rPr lang="en-US" sz="2200" noProof="0" dirty="0">
+                <a:solidFill>
+                  <a:srgbClr val="002060"/>
+                </a:solidFill>
+              </a:rPr>
+              <a:t>If the pre-condition holds and the program terminates, then the post-condition also holds after the execution 							   (</a:t>
+            </a:r>
+            <a:r>
+              <a:rPr lang="en-US" sz="2200" b="1" noProof="0" dirty="0">
+                <a:solidFill>
+                  <a:srgbClr val="002060"/>
+                </a:solidFill>
+              </a:rPr>
+              <a:t>Hoare triple</a:t>
+            </a:r>
+            <a:r>
+              <a:rPr lang="en-US" sz="2200" noProof="0" dirty="0">
+                <a:solidFill>
+                  <a:srgbClr val="002060"/>
+                </a:solidFill>
+              </a:rPr>
+              <a:t>)</a:t>
+            </a:r>
+          </a:p>
+        </p:txBody>
+      </p:sp>
+      <p:sp>
+        <p:nvSpPr>
+          <p:cNvPr id="4" name="TextBox 3">
+            <a:extLst>
+              <a:ext uri="{FF2B5EF4-FFF2-40B4-BE49-F238E27FC236}">
+                <a16:creationId xmlns:a16="http://schemas.microsoft.com/office/drawing/2014/main" id="{9488A841-D3CB-5840-1A33-50BD87384557}"/>
+              </a:ext>
+            </a:extLst>
+          </p:cNvPr>
+          <p:cNvSpPr txBox="1"/>
+          <p:nvPr/>
+        </p:nvSpPr>
+        <p:spPr>
+          <a:xfrm>
+            <a:off x="3478426" y="3722361"/>
+            <a:ext cx="1767018" cy="523220"/>
+          </a:xfrm>
+          <a:prstGeom prst="rect">
+            <a:avLst/>
+          </a:prstGeom>
+          <a:noFill/>
+        </p:spPr>
+        <p:txBody>
+          <a:bodyPr wrap="square" rtlCol="0">
+            <a:spAutoFit/>
+          </a:bodyPr>
+          <a:lstStyle/>
+          <a:p>
+            <a:pPr algn="ctr"/>
+            <a:r>
+              <a:rPr lang="en-US" sz="2800" noProof="0" dirty="0">
+                <a:solidFill>
+                  <a:srgbClr val="002060"/>
+                </a:solidFill>
+              </a:rPr>
+              <a:t>{P} </a:t>
+            </a:r>
+            <a:r>
+              <a:rPr lang="en-US" sz="2800" b="1" noProof="0" dirty="0">
+                <a:solidFill>
+                  <a:srgbClr val="002060"/>
+                </a:solidFill>
+              </a:rPr>
+              <a:t>S</a:t>
+            </a:r>
+            <a:r>
+              <a:rPr lang="en-US" sz="2800" noProof="0" dirty="0">
+                <a:solidFill>
+                  <a:srgbClr val="002060"/>
+                </a:solidFill>
+              </a:rPr>
+              <a:t> {Q}</a:t>
+            </a:r>
+          </a:p>
+        </p:txBody>
+      </p:sp>
+      <p:sp>
+        <p:nvSpPr>
+          <p:cNvPr id="5" name="TextBox 4">
+            <a:extLst>
+              <a:ext uri="{FF2B5EF4-FFF2-40B4-BE49-F238E27FC236}">
+                <a16:creationId xmlns:a16="http://schemas.microsoft.com/office/drawing/2014/main" id="{9F9F2763-10D7-0251-2C38-30156B9E37BB}"/>
+              </a:ext>
+            </a:extLst>
+          </p:cNvPr>
+          <p:cNvSpPr txBox="1"/>
+          <p:nvPr/>
+        </p:nvSpPr>
+        <p:spPr>
+          <a:xfrm>
+            <a:off x="1037963" y="4690420"/>
+            <a:ext cx="2215981" cy="461665"/>
+          </a:xfrm>
+          <a:prstGeom prst="rect">
+            <a:avLst/>
+          </a:prstGeom>
+          <a:noFill/>
+        </p:spPr>
+        <p:txBody>
+          <a:bodyPr wrap="square" rtlCol="0">
+            <a:spAutoFit/>
+          </a:bodyPr>
+          <a:lstStyle/>
+          <a:p>
+            <a:pPr algn="ctr"/>
+            <a:r>
+              <a:rPr lang="en-US" sz="2400" noProof="0" dirty="0">
+                <a:solidFill>
+                  <a:srgbClr val="002060"/>
+                </a:solidFill>
+              </a:rPr>
+              <a:t>Pre-condition</a:t>
+            </a:r>
+          </a:p>
+        </p:txBody>
+      </p:sp>
+      <p:sp>
+        <p:nvSpPr>
+          <p:cNvPr id="6" name="TextBox 5">
+            <a:extLst>
+              <a:ext uri="{FF2B5EF4-FFF2-40B4-BE49-F238E27FC236}">
+                <a16:creationId xmlns:a16="http://schemas.microsoft.com/office/drawing/2014/main" id="{B8FA02B5-6BD5-B9CF-DDDB-FD3B7D0B2DBD}"/>
+              </a:ext>
+            </a:extLst>
+          </p:cNvPr>
+          <p:cNvSpPr txBox="1"/>
+          <p:nvPr/>
+        </p:nvSpPr>
+        <p:spPr>
+          <a:xfrm>
+            <a:off x="3253944" y="4693167"/>
+            <a:ext cx="2215981" cy="461665"/>
+          </a:xfrm>
+          <a:prstGeom prst="rect">
+            <a:avLst/>
+          </a:prstGeom>
+          <a:noFill/>
+        </p:spPr>
+        <p:txBody>
+          <a:bodyPr wrap="square" rtlCol="0">
+            <a:spAutoFit/>
+          </a:bodyPr>
+          <a:lstStyle/>
+          <a:p>
+            <a:pPr algn="ctr"/>
+            <a:r>
+              <a:rPr lang="en-US" sz="2400" b="1" noProof="0" dirty="0">
+                <a:solidFill>
+                  <a:srgbClr val="002060"/>
+                </a:solidFill>
+              </a:rPr>
+              <a:t>Program</a:t>
+            </a:r>
+          </a:p>
+        </p:txBody>
+      </p:sp>
+      <p:sp>
+        <p:nvSpPr>
+          <p:cNvPr id="7" name="TextBox 6">
+            <a:extLst>
+              <a:ext uri="{FF2B5EF4-FFF2-40B4-BE49-F238E27FC236}">
+                <a16:creationId xmlns:a16="http://schemas.microsoft.com/office/drawing/2014/main" id="{C3F512DF-E1CF-D5DE-267A-2EFBC9121C49}"/>
+              </a:ext>
+            </a:extLst>
+          </p:cNvPr>
+          <p:cNvSpPr txBox="1"/>
+          <p:nvPr/>
+        </p:nvSpPr>
+        <p:spPr>
+          <a:xfrm>
+            <a:off x="5469925" y="4690420"/>
+            <a:ext cx="2215981" cy="461665"/>
+          </a:xfrm>
+          <a:prstGeom prst="rect">
+            <a:avLst/>
+          </a:prstGeom>
+          <a:noFill/>
+        </p:spPr>
+        <p:txBody>
+          <a:bodyPr wrap="square" rtlCol="0">
+            <a:spAutoFit/>
+          </a:bodyPr>
+          <a:lstStyle/>
+          <a:p>
+            <a:pPr algn="ctr"/>
+            <a:r>
+              <a:rPr lang="en-US" sz="2400" noProof="0" dirty="0">
+                <a:solidFill>
+                  <a:srgbClr val="002060"/>
+                </a:solidFill>
+              </a:rPr>
+              <a:t>Post-condition</a:t>
+            </a:r>
+          </a:p>
+        </p:txBody>
+      </p:sp>
+      <p:cxnSp>
+        <p:nvCxnSpPr>
+          <p:cNvPr id="9" name="Straight Arrow Connector 8">
+            <a:extLst>
+              <a:ext uri="{FF2B5EF4-FFF2-40B4-BE49-F238E27FC236}">
+                <a16:creationId xmlns:a16="http://schemas.microsoft.com/office/drawing/2014/main" id="{90447F5A-D5B6-428D-588E-0895770C7C47}"/>
+              </a:ext>
+            </a:extLst>
+          </p:cNvPr>
+          <p:cNvCxnSpPr>
+            <a:cxnSpLocks/>
+          </p:cNvCxnSpPr>
+          <p:nvPr/>
+        </p:nvCxnSpPr>
+        <p:spPr>
+          <a:xfrm flipH="1">
+            <a:off x="3122141" y="4242487"/>
+            <a:ext cx="724930" cy="445186"/>
+          </a:xfrm>
+          <a:prstGeom prst="straightConnector1">
+            <a:avLst/>
+          </a:prstGeom>
+          <a:ln>
+            <a:tailEnd type="triangle"/>
+          </a:ln>
+        </p:spPr>
+        <p:style>
+          <a:lnRef idx="2">
+            <a:schemeClr val="accent1"/>
+          </a:lnRef>
+          <a:fillRef idx="0">
+            <a:schemeClr val="accent1"/>
+          </a:fillRef>
+          <a:effectRef idx="1">
+            <a:schemeClr val="accent1"/>
+          </a:effectRef>
+          <a:fontRef idx="minor">
+            <a:schemeClr val="tx1"/>
+          </a:fontRef>
+        </p:style>
+      </p:cxnSp>
+      <p:cxnSp>
+        <p:nvCxnSpPr>
+          <p:cNvPr id="13" name="Straight Arrow Connector 12">
+            <a:extLst>
+              <a:ext uri="{FF2B5EF4-FFF2-40B4-BE49-F238E27FC236}">
+                <a16:creationId xmlns:a16="http://schemas.microsoft.com/office/drawing/2014/main" id="{0E65A080-C42C-D3A7-ED94-17B98DFD13A9}"/>
+              </a:ext>
+            </a:extLst>
+          </p:cNvPr>
+          <p:cNvCxnSpPr>
+            <a:stCxn id="4" idx="2"/>
+            <a:endCxn id="6" idx="0"/>
+          </p:cNvCxnSpPr>
+          <p:nvPr/>
+        </p:nvCxnSpPr>
+        <p:spPr>
+          <a:xfrm>
+            <a:off x="4361935" y="4245581"/>
+            <a:ext cx="0" cy="447586"/>
+          </a:xfrm>
+          <a:prstGeom prst="straightConnector1">
+            <a:avLst/>
+          </a:prstGeom>
+          <a:ln>
+            <a:tailEnd type="triangle"/>
+          </a:ln>
+        </p:spPr>
+        <p:style>
+          <a:lnRef idx="2">
+            <a:schemeClr val="accent1"/>
+          </a:lnRef>
+          <a:fillRef idx="0">
+            <a:schemeClr val="accent1"/>
+          </a:fillRef>
+          <a:effectRef idx="1">
+            <a:schemeClr val="accent1"/>
+          </a:effectRef>
+          <a:fontRef idx="minor">
+            <a:schemeClr val="tx1"/>
+          </a:fontRef>
+        </p:style>
+      </p:cxnSp>
+      <p:cxnSp>
+        <p:nvCxnSpPr>
+          <p:cNvPr id="15" name="Straight Arrow Connector 14">
+            <a:extLst>
+              <a:ext uri="{FF2B5EF4-FFF2-40B4-BE49-F238E27FC236}">
+                <a16:creationId xmlns:a16="http://schemas.microsoft.com/office/drawing/2014/main" id="{98961681-FFCC-BA08-3836-472C8CEA6473}"/>
+              </a:ext>
+            </a:extLst>
+          </p:cNvPr>
+          <p:cNvCxnSpPr/>
+          <p:nvPr/>
+        </p:nvCxnSpPr>
+        <p:spPr>
+          <a:xfrm>
+            <a:off x="4860325" y="4244034"/>
+            <a:ext cx="609600" cy="443639"/>
+          </a:xfrm>
+          <a:prstGeom prst="straightConnector1">
+            <a:avLst/>
+          </a:prstGeom>
+          <a:ln>
+            <a:tailEnd type="triangle"/>
+          </a:ln>
+        </p:spPr>
+        <p:style>
+          <a:lnRef idx="2">
+            <a:schemeClr val="accent1"/>
+          </a:lnRef>
+          <a:fillRef idx="0">
+            <a:schemeClr val="accent1"/>
+          </a:fillRef>
+          <a:effectRef idx="1">
+            <a:schemeClr val="accent1"/>
+          </a:effectRef>
+          <a:fontRef idx="minor">
+            <a:schemeClr val="tx1"/>
+          </a:fontRef>
+        </p:style>
+      </p:cxnSp>
+      <p:sp>
+        <p:nvSpPr>
+          <p:cNvPr id="16" name="Slide Number Placeholder 15">
+            <a:extLst>
+              <a:ext uri="{FF2B5EF4-FFF2-40B4-BE49-F238E27FC236}">
+                <a16:creationId xmlns:a16="http://schemas.microsoft.com/office/drawing/2014/main" id="{E2C5BD96-C82C-30DB-0133-9CE088813C60}"/>
+              </a:ext>
+            </a:extLst>
+          </p:cNvPr>
+          <p:cNvSpPr>
+            <a:spLocks noGrp="1"/>
+          </p:cNvSpPr>
+          <p:nvPr>
+            <p:ph type="sldNum" sz="quarter" idx="12"/>
+          </p:nvPr>
+        </p:nvSpPr>
+        <p:spPr/>
+        <p:txBody>
+          <a:bodyPr/>
+          <a:lstStyle/>
+          <a:p>
+            <a:fld id="{292A9FD8-515A-4698-9313-0AB17EE9632B}" type="slidenum">
+              <a:rPr lang="en-US" smtClean="0"/>
+              <a:t>8</a:t>
+            </a:fld>
+            <a:endParaRPr lang="en-US"/>
+          </a:p>
+        </p:txBody>
+      </p:sp>
     </p:spTree>
     <p:extLst>
       <p:ext uri="{BB962C8B-B14F-4D97-AF65-F5344CB8AC3E}">
@@ -5528,7 +8134,7 @@
         <p:cNvPr id="1" name="">
           <a:extLst>
             <a:ext uri="{FF2B5EF4-FFF2-40B4-BE49-F238E27FC236}">
-              <a16:creationId xmlns:a16="http://schemas.microsoft.com/office/drawing/2014/main" id="{0AEC5163-8B4A-9448-D160-468C46A77920}"/>
+              <a16:creationId xmlns:a16="http://schemas.microsoft.com/office/drawing/2014/main" id="{120EB817-9A4A-A752-45FE-802F77F340C6}"/>
             </a:ext>
           </a:extLst>
         </p:cNvPr>
@@ -5548,7 +8154,7 @@
           <p:cNvPr id="2" name="TextBox 1">
             <a:extLst>
               <a:ext uri="{FF2B5EF4-FFF2-40B4-BE49-F238E27FC236}">
-                <a16:creationId xmlns:a16="http://schemas.microsoft.com/office/drawing/2014/main" id="{084A08B0-3664-D7CB-8048-31AD204A1E71}"/>
+                <a16:creationId xmlns:a16="http://schemas.microsoft.com/office/drawing/2014/main" id="{16A7992F-728A-EB95-C874-674DAC1DDB6D}"/>
               </a:ext>
             </a:extLst>
           </p:cNvPr>
@@ -5577,16 +8183,270 @@
                   <a:srgbClr val="002060"/>
                 </a:solidFill>
               </a:rPr>
-              <a:t>Relational Hoare Logic</a:t>
+              <a:t>Relational Hoare Logic (1/2)</a:t>
             </a:r>
             <a:endParaRPr lang="en-US" sz="2800" noProof="0" dirty="0"/>
+          </a:p>
+        </p:txBody>
+      </p:sp>
+      <p:sp>
+        <p:nvSpPr>
+          <p:cNvPr id="3" name="TextBox 2">
+            <a:extLst>
+              <a:ext uri="{FF2B5EF4-FFF2-40B4-BE49-F238E27FC236}">
+                <a16:creationId xmlns:a16="http://schemas.microsoft.com/office/drawing/2014/main" id="{63BAC42F-A972-CB6F-292C-4DF37B2315E7}"/>
+              </a:ext>
+            </a:extLst>
+          </p:cNvPr>
+          <p:cNvSpPr txBox="1"/>
+          <p:nvPr/>
+        </p:nvSpPr>
+        <p:spPr>
+          <a:xfrm>
+            <a:off x="469556" y="1774728"/>
+            <a:ext cx="7710617" cy="2462213"/>
+          </a:xfrm>
+          <a:prstGeom prst="rect">
+            <a:avLst/>
+          </a:prstGeom>
+          <a:noFill/>
+        </p:spPr>
+        <p:txBody>
+          <a:bodyPr wrap="square" rtlCol="0">
+            <a:spAutoFit/>
+          </a:bodyPr>
+          <a:lstStyle/>
+          <a:p>
+            <a:pPr marL="342900" indent="-342900">
+              <a:buFont typeface="Arial" panose="020B0604020202020204" pitchFamily="34" charset="0"/>
+              <a:buChar char="•"/>
+            </a:pPr>
+            <a:r>
+              <a:rPr lang="en-US" sz="2200" dirty="0">
+                <a:solidFill>
+                  <a:srgbClr val="002060"/>
+                </a:solidFill>
+              </a:rPr>
+              <a:t>Extension of</a:t>
+            </a:r>
+            <a:r>
+              <a:rPr lang="en-US" sz="2200" noProof="0" dirty="0">
+                <a:solidFill>
+                  <a:srgbClr val="002060"/>
+                </a:solidFill>
+              </a:rPr>
+              <a:t> Hoare Logic to reason about two different programs or different runs of the same</a:t>
+            </a:r>
+          </a:p>
+          <a:p>
+            <a:pPr marL="342900" indent="-342900">
+              <a:buFont typeface="Arial" panose="020B0604020202020204" pitchFamily="34" charset="0"/>
+              <a:buChar char="•"/>
+            </a:pPr>
+            <a:r>
+              <a:rPr lang="en-US" sz="2200" dirty="0">
+                <a:solidFill>
+                  <a:srgbClr val="002060"/>
+                </a:solidFill>
+              </a:rPr>
+              <a:t>Much better to establish that two programs are equivalent or not </a:t>
+            </a:r>
+            <a:endParaRPr lang="en-US" sz="2200" noProof="0" dirty="0">
+              <a:solidFill>
+                <a:srgbClr val="002060"/>
+              </a:solidFill>
+            </a:endParaRPr>
+          </a:p>
+          <a:p>
+            <a:pPr marL="342900" indent="-342900">
+              <a:buFont typeface="Arial" panose="020B0604020202020204" pitchFamily="34" charset="0"/>
+              <a:buChar char="•"/>
+            </a:pPr>
+            <a:r>
+              <a:rPr lang="en-US" sz="2200" dirty="0">
+                <a:solidFill>
+                  <a:srgbClr val="002060"/>
+                </a:solidFill>
+              </a:rPr>
+              <a:t>If both P1 and P2 respect the pre-condition, either they both terminate respecting the post-condition or neither does                             </a:t>
+            </a:r>
+            <a:r>
+              <a:rPr lang="en-US" sz="2200" dirty="0">
+                <a:solidFill>
+                  <a:srgbClr val="ACCFEE"/>
+                </a:solidFill>
+              </a:rPr>
+              <a:t>.</a:t>
+            </a:r>
+            <a:r>
+              <a:rPr lang="en-US" sz="2200" dirty="0">
+                <a:solidFill>
+                  <a:srgbClr val="002060"/>
+                </a:solidFill>
+              </a:rPr>
+              <a:t>                                          (</a:t>
+            </a:r>
+            <a:r>
+              <a:rPr lang="en-US" sz="2200" b="1" dirty="0">
+                <a:solidFill>
+                  <a:srgbClr val="002060"/>
+                </a:solidFill>
+              </a:rPr>
+              <a:t>Hoare quadruple</a:t>
+            </a:r>
+            <a:r>
+              <a:rPr lang="en-US" sz="2200" dirty="0">
+                <a:solidFill>
+                  <a:srgbClr val="002060"/>
+                </a:solidFill>
+              </a:rPr>
+              <a:t>)</a:t>
+            </a:r>
+            <a:endParaRPr lang="en-US" sz="2200" noProof="0" dirty="0">
+              <a:solidFill>
+                <a:srgbClr val="002060"/>
+              </a:solidFill>
+            </a:endParaRPr>
+          </a:p>
+        </p:txBody>
+      </p:sp>
+      <p:sp>
+        <p:nvSpPr>
+          <p:cNvPr id="4" name="TextBox 3">
+            <a:extLst>
+              <a:ext uri="{FF2B5EF4-FFF2-40B4-BE49-F238E27FC236}">
+                <a16:creationId xmlns:a16="http://schemas.microsoft.com/office/drawing/2014/main" id="{C1732A12-4DCA-63E4-21CB-5676DB55634C}"/>
+              </a:ext>
+            </a:extLst>
+          </p:cNvPr>
+          <p:cNvSpPr txBox="1"/>
+          <p:nvPr/>
+        </p:nvSpPr>
+        <p:spPr>
+          <a:xfrm>
+            <a:off x="3179806" y="4432861"/>
+            <a:ext cx="2784388" cy="523220"/>
+          </a:xfrm>
+          <a:prstGeom prst="rect">
+            <a:avLst/>
+          </a:prstGeom>
+          <a:noFill/>
+        </p:spPr>
+        <p:txBody>
+          <a:bodyPr wrap="square" rtlCol="0">
+            <a:spAutoFit/>
+          </a:bodyPr>
+          <a:lstStyle/>
+          <a:p>
+            <a:pPr algn="ctr"/>
+            <a:r>
+              <a:rPr lang="en-US" sz="2800" noProof="0" dirty="0">
+                <a:solidFill>
+                  <a:srgbClr val="002060"/>
+                </a:solidFill>
+              </a:rPr>
+              <a:t>{</a:t>
+            </a:r>
+            <a:r>
+              <a:rPr lang="el-GR" sz="2800" dirty="0">
+                <a:solidFill>
+                  <a:srgbClr val="002060"/>
+                </a:solidFill>
+              </a:rPr>
+              <a:t>Φ</a:t>
+            </a:r>
+            <a:r>
+              <a:rPr lang="en-US" sz="2800" noProof="0" dirty="0">
+                <a:solidFill>
+                  <a:srgbClr val="002060"/>
+                </a:solidFill>
+              </a:rPr>
+              <a:t>} </a:t>
+            </a:r>
+            <a:r>
+              <a:rPr lang="en-US" sz="2800" i="1" noProof="0" dirty="0">
+                <a:solidFill>
+                  <a:srgbClr val="002060"/>
+                </a:solidFill>
+              </a:rPr>
+              <a:t>P1</a:t>
+            </a:r>
+            <a:r>
+              <a:rPr lang="en-US" sz="2800" noProof="0" dirty="0">
+                <a:solidFill>
+                  <a:srgbClr val="002060"/>
+                </a:solidFill>
+              </a:rPr>
+              <a:t> ~ </a:t>
+            </a:r>
+            <a:r>
+              <a:rPr lang="en-US" sz="2800" i="1" noProof="0" dirty="0">
+                <a:solidFill>
+                  <a:srgbClr val="002060"/>
+                </a:solidFill>
+              </a:rPr>
+              <a:t>P2</a:t>
+            </a:r>
+            <a:r>
+              <a:rPr lang="en-US" sz="2800" noProof="0" dirty="0">
+                <a:solidFill>
+                  <a:srgbClr val="002060"/>
+                </a:solidFill>
+              </a:rPr>
+              <a:t>  {</a:t>
+            </a:r>
+            <a:r>
+              <a:rPr lang="el-GR" sz="2800" dirty="0">
+                <a:solidFill>
+                  <a:srgbClr val="002060"/>
+                </a:solidFill>
+              </a:rPr>
+              <a:t>Ψ</a:t>
+            </a:r>
+            <a:r>
+              <a:rPr lang="en-US" sz="2800" noProof="0" dirty="0">
+                <a:solidFill>
+                  <a:srgbClr val="002060"/>
+                </a:solidFill>
+              </a:rPr>
+              <a:t>}</a:t>
+            </a:r>
+          </a:p>
+        </p:txBody>
+      </p:sp>
+      <p:sp>
+        <p:nvSpPr>
+          <p:cNvPr id="5" name="Slide Number Placeholder 4">
+            <a:extLst>
+              <a:ext uri="{FF2B5EF4-FFF2-40B4-BE49-F238E27FC236}">
+                <a16:creationId xmlns:a16="http://schemas.microsoft.com/office/drawing/2014/main" id="{D1257913-406A-1190-228C-D3DE24D510AD}"/>
+              </a:ext>
+            </a:extLst>
+          </p:cNvPr>
+          <p:cNvSpPr>
+            <a:spLocks noGrp="1"/>
+          </p:cNvSpPr>
+          <p:nvPr>
+            <p:ph type="sldNum" sz="quarter" idx="12"/>
+          </p:nvPr>
+        </p:nvSpPr>
+        <p:spPr/>
+        <p:txBody>
+          <a:bodyPr/>
+          <a:lstStyle/>
+          <a:p>
+            <a:fld id="{292A9FD8-515A-4698-9313-0AB17EE9632B}" type="slidenum">
+              <a:rPr lang="en-US" smtClean="0"/>
+              <a:t>9</a:t>
+            </a:fld>
+            <a:endParaRPr lang="en-US"/>
           </a:p>
         </p:txBody>
       </p:sp>
     </p:spTree>
     <p:extLst>
       <p:ext uri="{BB962C8B-B14F-4D97-AF65-F5344CB8AC3E}">
-        <p14:creationId xmlns:p14="http://schemas.microsoft.com/office/powerpoint/2010/main" val="939911291"/>
+        <p14:creationId xmlns:p14="http://schemas.microsoft.com/office/powerpoint/2010/main" val="21783310"/>
       </p:ext>
     </p:extLst>
   </p:cSld>
@@ -5909,4 +8769,319 @@
     </a:ext>
   </a:extLst>
 </a:theme>
+</file>
+
+<file path=ppt/theme/theme2.xml><?xml version="1.0" encoding="utf-8"?>
+<a:theme xmlns:a="http://schemas.openxmlformats.org/drawingml/2006/main" name="Office Theme">
+  <a:themeElements>
+    <a:clrScheme name="Office">
+      <a:dk1>
+        <a:sysClr val="windowText" lastClr="000000"/>
+      </a:dk1>
+      <a:lt1>
+        <a:sysClr val="window" lastClr="FFFFFF"/>
+      </a:lt1>
+      <a:dk2>
+        <a:srgbClr val="0E2841"/>
+      </a:dk2>
+      <a:lt2>
+        <a:srgbClr val="E8E8E8"/>
+      </a:lt2>
+      <a:accent1>
+        <a:srgbClr val="156082"/>
+      </a:accent1>
+      <a:accent2>
+        <a:srgbClr val="E97132"/>
+      </a:accent2>
+      <a:accent3>
+        <a:srgbClr val="196B24"/>
+      </a:accent3>
+      <a:accent4>
+        <a:srgbClr val="0F9ED5"/>
+      </a:accent4>
+      <a:accent5>
+        <a:srgbClr val="A02B93"/>
+      </a:accent5>
+      <a:accent6>
+        <a:srgbClr val="4EA72E"/>
+      </a:accent6>
+      <a:hlink>
+        <a:srgbClr val="467886"/>
+      </a:hlink>
+      <a:folHlink>
+        <a:srgbClr val="96607D"/>
+      </a:folHlink>
+    </a:clrScheme>
+    <a:fontScheme name="Office">
+      <a:majorFont>
+        <a:latin typeface="Aptos Display" panose="02110004020202020204"/>
+        <a:ea typeface=""/>
+        <a:cs typeface=""/>
+        <a:font script="Jpan" typeface="游ゴシック Light"/>
+        <a:font script="Hang" typeface="맑은 고딕"/>
+        <a:font script="Hans" typeface="等线 Light"/>
+        <a:font script="Hant" typeface="新細明體"/>
+        <a:font script="Arab" typeface="Times New Roman"/>
+        <a:font script="Hebr" typeface="Times New Roman"/>
+        <a:font script="Thai" typeface="Angsana New"/>
+        <a:font script="Ethi" typeface="Nyala"/>
+        <a:font script="Beng" typeface="Vrinda"/>
+        <a:font script="Gujr" typeface="Shruti"/>
+        <a:font script="Khmr" typeface="MoolBoran"/>
+        <a:font script="Knda" typeface="Tunga"/>
+        <a:font script="Guru" typeface="Raavi"/>
+        <a:font script="Cans" typeface="Euphemia"/>
+        <a:font script="Cher" typeface="Plantagenet Cherokee"/>
+        <a:font script="Yiii" typeface="Microsoft Yi Baiti"/>
+        <a:font script="Tibt" typeface="Microsoft Himalaya"/>
+        <a:font script="Thaa" typeface="MV Boli"/>
+        <a:font script="Deva" typeface="Mangal"/>
+        <a:font script="Telu" typeface="Gautami"/>
+        <a:font script="Taml" typeface="Latha"/>
+        <a:font script="Syrc" typeface="Estrangelo Edessa"/>
+        <a:font script="Orya" typeface="Kalinga"/>
+        <a:font script="Mlym" typeface="Kartika"/>
+        <a:font script="Laoo" typeface="DokChampa"/>
+        <a:font script="Sinh" typeface="Iskoola Pota"/>
+        <a:font script="Mong" typeface="Mongolian Baiti"/>
+        <a:font script="Viet" typeface="Times New Roman"/>
+        <a:font script="Uigh" typeface="Microsoft Uighur"/>
+        <a:font script="Geor" typeface="Sylfaen"/>
+        <a:font script="Armn" typeface="Arial"/>
+        <a:font script="Bugi" typeface="Leelawadee UI"/>
+        <a:font script="Bopo" typeface="Microsoft JhengHei"/>
+        <a:font script="Java" typeface="Javanese Text"/>
+        <a:font script="Lisu" typeface="Segoe UI"/>
+        <a:font script="Mymr" typeface="Myanmar Text"/>
+        <a:font script="Nkoo" typeface="Ebrima"/>
+        <a:font script="Olck" typeface="Nirmala UI"/>
+        <a:font script="Osma" typeface="Ebrima"/>
+        <a:font script="Phag" typeface="Phagspa"/>
+        <a:font script="Syrn" typeface="Estrangelo Edessa"/>
+        <a:font script="Syrj" typeface="Estrangelo Edessa"/>
+        <a:font script="Syre" typeface="Estrangelo Edessa"/>
+        <a:font script="Sora" typeface="Nirmala UI"/>
+        <a:font script="Tale" typeface="Microsoft Tai Le"/>
+        <a:font script="Talu" typeface="Microsoft New Tai Lue"/>
+        <a:font script="Tfng" typeface="Ebrima"/>
+      </a:majorFont>
+      <a:minorFont>
+        <a:latin typeface="Aptos" panose="02110004020202020204"/>
+        <a:ea typeface=""/>
+        <a:cs typeface=""/>
+        <a:font script="Jpan" typeface="游ゴシック"/>
+        <a:font script="Hang" typeface="맑은 고딕"/>
+        <a:font script="Hans" typeface="等线"/>
+        <a:font script="Hant" typeface="新細明體"/>
+        <a:font script="Arab" typeface="Arial"/>
+        <a:font script="Hebr" typeface="Arial"/>
+        <a:font script="Thai" typeface="Cordia New"/>
+        <a:font script="Ethi" typeface="Nyala"/>
+        <a:font script="Beng" typeface="Vrinda"/>
+        <a:font script="Gujr" typeface="Shruti"/>
+        <a:font script="Khmr" typeface="DaunPenh"/>
+        <a:font script="Knda" typeface="Tunga"/>
+        <a:font script="Guru" typeface="Raavi"/>
+        <a:font script="Cans" typeface="Euphemia"/>
+        <a:font script="Cher" typeface="Plantagenet Cherokee"/>
+        <a:font script="Yiii" typeface="Microsoft Yi Baiti"/>
+        <a:font script="Tibt" typeface="Microsoft Himalaya"/>
+        <a:font script="Thaa" typeface="MV Boli"/>
+        <a:font script="Deva" typeface="Mangal"/>
+        <a:font script="Telu" typeface="Gautami"/>
+        <a:font script="Taml" typeface="Latha"/>
+        <a:font script="Syrc" typeface="Estrangelo Edessa"/>
+        <a:font script="Orya" typeface="Kalinga"/>
+        <a:font script="Mlym" typeface="Kartika"/>
+        <a:font script="Laoo" typeface="DokChampa"/>
+        <a:font script="Sinh" typeface="Iskoola Pota"/>
+        <a:font script="Mong" typeface="Mongolian Baiti"/>
+        <a:font script="Viet" typeface="Arial"/>
+        <a:font script="Uigh" typeface="Microsoft Uighur"/>
+        <a:font script="Geor" typeface="Sylfaen"/>
+        <a:font script="Armn" typeface="Arial"/>
+        <a:font script="Bugi" typeface="Leelawadee UI"/>
+        <a:font script="Bopo" typeface="Microsoft JhengHei"/>
+        <a:font script="Java" typeface="Javanese Text"/>
+        <a:font script="Lisu" typeface="Segoe UI"/>
+        <a:font script="Mymr" typeface="Myanmar Text"/>
+        <a:font script="Nkoo" typeface="Ebrima"/>
+        <a:font script="Olck" typeface="Nirmala UI"/>
+        <a:font script="Osma" typeface="Ebrima"/>
+        <a:font script="Phag" typeface="Phagspa"/>
+        <a:font script="Syrn" typeface="Estrangelo Edessa"/>
+        <a:font script="Syrj" typeface="Estrangelo Edessa"/>
+        <a:font script="Syre" typeface="Estrangelo Edessa"/>
+        <a:font script="Sora" typeface="Nirmala UI"/>
+        <a:font script="Tale" typeface="Microsoft Tai Le"/>
+        <a:font script="Talu" typeface="Microsoft New Tai Lue"/>
+        <a:font script="Tfng" typeface="Ebrima"/>
+      </a:minorFont>
+    </a:fontScheme>
+    <a:fmtScheme name="Office">
+      <a:fillStyleLst>
+        <a:solidFill>
+          <a:schemeClr val="phClr"/>
+        </a:solidFill>
+        <a:gradFill rotWithShape="1">
+          <a:gsLst>
+            <a:gs pos="0">
+              <a:schemeClr val="phClr">
+                <a:lumMod val="110000"/>
+                <a:satMod val="105000"/>
+                <a:tint val="67000"/>
+              </a:schemeClr>
+            </a:gs>
+            <a:gs pos="50000">
+              <a:schemeClr val="phClr">
+                <a:lumMod val="105000"/>
+                <a:satMod val="103000"/>
+                <a:tint val="73000"/>
+              </a:schemeClr>
+            </a:gs>
+            <a:gs pos="100000">
+              <a:schemeClr val="phClr">
+                <a:lumMod val="105000"/>
+                <a:satMod val="109000"/>
+                <a:tint val="81000"/>
+              </a:schemeClr>
+            </a:gs>
+          </a:gsLst>
+          <a:lin ang="5400000" scaled="0"/>
+        </a:gradFill>
+        <a:gradFill rotWithShape="1">
+          <a:gsLst>
+            <a:gs pos="0">
+              <a:schemeClr val="phClr">
+                <a:satMod val="103000"/>
+                <a:lumMod val="102000"/>
+                <a:tint val="94000"/>
+              </a:schemeClr>
+            </a:gs>
+            <a:gs pos="50000">
+              <a:schemeClr val="phClr">
+                <a:satMod val="110000"/>
+                <a:lumMod val="100000"/>
+                <a:shade val="100000"/>
+              </a:schemeClr>
+            </a:gs>
+            <a:gs pos="100000">
+              <a:schemeClr val="phClr">
+                <a:lumMod val="99000"/>
+                <a:satMod val="120000"/>
+                <a:shade val="78000"/>
+              </a:schemeClr>
+            </a:gs>
+          </a:gsLst>
+          <a:lin ang="5400000" scaled="0"/>
+        </a:gradFill>
+      </a:fillStyleLst>
+      <a:lnStyleLst>
+        <a:ln w="12700" cap="flat" cmpd="sng" algn="ctr">
+          <a:solidFill>
+            <a:schemeClr val="phClr"/>
+          </a:solidFill>
+          <a:prstDash val="solid"/>
+          <a:miter lim="800000"/>
+        </a:ln>
+        <a:ln w="19050" cap="flat" cmpd="sng" algn="ctr">
+          <a:solidFill>
+            <a:schemeClr val="phClr"/>
+          </a:solidFill>
+          <a:prstDash val="solid"/>
+          <a:miter lim="800000"/>
+        </a:ln>
+        <a:ln w="25400" cap="flat" cmpd="sng" algn="ctr">
+          <a:solidFill>
+            <a:schemeClr val="phClr"/>
+          </a:solidFill>
+          <a:prstDash val="solid"/>
+          <a:miter lim="800000"/>
+        </a:ln>
+      </a:lnStyleLst>
+      <a:effectStyleLst>
+        <a:effectStyle>
+          <a:effectLst/>
+        </a:effectStyle>
+        <a:effectStyle>
+          <a:effectLst/>
+        </a:effectStyle>
+        <a:effectStyle>
+          <a:effectLst>
+            <a:outerShdw blurRad="57150" dist="19050" dir="5400000" algn="ctr" rotWithShape="0">
+              <a:srgbClr val="000000">
+                <a:alpha val="63000"/>
+              </a:srgbClr>
+            </a:outerShdw>
+          </a:effectLst>
+        </a:effectStyle>
+      </a:effectStyleLst>
+      <a:bgFillStyleLst>
+        <a:solidFill>
+          <a:schemeClr val="phClr"/>
+        </a:solidFill>
+        <a:solidFill>
+          <a:schemeClr val="phClr">
+            <a:tint val="95000"/>
+            <a:satMod val="170000"/>
+          </a:schemeClr>
+        </a:solidFill>
+        <a:gradFill rotWithShape="1">
+          <a:gsLst>
+            <a:gs pos="0">
+              <a:schemeClr val="phClr">
+                <a:tint val="93000"/>
+                <a:satMod val="150000"/>
+                <a:shade val="98000"/>
+                <a:lumMod val="102000"/>
+              </a:schemeClr>
+            </a:gs>
+            <a:gs pos="50000">
+              <a:schemeClr val="phClr">
+                <a:tint val="98000"/>
+                <a:satMod val="130000"/>
+                <a:shade val="90000"/>
+                <a:lumMod val="103000"/>
+              </a:schemeClr>
+            </a:gs>
+            <a:gs pos="100000">
+              <a:schemeClr val="phClr">
+                <a:shade val="63000"/>
+                <a:satMod val="120000"/>
+              </a:schemeClr>
+            </a:gs>
+          </a:gsLst>
+          <a:lin ang="5400000" scaled="0"/>
+        </a:gradFill>
+      </a:bgFillStyleLst>
+    </a:fmtScheme>
+  </a:themeElements>
+  <a:objectDefaults>
+    <a:lnDef>
+      <a:spPr/>
+      <a:bodyPr/>
+      <a:lstStyle/>
+      <a:style>
+        <a:lnRef idx="2">
+          <a:schemeClr val="accent1"/>
+        </a:lnRef>
+        <a:fillRef idx="0">
+          <a:schemeClr val="accent1"/>
+        </a:fillRef>
+        <a:effectRef idx="1">
+          <a:schemeClr val="accent1"/>
+        </a:effectRef>
+        <a:fontRef idx="minor">
+          <a:schemeClr val="tx1"/>
+        </a:fontRef>
+      </a:style>
+    </a:lnDef>
+  </a:objectDefaults>
+  <a:extraClrSchemeLst/>
+  <a:extLst>
+    <a:ext uri="{05A4C25C-085E-4340-85A3-A5531E510DB2}">
+      <thm15:themeFamily xmlns:thm15="http://schemas.microsoft.com/office/thememl/2012/main" name="Office Theme" id="{2E142A2C-CD16-42D6-873A-C26D2A0506FA}" vid="{1BDDFF52-6CD6-40A5-AB3C-68EB2F1E4D0A}"/>
+    </a:ext>
+  </a:extLst>
+</a:theme>
 </file>
</xml_diff>

<commit_message>
Updated background and made sota slides.
</commit_message>
<xml_diff>
--- a/Ap Prep Tese.pptx
+++ b/Ap Prep Tese.pptx
@@ -221,7 +221,7 @@
           <a:p>
             <a:fld id="{374D7271-F55A-4686-93D9-9528AEDA1906}" type="datetimeFigureOut">
               <a:rPr lang="en-US" smtClean="0"/>
-              <a:t>2/15/2025</a:t>
+              <a:t>2/17/2025</a:t>
             </a:fld>
             <a:endParaRPr lang="en-US"/>
           </a:p>
@@ -619,7 +619,7 @@
           <a:p>
             <a:fld id="{1E5BF2F9-84AD-46CB-8486-EB732804F762}" type="datetime1">
               <a:rPr lang="en-US" smtClean="0"/>
-              <a:t>2/15/2025</a:t>
+              <a:t>2/17/2025</a:t>
             </a:fld>
             <a:endParaRPr lang="en-US"/>
           </a:p>
@@ -798,7 +798,7 @@
           <a:p>
             <a:fld id="{23618752-90E6-4B57-86C0-C43DD2320A2D}" type="datetime1">
               <a:rPr lang="en-US" smtClean="0"/>
-              <a:t>2/15/2025</a:t>
+              <a:t>2/17/2025</a:t>
             </a:fld>
             <a:endParaRPr lang="en-US"/>
           </a:p>
@@ -978,7 +978,7 @@
           <a:p>
             <a:fld id="{85BE5269-252E-4ABC-B047-AD967E98EA5E}" type="datetime1">
               <a:rPr lang="en-US" smtClean="0"/>
-              <a:t>2/15/2025</a:t>
+              <a:t>2/17/2025</a:t>
             </a:fld>
             <a:endParaRPr lang="en-US"/>
           </a:p>
@@ -1148,7 +1148,7 @@
           <a:p>
             <a:fld id="{C4D54784-9B75-4DBC-ACA0-9F51227CD78F}" type="datetime1">
               <a:rPr lang="en-US" smtClean="0"/>
-              <a:t>2/15/2025</a:t>
+              <a:t>2/17/2025</a:t>
             </a:fld>
             <a:endParaRPr lang="en-US"/>
           </a:p>
@@ -1394,7 +1394,7 @@
           <a:p>
             <a:fld id="{3D9E4D52-32DE-4F35-8CB6-5A44573D3FC9}" type="datetime1">
               <a:rPr lang="en-US" smtClean="0"/>
-              <a:t>2/15/2025</a:t>
+              <a:t>2/17/2025</a:t>
             </a:fld>
             <a:endParaRPr lang="en-US"/>
           </a:p>
@@ -1626,7 +1626,7 @@
           <a:p>
             <a:fld id="{D0FFB22E-8A21-4AF6-BDE0-993A2F9B14BB}" type="datetime1">
               <a:rPr lang="en-US" smtClean="0"/>
-              <a:t>2/15/2025</a:t>
+              <a:t>2/17/2025</a:t>
             </a:fld>
             <a:endParaRPr lang="en-US"/>
           </a:p>
@@ -1993,7 +1993,7 @@
           <a:p>
             <a:fld id="{AC41D9E4-527D-47F1-B47F-963D62CCBC76}" type="datetime1">
               <a:rPr lang="en-US" smtClean="0"/>
-              <a:t>2/15/2025</a:t>
+              <a:t>2/17/2025</a:t>
             </a:fld>
             <a:endParaRPr lang="en-US"/>
           </a:p>
@@ -2111,7 +2111,7 @@
           <a:p>
             <a:fld id="{9906A608-925A-4874-BCA4-36BA40FADF76}" type="datetime1">
               <a:rPr lang="en-US" smtClean="0"/>
-              <a:t>2/15/2025</a:t>
+              <a:t>2/17/2025</a:t>
             </a:fld>
             <a:endParaRPr lang="en-US"/>
           </a:p>
@@ -2206,7 +2206,7 @@
           <a:p>
             <a:fld id="{45CCB426-3683-4E7C-B869-5155B20F8BC6}" type="datetime1">
               <a:rPr lang="en-US" smtClean="0"/>
-              <a:t>2/15/2025</a:t>
+              <a:t>2/17/2025</a:t>
             </a:fld>
             <a:endParaRPr lang="en-US"/>
           </a:p>
@@ -2483,7 +2483,7 @@
           <a:p>
             <a:fld id="{3351EA60-24F6-40E8-A0D7-2067F6ECA6B2}" type="datetime1">
               <a:rPr lang="en-US" smtClean="0"/>
-              <a:t>2/15/2025</a:t>
+              <a:t>2/17/2025</a:t>
             </a:fld>
             <a:endParaRPr lang="en-US"/>
           </a:p>
@@ -2740,7 +2740,7 @@
           <a:p>
             <a:fld id="{C6106440-8C5F-4111-9AD5-D0C1FDF01CE9}" type="datetime1">
               <a:rPr lang="en-US" smtClean="0"/>
-              <a:t>2/15/2025</a:t>
+              <a:t>2/17/2025</a:t>
             </a:fld>
             <a:endParaRPr lang="en-US"/>
           </a:p>
@@ -2953,7 +2953,7 @@
           <a:p>
             <a:fld id="{2A16FEB8-5B01-4F5E-B573-CC516A2AD5E4}" type="datetime1">
               <a:rPr lang="en-US" smtClean="0"/>
-              <a:t>2/15/2025</a:t>
+              <a:t>2/17/2025</a:t>
             </a:fld>
             <a:endParaRPr lang="en-US"/>
           </a:p>
@@ -3394,7 +3394,7 @@
           <a:lstStyle/>
           <a:p>
             <a:r>
-              <a:rPr lang="en-US" noProof="0" dirty="0">
+              <a:rPr lang="pt-PT" noProof="1">
                 <a:solidFill>
                   <a:srgbClr val="002060"/>
                 </a:solidFill>
@@ -3433,7 +3433,7 @@
           <a:lstStyle/>
           <a:p>
             <a:r>
-              <a:rPr lang="en-US" sz="2000" noProof="0" dirty="0">
+              <a:rPr lang="pt-PT" sz="2000" noProof="1">
                 <a:solidFill>
                   <a:srgbClr val="002060"/>
                 </a:solidFill>
@@ -3443,7 +3443,7 @@
           </a:p>
           <a:p>
             <a:r>
-              <a:rPr lang="en-US" sz="2000" noProof="0" dirty="0">
+              <a:rPr lang="pt-PT" sz="2000" noProof="1">
                 <a:solidFill>
                   <a:srgbClr val="002060"/>
                 </a:solidFill>
@@ -3452,7 +3452,7 @@
             </a:r>
           </a:p>
           <a:p>
-            <a:endParaRPr lang="en-US" sz="2000" noProof="0" dirty="0">
+            <a:endParaRPr lang="pt-PT" sz="2000" noProof="1">
               <a:solidFill>
                 <a:srgbClr val="002060"/>
               </a:solidFill>
@@ -3460,7 +3460,7 @@
           </a:p>
           <a:p>
             <a:r>
-              <a:rPr lang="en-US" sz="2000" noProof="0" dirty="0">
+              <a:rPr lang="pt-PT" sz="2000" noProof="1">
                 <a:solidFill>
                   <a:srgbClr val="002060"/>
                 </a:solidFill>
@@ -3492,10 +3492,10 @@
           <a:lstStyle/>
           <a:p>
             <a:fld id="{292A9FD8-515A-4698-9313-0AB17EE9632B}" type="slidenum">
-              <a:rPr lang="en-US" smtClean="0"/>
+              <a:rPr lang="pt-PT" noProof="1" smtClean="0"/>
               <a:t>1</a:t>
             </a:fld>
-            <a:endParaRPr lang="en-US" dirty="0"/>
+            <a:endParaRPr lang="pt-PT" noProof="1"/>
           </a:p>
         </p:txBody>
       </p:sp>
@@ -3513,7 +3513,7 @@
 </file>
 
 <file path=ppt/slides/slide10.xml><?xml version="1.0" encoding="utf-8"?>
-<p:sld xmlns:a="http://schemas.openxmlformats.org/drawingml/2006/main" xmlns:r="http://schemas.openxmlformats.org/officeDocument/2006/relationships" xmlns:p="http://schemas.openxmlformats.org/presentationml/2006/main">
+<p:sld xmlns:a="http://schemas.openxmlformats.org/drawingml/2006/main" xmlns:r="http://schemas.openxmlformats.org/officeDocument/2006/relationships" xmlns:p="http://schemas.openxmlformats.org/presentationml/2006/main" show="0">
   <p:cSld>
     <p:bg>
       <p:bgPr>
@@ -3572,14 +3572,14 @@
           <a:lstStyle/>
           <a:p>
             <a:r>
-              <a:rPr lang="en-US" sz="2800" noProof="0" dirty="0">
+              <a:rPr lang="pt-PT" sz="2800" noProof="1">
                 <a:solidFill>
                   <a:srgbClr val="002060"/>
                 </a:solidFill>
               </a:rPr>
               <a:t>Relational Hoare Logic (2/2)</a:t>
             </a:r>
-            <a:endParaRPr lang="en-US" sz="2800" noProof="0" dirty="0"/>
+            <a:endParaRPr lang="pt-PT" sz="2800" noProof="1"/>
           </a:p>
         </p:txBody>
       </p:sp>
@@ -3612,7 +3612,7 @@
           <a:lstStyle/>
           <a:p>
             <a:r>
-              <a:rPr lang="en-US" sz="2600" noProof="0" dirty="0">
+              <a:rPr lang="pt-PT" sz="2600" noProof="1">
                 <a:solidFill>
                   <a:srgbClr val="002060"/>
                 </a:solidFill>
@@ -3651,7 +3651,7 @@
           <a:lstStyle/>
           <a:p>
             <a:r>
-              <a:rPr lang="en-US" sz="2400" i="1" noProof="0" dirty="0">
+              <a:rPr lang="pt-PT" sz="2400" i="1" noProof="1">
                 <a:solidFill>
                   <a:srgbClr val="002060"/>
                 </a:solidFill>
@@ -3661,7 +3661,7 @@
           </a:p>
           <a:p>
             <a:r>
-              <a:rPr lang="en-US" sz="2400" i="1" noProof="0" dirty="0">
+              <a:rPr lang="pt-PT" sz="2400" i="1" noProof="1">
                 <a:solidFill>
                   <a:srgbClr val="002060"/>
                 </a:solidFill>
@@ -3671,21 +3671,16 @@
           </a:p>
           <a:p>
             <a:r>
-              <a:rPr lang="en-US" sz="2400" i="1" dirty="0">
+              <a:rPr lang="pt-PT" sz="2400" i="1" noProof="1">
                 <a:solidFill>
                   <a:srgbClr val="002060"/>
                 </a:solidFill>
               </a:rPr>
               <a:t>z := y + 1; </a:t>
             </a:r>
-            <a:endParaRPr lang="en-US" sz="2400" i="1" noProof="0" dirty="0">
-              <a:solidFill>
-                <a:srgbClr val="002060"/>
-              </a:solidFill>
-            </a:endParaRPr>
-          </a:p>
-          <a:p>
-            <a:endParaRPr lang="en-US" sz="2400" i="1" noProof="0" dirty="0">
+          </a:p>
+          <a:p>
+            <a:endParaRPr lang="pt-PT" sz="2400" i="1" noProof="1">
               <a:solidFill>
                 <a:srgbClr val="002060"/>
               </a:solidFill>
@@ -3722,7 +3717,7 @@
           <a:lstStyle/>
           <a:p>
             <a:r>
-              <a:rPr lang="en-US" sz="2400" i="1" noProof="0" dirty="0">
+              <a:rPr lang="pt-PT" sz="2400" i="1" noProof="1">
                 <a:solidFill>
                   <a:srgbClr val="002060"/>
                 </a:solidFill>
@@ -3732,7 +3727,7 @@
           </a:p>
           <a:p>
             <a:r>
-              <a:rPr lang="en-US" sz="2400" i="1" noProof="0" dirty="0">
+              <a:rPr lang="pt-PT" sz="2400" i="1" noProof="1">
                 <a:solidFill>
                   <a:srgbClr val="002060"/>
                 </a:solidFill>
@@ -3742,21 +3737,16 @@
           </a:p>
           <a:p>
             <a:r>
-              <a:rPr lang="en-US" sz="2400" i="1" dirty="0">
+              <a:rPr lang="pt-PT" sz="2400" i="1" noProof="1">
                 <a:solidFill>
                   <a:srgbClr val="002060"/>
                 </a:solidFill>
               </a:rPr>
               <a:t>y := z - 1; </a:t>
             </a:r>
-            <a:endParaRPr lang="en-US" sz="2400" i="1" noProof="0" dirty="0">
-              <a:solidFill>
-                <a:srgbClr val="002060"/>
-              </a:solidFill>
-            </a:endParaRPr>
-          </a:p>
-          <a:p>
-            <a:endParaRPr lang="en-US" sz="2400" i="1" noProof="0" dirty="0">
+          </a:p>
+          <a:p>
+            <a:endParaRPr lang="pt-PT" sz="2400" i="1" noProof="1">
               <a:solidFill>
                 <a:srgbClr val="002060"/>
               </a:solidFill>
@@ -3793,27 +3783,19 @@
           <a:lstStyle/>
           <a:p>
             <a:r>
-              <a:rPr lang="el-GR" sz="2400" dirty="0">
-                <a:solidFill>
-                  <a:srgbClr val="002060"/>
-                </a:solidFill>
-              </a:rPr>
-              <a:t>Φ</a:t>
-            </a:r>
-            <a:r>
-              <a:rPr lang="pt-PT" sz="2400" dirty="0">
-                <a:solidFill>
-                  <a:srgbClr val="002060"/>
-                </a:solidFill>
-              </a:rPr>
-              <a:t> </a:t>
-            </a:r>
-            <a:r>
-              <a:rPr lang="en-US" sz="2400" dirty="0"/>
+              <a:rPr lang="pt-PT" sz="2400" noProof="1">
+                <a:solidFill>
+                  <a:srgbClr val="002060"/>
+                </a:solidFill>
+              </a:rPr>
+              <a:t>Φ </a:t>
+            </a:r>
+            <a:r>
+              <a:rPr lang="pt-PT" sz="2400" noProof="1"/>
               <a:t>≜</a:t>
             </a:r>
             <a:r>
-              <a:rPr lang="pt-PT" sz="2400" dirty="0">
+              <a:rPr lang="pt-PT" sz="2400" noProof="1">
                 <a:solidFill>
                   <a:srgbClr val="002060"/>
                 </a:solidFill>
@@ -3823,70 +3805,25 @@
           </a:p>
           <a:p>
             <a:r>
-              <a:rPr lang="el-GR" sz="2400" dirty="0">
-                <a:solidFill>
-                  <a:srgbClr val="002060"/>
-                </a:solidFill>
-              </a:rPr>
-              <a:t>Ψ</a:t>
-            </a:r>
-            <a:r>
-              <a:rPr lang="pt-PT" sz="2400" dirty="0">
-                <a:solidFill>
-                  <a:srgbClr val="002060"/>
-                </a:solidFill>
-              </a:rPr>
-              <a:t> </a:t>
-            </a:r>
-            <a:r>
-              <a:rPr lang="en-US" sz="2400" dirty="0"/>
+              <a:rPr lang="pt-PT" sz="2400" noProof="1">
+                <a:solidFill>
+                  <a:srgbClr val="002060"/>
+                </a:solidFill>
+              </a:rPr>
+              <a:t>Ψ </a:t>
+            </a:r>
+            <a:r>
+              <a:rPr lang="pt-PT" sz="2400" noProof="1"/>
               <a:t>≜</a:t>
             </a:r>
             <a:r>
-              <a:rPr lang="pt-PT" sz="2400" dirty="0">
-                <a:solidFill>
-                  <a:srgbClr val="002060"/>
-                </a:solidFill>
-              </a:rPr>
-              <a:t> P1.x = P2.x </a:t>
-            </a:r>
-            <a:r>
-              <a:rPr lang="en-US" sz="2400" dirty="0">
-                <a:solidFill>
-                  <a:srgbClr val="002060"/>
-                </a:solidFill>
-              </a:rPr>
-              <a:t>∧ </a:t>
-            </a:r>
-            <a:r>
-              <a:rPr lang="pt-PT" sz="2400" dirty="0">
-                <a:solidFill>
-                  <a:srgbClr val="002060"/>
-                </a:solidFill>
-              </a:rPr>
-              <a:t>P1.y = P2.y </a:t>
-            </a:r>
-            <a:r>
-              <a:rPr lang="en-US" sz="2400" dirty="0">
-                <a:solidFill>
-                  <a:srgbClr val="002060"/>
-                </a:solidFill>
-              </a:rPr>
-              <a:t>∧ </a:t>
-            </a:r>
-            <a:r>
-              <a:rPr lang="pt-PT" sz="2400" dirty="0">
-                <a:solidFill>
-                  <a:srgbClr val="002060"/>
-                </a:solidFill>
-              </a:rPr>
-              <a:t>P1.z = P2.z  </a:t>
-            </a:r>
-            <a:endParaRPr lang="en-US" sz="2400" dirty="0">
-              <a:solidFill>
-                <a:srgbClr val="002060"/>
-              </a:solidFill>
-            </a:endParaRPr>
+              <a:rPr lang="pt-PT" sz="2400" noProof="1">
+                <a:solidFill>
+                  <a:srgbClr val="002060"/>
+                </a:solidFill>
+              </a:rPr>
+              <a:t> P1.x = P2.x ∧ P1.y = P2.y ∧ P1.z = P2.z  </a:t>
+            </a:r>
           </a:p>
         </p:txBody>
       </p:sp>
@@ -3912,10 +3849,10 @@
           <a:lstStyle/>
           <a:p>
             <a:fld id="{292A9FD8-515A-4698-9313-0AB17EE9632B}" type="slidenum">
-              <a:rPr lang="en-US" smtClean="0"/>
+              <a:rPr lang="pt-PT" noProof="1" smtClean="0"/>
               <a:t>10</a:t>
             </a:fld>
-            <a:endParaRPr lang="en-US"/>
+            <a:endParaRPr lang="pt-PT" noProof="1"/>
           </a:p>
         </p:txBody>
       </p:sp>
@@ -3933,7 +3870,7 @@
 </file>
 
 <file path=ppt/slides/slide11.xml><?xml version="1.0" encoding="utf-8"?>
-<p:sld xmlns:a="http://schemas.openxmlformats.org/drawingml/2006/main" xmlns:r="http://schemas.openxmlformats.org/officeDocument/2006/relationships" xmlns:p="http://schemas.openxmlformats.org/presentationml/2006/main">
+<p:sld xmlns:a="http://schemas.openxmlformats.org/drawingml/2006/main" xmlns:r="http://schemas.openxmlformats.org/officeDocument/2006/relationships" xmlns:p="http://schemas.openxmlformats.org/presentationml/2006/main" show="0">
   <p:cSld>
     <p:bg>
       <p:bgPr>
@@ -3992,14 +3929,14 @@
           <a:lstStyle/>
           <a:p>
             <a:r>
-              <a:rPr lang="en-US" sz="2800" noProof="0" dirty="0">
+              <a:rPr lang="pt-PT" sz="2800" noProof="1">
                 <a:solidFill>
                   <a:srgbClr val="002060"/>
                 </a:solidFill>
               </a:rPr>
               <a:t>OCaml</a:t>
             </a:r>
-            <a:endParaRPr lang="en-US" sz="2800" noProof="0" dirty="0"/>
+            <a:endParaRPr lang="pt-PT" sz="2800" noProof="1"/>
           </a:p>
         </p:txBody>
       </p:sp>
@@ -4036,7 +3973,7 @@
               <a:buChar char="•"/>
             </a:pPr>
             <a:r>
-              <a:rPr lang="en-US" sz="2200" noProof="0" dirty="0">
+              <a:rPr lang="pt-PT" sz="2200" noProof="1">
                 <a:solidFill>
                   <a:srgbClr val="002060"/>
                 </a:solidFill>
@@ -4050,7 +3987,7 @@
               <a:buChar char="•"/>
             </a:pPr>
             <a:r>
-              <a:rPr lang="en-US" sz="2200" dirty="0">
+              <a:rPr lang="pt-PT" sz="2200" noProof="1">
                 <a:solidFill>
                   <a:srgbClr val="002060"/>
                 </a:solidFill>
@@ -4089,49 +4026,17 @@
           <a:lstStyle/>
           <a:p>
             <a:r>
-              <a:rPr lang="en-US" sz="2200" dirty="0">
-                <a:solidFill>
-                  <a:srgbClr val="002060"/>
-                </a:solidFill>
-              </a:rPr>
-              <a:t>let rec </a:t>
-            </a:r>
-            <a:r>
-              <a:rPr lang="en-US" sz="2200" dirty="0" err="1">
-                <a:solidFill>
-                  <a:srgbClr val="002060"/>
-                </a:solidFill>
-              </a:rPr>
-              <a:t>gcd</a:t>
-            </a:r>
-            <a:r>
-              <a:rPr lang="en-US" sz="2200" dirty="0">
-                <a:solidFill>
-                  <a:srgbClr val="002060"/>
-                </a:solidFill>
-              </a:rPr>
-              <a:t> (a: int) (</a:t>
-            </a:r>
-            <a:r>
-              <a:rPr lang="en-US" sz="2200" dirty="0" err="1">
-                <a:solidFill>
-                  <a:srgbClr val="002060"/>
-                </a:solidFill>
-              </a:rPr>
-              <a:t>b:int</a:t>
-            </a:r>
-            <a:r>
-              <a:rPr lang="en-US" sz="2200" dirty="0">
-                <a:solidFill>
-                  <a:srgbClr val="002060"/>
-                </a:solidFill>
-              </a:rPr>
-              <a:t>) : int =</a:t>
-            </a:r>
-          </a:p>
-          <a:p>
-            <a:r>
-              <a:rPr lang="en-US" sz="2200" dirty="0">
+              <a:rPr lang="pt-PT" sz="2200" noProof="1">
+                <a:solidFill>
+                  <a:srgbClr val="002060"/>
+                </a:solidFill>
+              </a:rPr>
+              <a:t>let rec gcd (a: int) (b:int) : int =</a:t>
+            </a:r>
+          </a:p>
+          <a:p>
+            <a:r>
+              <a:rPr lang="pt-PT" sz="2200" noProof="1">
                 <a:solidFill>
                   <a:srgbClr val="002060"/>
                 </a:solidFill>
@@ -4141,28 +4046,12 @@
           </a:p>
           <a:p>
             <a:r>
-              <a:rPr lang="en-US" sz="2200" dirty="0">
-                <a:solidFill>
-                  <a:srgbClr val="002060"/>
-                </a:solidFill>
-              </a:rPr>
-              <a:t>   else </a:t>
-            </a:r>
-            <a:r>
-              <a:rPr lang="en-US" sz="2200" dirty="0" err="1">
-                <a:solidFill>
-                  <a:srgbClr val="002060"/>
-                </a:solidFill>
-              </a:rPr>
-              <a:t>gcd</a:t>
-            </a:r>
-            <a:r>
-              <a:rPr lang="en-US" sz="2200" dirty="0">
-                <a:solidFill>
-                  <a:srgbClr val="002060"/>
-                </a:solidFill>
-              </a:rPr>
-              <a:t> b (mod a b)</a:t>
+              <a:rPr lang="pt-PT" sz="2200" noProof="1">
+                <a:solidFill>
+                  <a:srgbClr val="002060"/>
+                </a:solidFill>
+              </a:rPr>
+              <a:t>   else gcd b (mod a b)</a:t>
             </a:r>
           </a:p>
         </p:txBody>
@@ -4196,33 +4085,17 @@
           <a:lstStyle/>
           <a:p>
             <a:r>
-              <a:rPr lang="en-US" sz="2200" dirty="0">
-                <a:solidFill>
-                  <a:srgbClr val="002060"/>
-                </a:solidFill>
-              </a:rPr>
-              <a:t>let </a:t>
-            </a:r>
-            <a:r>
-              <a:rPr lang="en-US" sz="2200" dirty="0" err="1">
-                <a:solidFill>
-                  <a:srgbClr val="002060"/>
-                </a:solidFill>
-              </a:rPr>
-              <a:t>gcd_iter</a:t>
-            </a:r>
-            <a:r>
-              <a:rPr lang="en-US" sz="2200" dirty="0">
-                <a:solidFill>
-                  <a:srgbClr val="002060"/>
-                </a:solidFill>
-              </a:rPr>
-              <a:t> (a0: int)      (b0: int) : int =   </a:t>
-            </a:r>
-          </a:p>
-          <a:p>
-            <a:r>
-              <a:rPr lang="en-US" sz="2200" dirty="0">
+              <a:rPr lang="pt-PT" sz="2200" noProof="1">
+                <a:solidFill>
+                  <a:srgbClr val="002060"/>
+                </a:solidFill>
+              </a:rPr>
+              <a:t>let gcd_iter (a0: int)      (b0: int) : int =   </a:t>
+            </a:r>
+          </a:p>
+          <a:p>
+            <a:r>
+              <a:rPr lang="pt-PT" sz="2200" noProof="1">
                 <a:solidFill>
                   <a:srgbClr val="002060"/>
                 </a:solidFill>
@@ -4232,7 +4105,7 @@
           </a:p>
           <a:p>
             <a:r>
-              <a:rPr lang="en-US" sz="2200" dirty="0">
+              <a:rPr lang="pt-PT" sz="2200" noProof="1">
                 <a:solidFill>
                   <a:srgbClr val="002060"/>
                 </a:solidFill>
@@ -4242,7 +4115,7 @@
           </a:p>
           <a:p>
             <a:r>
-              <a:rPr lang="en-US" sz="2200" dirty="0">
+              <a:rPr lang="pt-PT" sz="2200" noProof="1">
                 <a:solidFill>
                   <a:srgbClr val="002060"/>
                 </a:solidFill>
@@ -4252,33 +4125,17 @@
           </a:p>
           <a:p>
             <a:r>
-              <a:rPr lang="en-US" sz="2200" dirty="0">
-                <a:solidFill>
-                  <a:srgbClr val="002060"/>
-                </a:solidFill>
-              </a:rPr>
-              <a:t>          let </a:t>
-            </a:r>
-            <a:r>
-              <a:rPr lang="en-US" sz="2200" dirty="0" err="1">
-                <a:solidFill>
-                  <a:srgbClr val="002060"/>
-                </a:solidFill>
-              </a:rPr>
-              <a:t>tmp</a:t>
-            </a:r>
-            <a:r>
-              <a:rPr lang="en-US" sz="2200" dirty="0">
-                <a:solidFill>
-                  <a:srgbClr val="002060"/>
-                </a:solidFill>
-              </a:rPr>
-              <a:t> = !a in</a:t>
-            </a:r>
-          </a:p>
-          <a:p>
-            <a:r>
-              <a:rPr lang="en-US" sz="2200" dirty="0">
+              <a:rPr lang="pt-PT" sz="2200" noProof="1">
+                <a:solidFill>
+                  <a:srgbClr val="002060"/>
+                </a:solidFill>
+              </a:rPr>
+              <a:t>          let tmp = !a in</a:t>
+            </a:r>
+          </a:p>
+          <a:p>
+            <a:r>
+              <a:rPr lang="pt-PT" sz="2200" noProof="1">
                 <a:solidFill>
                   <a:srgbClr val="002060"/>
                 </a:solidFill>
@@ -4288,33 +4145,17 @@
           </a:p>
           <a:p>
             <a:r>
-              <a:rPr lang="en-US" sz="2200" dirty="0">
-                <a:solidFill>
-                  <a:srgbClr val="002060"/>
-                </a:solidFill>
-              </a:rPr>
-              <a:t>          b := </a:t>
-            </a:r>
-            <a:r>
-              <a:rPr lang="en-US" sz="2200" dirty="0" err="1">
-                <a:solidFill>
-                  <a:srgbClr val="002060"/>
-                </a:solidFill>
-              </a:rPr>
-              <a:t>tmp</a:t>
-            </a:r>
-            <a:r>
-              <a:rPr lang="en-US" sz="2200" dirty="0">
-                <a:solidFill>
-                  <a:srgbClr val="002060"/>
-                </a:solidFill>
-              </a:rPr>
-              <a:t> mod !b</a:t>
-            </a:r>
-          </a:p>
-          <a:p>
-            <a:r>
-              <a:rPr lang="en-US" sz="2200" dirty="0">
+              <a:rPr lang="pt-PT" sz="2200" noProof="1">
+                <a:solidFill>
+                  <a:srgbClr val="002060"/>
+                </a:solidFill>
+              </a:rPr>
+              <a:t>          b := tmp mod !b</a:t>
+            </a:r>
+          </a:p>
+          <a:p>
+            <a:r>
+              <a:rPr lang="pt-PT" sz="2200" noProof="1">
                 <a:solidFill>
                   <a:srgbClr val="002060"/>
                 </a:solidFill>
@@ -4324,7 +4165,7 @@
           </a:p>
           <a:p>
             <a:r>
-              <a:rPr lang="en-US" sz="2200" dirty="0">
+              <a:rPr lang="pt-PT" sz="2200" noProof="1">
                 <a:solidFill>
                   <a:srgbClr val="002060"/>
                 </a:solidFill>
@@ -4364,18 +4205,13 @@
           <a:p>
             <a:pPr algn="ctr"/>
             <a:r>
-              <a:rPr lang="pt-PT" sz="2200" b="1" dirty="0" err="1">
+              <a:rPr lang="pt-PT" sz="2200" b="1" noProof="1">
                 <a:solidFill>
                   <a:srgbClr val="002060"/>
                 </a:solidFill>
               </a:rPr>
               <a:t>Imperative</a:t>
             </a:r>
-            <a:endParaRPr lang="en-US" sz="2200" b="1" dirty="0">
-              <a:solidFill>
-                <a:srgbClr val="002060"/>
-              </a:solidFill>
-            </a:endParaRPr>
           </a:p>
         </p:txBody>
       </p:sp>
@@ -4409,18 +4245,13 @@
           <a:p>
             <a:pPr algn="ctr"/>
             <a:r>
-              <a:rPr lang="pt-PT" sz="2200" b="1" dirty="0" err="1">
+              <a:rPr lang="pt-PT" sz="2200" b="1" noProof="1">
                 <a:solidFill>
                   <a:srgbClr val="002060"/>
                 </a:solidFill>
               </a:rPr>
               <a:t>Functional</a:t>
             </a:r>
-            <a:endParaRPr lang="en-US" sz="2200" b="1" dirty="0">
-              <a:solidFill>
-                <a:srgbClr val="002060"/>
-              </a:solidFill>
-            </a:endParaRPr>
           </a:p>
         </p:txBody>
       </p:sp>
@@ -4446,10 +4277,10 @@
           <a:lstStyle/>
           <a:p>
             <a:fld id="{292A9FD8-515A-4698-9313-0AB17EE9632B}" type="slidenum">
-              <a:rPr lang="en-US" smtClean="0"/>
+              <a:rPr lang="pt-PT" noProof="1" smtClean="0"/>
               <a:t>11</a:t>
             </a:fld>
-            <a:endParaRPr lang="en-US"/>
+            <a:endParaRPr lang="pt-PT" noProof="1"/>
           </a:p>
         </p:txBody>
       </p:sp>
@@ -4467,7 +4298,7 @@
 </file>
 
 <file path=ppt/slides/slide12.xml><?xml version="1.0" encoding="utf-8"?>
-<p:sld xmlns:a="http://schemas.openxmlformats.org/drawingml/2006/main" xmlns:r="http://schemas.openxmlformats.org/officeDocument/2006/relationships" xmlns:p="http://schemas.openxmlformats.org/presentationml/2006/main">
+<p:sld xmlns:a="http://schemas.openxmlformats.org/drawingml/2006/main" xmlns:r="http://schemas.openxmlformats.org/officeDocument/2006/relationships" xmlns:p="http://schemas.openxmlformats.org/presentationml/2006/main" show="0">
   <p:cSld>
     <p:bg>
       <p:bgPr>
@@ -4526,14 +4357,14 @@
           <a:lstStyle/>
           <a:p>
             <a:r>
-              <a:rPr lang="en-US" sz="2800" noProof="0" dirty="0">
+              <a:rPr lang="pt-PT" sz="2800" noProof="1">
                 <a:solidFill>
                   <a:srgbClr val="002060"/>
                 </a:solidFill>
               </a:rPr>
               <a:t>Why3</a:t>
             </a:r>
-            <a:endParaRPr lang="en-US" sz="2800" noProof="0" dirty="0"/>
+            <a:endParaRPr lang="pt-PT" sz="2800" noProof="1"/>
           </a:p>
         </p:txBody>
       </p:sp>
@@ -4559,10 +4390,10 @@
           <a:lstStyle/>
           <a:p>
             <a:fld id="{292A9FD8-515A-4698-9313-0AB17EE9632B}" type="slidenum">
-              <a:rPr lang="en-US" smtClean="0"/>
+              <a:rPr lang="pt-PT" noProof="1" smtClean="0"/>
               <a:t>12</a:t>
             </a:fld>
-            <a:endParaRPr lang="en-US"/>
+            <a:endParaRPr lang="pt-PT" noProof="1"/>
           </a:p>
         </p:txBody>
       </p:sp>
@@ -4599,7 +4430,7 @@
               <a:buChar char="•"/>
             </a:pPr>
             <a:r>
-              <a:rPr lang="en-US" sz="2400" dirty="0">
+              <a:rPr lang="pt-PT" sz="2400" noProof="1">
                 <a:solidFill>
                   <a:srgbClr val="002060"/>
                 </a:solidFill>
@@ -4613,20 +4444,12 @@
               <a:buChar char="•"/>
             </a:pPr>
             <a:r>
-              <a:rPr lang="en-US" sz="2400" noProof="0" dirty="0">
-                <a:solidFill>
-                  <a:srgbClr val="002060"/>
-                </a:solidFill>
-              </a:rPr>
-              <a:t>Establishes the bridge </a:t>
-            </a:r>
-            <a:r>
-              <a:rPr lang="en-US" sz="2400" dirty="0">
-                <a:solidFill>
-                  <a:srgbClr val="002060"/>
-                </a:solidFill>
-              </a:rPr>
-              <a:t>between the programmer and different types of theorem provers:</a:t>
+              <a:rPr lang="pt-PT" sz="2400" noProof="1">
+                <a:solidFill>
+                  <a:srgbClr val="002060"/>
+                </a:solidFill>
+              </a:rPr>
+              <a:t>Establishes the bridge between the programmer and different types of theorem provers:</a:t>
             </a:r>
           </a:p>
           <a:p>
@@ -4635,7 +4458,7 @@
               <a:buChar char="Ø"/>
             </a:pPr>
             <a:r>
-              <a:rPr lang="en-US" sz="2400" dirty="0">
+              <a:rPr lang="pt-PT" sz="2400" noProof="1">
                 <a:solidFill>
                   <a:srgbClr val="002060"/>
                 </a:solidFill>
@@ -4649,7 +4472,7 @@
               <a:buChar char="Ø"/>
             </a:pPr>
             <a:r>
-              <a:rPr lang="en-US" sz="2400" dirty="0">
+              <a:rPr lang="pt-PT" sz="2400" noProof="1">
                 <a:solidFill>
                   <a:srgbClr val="002060"/>
                 </a:solidFill>
@@ -4663,7 +4486,7 @@
               <a:buChar char="Ø"/>
             </a:pPr>
             <a:r>
-              <a:rPr lang="en-US" sz="2400" dirty="0">
+              <a:rPr lang="pt-PT" sz="2400" noProof="1">
                 <a:solidFill>
                   <a:srgbClr val="002060"/>
                 </a:solidFill>
@@ -4672,7 +4495,7 @@
             </a:r>
           </a:p>
           <a:p>
-            <a:endParaRPr lang="en-US" sz="2200" noProof="0" dirty="0">
+            <a:endParaRPr lang="pt-PT" sz="2200" noProof="1">
               <a:solidFill>
                 <a:srgbClr val="002060"/>
               </a:solidFill>
@@ -4694,7 +4517,7 @@
 </file>
 
 <file path=ppt/slides/slide13.xml><?xml version="1.0" encoding="utf-8"?>
-<p:sld xmlns:a="http://schemas.openxmlformats.org/drawingml/2006/main" xmlns:r="http://schemas.openxmlformats.org/officeDocument/2006/relationships" xmlns:p="http://schemas.openxmlformats.org/presentationml/2006/main">
+<p:sld xmlns:a="http://schemas.openxmlformats.org/drawingml/2006/main" xmlns:r="http://schemas.openxmlformats.org/officeDocument/2006/relationships" xmlns:p="http://schemas.openxmlformats.org/presentationml/2006/main" show="0">
   <p:cSld>
     <p:bg>
       <p:bgPr>
@@ -4753,14 +4576,14 @@
           <a:lstStyle/>
           <a:p>
             <a:r>
-              <a:rPr lang="en-US" sz="2800" noProof="0" dirty="0">
+              <a:rPr lang="pt-PT" sz="2800" noProof="1">
                 <a:solidFill>
                   <a:srgbClr val="002060"/>
                 </a:solidFill>
               </a:rPr>
               <a:t>GOSPEL (1/2)</a:t>
             </a:r>
-            <a:endParaRPr lang="en-US" sz="2800" noProof="0" dirty="0"/>
+            <a:endParaRPr lang="pt-PT" sz="2800" noProof="1"/>
           </a:p>
         </p:txBody>
       </p:sp>
@@ -4786,10 +4609,10 @@
           <a:lstStyle/>
           <a:p>
             <a:fld id="{292A9FD8-515A-4698-9313-0AB17EE9632B}" type="slidenum">
-              <a:rPr lang="en-US" smtClean="0"/>
+              <a:rPr lang="pt-PT" noProof="1" smtClean="0"/>
               <a:t>13</a:t>
             </a:fld>
-            <a:endParaRPr lang="en-US"/>
+            <a:endParaRPr lang="pt-PT" noProof="1"/>
           </a:p>
         </p:txBody>
       </p:sp>
@@ -4826,44 +4649,12 @@
               <a:buChar char="•"/>
             </a:pPr>
             <a:r>
-              <a:rPr lang="en-US" sz="2400" dirty="0">
-                <a:solidFill>
-                  <a:srgbClr val="002060"/>
-                </a:solidFill>
-              </a:rPr>
-              <a:t>Generic </a:t>
-            </a:r>
-            <a:r>
-              <a:rPr lang="en-US" sz="2400" dirty="0" err="1">
-                <a:solidFill>
-                  <a:srgbClr val="002060"/>
-                </a:solidFill>
-              </a:rPr>
-              <a:t>Ocaml</a:t>
-            </a:r>
-            <a:r>
-              <a:rPr lang="en-US" sz="2400" dirty="0">
-                <a:solidFill>
-                  <a:srgbClr val="002060"/>
-                </a:solidFill>
-              </a:rPr>
-              <a:t> </a:t>
-            </a:r>
-            <a:r>
-              <a:rPr lang="en-US" sz="2400" dirty="0" err="1">
-                <a:solidFill>
-                  <a:srgbClr val="002060"/>
-                </a:solidFill>
-              </a:rPr>
-              <a:t>SPEcification</a:t>
-            </a:r>
-            <a:r>
-              <a:rPr lang="en-US" sz="2400" dirty="0">
-                <a:solidFill>
-                  <a:srgbClr val="002060"/>
-                </a:solidFill>
-              </a:rPr>
-              <a:t> Language</a:t>
+              <a:rPr lang="pt-PT" sz="2400" noProof="1">
+                <a:solidFill>
+                  <a:srgbClr val="002060"/>
+                </a:solidFill>
+              </a:rPr>
+              <a:t>Generic Ocaml SPEcification Language</a:t>
             </a:r>
           </a:p>
           <a:p>
@@ -4872,7 +4663,7 @@
               <a:buChar char="•"/>
             </a:pPr>
             <a:r>
-              <a:rPr lang="en-US" sz="2400" dirty="0">
+              <a:rPr lang="pt-PT" sz="2400" noProof="1">
                 <a:solidFill>
                   <a:srgbClr val="002060"/>
                 </a:solidFill>
@@ -4886,7 +4677,7 @@
               <a:buChar char="•"/>
             </a:pPr>
             <a:r>
-              <a:rPr lang="en-US" sz="2400" dirty="0">
+              <a:rPr lang="pt-PT" sz="2400" noProof="1">
                 <a:solidFill>
                   <a:srgbClr val="002060"/>
                 </a:solidFill>
@@ -4900,7 +4691,7 @@
               <a:buChar char="•"/>
             </a:pPr>
             <a:r>
-              <a:rPr lang="en-US" sz="2400" dirty="0">
+              <a:rPr lang="pt-PT" sz="2400" noProof="1">
                 <a:solidFill>
                   <a:srgbClr val="002060"/>
                 </a:solidFill>
@@ -4924,7 +4715,7 @@
 </file>
 
 <file path=ppt/slides/slide14.xml><?xml version="1.0" encoding="utf-8"?>
-<p:sld xmlns:a="http://schemas.openxmlformats.org/drawingml/2006/main" xmlns:r="http://schemas.openxmlformats.org/officeDocument/2006/relationships" xmlns:p="http://schemas.openxmlformats.org/presentationml/2006/main">
+<p:sld xmlns:a="http://schemas.openxmlformats.org/drawingml/2006/main" xmlns:r="http://schemas.openxmlformats.org/officeDocument/2006/relationships" xmlns:p="http://schemas.openxmlformats.org/presentationml/2006/main" show="0">
   <p:cSld>
     <p:bg>
       <p:bgPr>
@@ -4983,14 +4774,14 @@
           <a:lstStyle/>
           <a:p>
             <a:r>
-              <a:rPr lang="en-US" sz="2800" noProof="0" dirty="0">
+              <a:rPr lang="pt-PT" sz="2800" noProof="1">
                 <a:solidFill>
                   <a:srgbClr val="002060"/>
                 </a:solidFill>
               </a:rPr>
               <a:t>GOSPEL (2/2)</a:t>
             </a:r>
-            <a:endParaRPr lang="en-US" sz="2800" noProof="0" dirty="0"/>
+            <a:endParaRPr lang="pt-PT" sz="2800" noProof="1"/>
           </a:p>
         </p:txBody>
       </p:sp>
@@ -5016,10 +4807,10 @@
           <a:lstStyle/>
           <a:p>
             <a:fld id="{292A9FD8-515A-4698-9313-0AB17EE9632B}" type="slidenum">
-              <a:rPr lang="en-US" smtClean="0"/>
+              <a:rPr lang="pt-PT" noProof="1" smtClean="0"/>
               <a:t>14</a:t>
             </a:fld>
-            <a:endParaRPr lang="en-US"/>
+            <a:endParaRPr lang="pt-PT" noProof="1"/>
           </a:p>
         </p:txBody>
       </p:sp>
@@ -5052,18 +4843,13 @@
           <a:lstStyle/>
           <a:p>
             <a:r>
-              <a:rPr lang="pt-PT" sz="2400" dirty="0">
+              <a:rPr lang="pt-PT" sz="2400" noProof="1">
                 <a:solidFill>
                   <a:srgbClr val="002060"/>
                 </a:solidFill>
               </a:rPr>
               <a:t>METER CODIGO AQUI!!!</a:t>
             </a:r>
-            <a:endParaRPr lang="en-US" sz="2400" dirty="0">
-              <a:solidFill>
-                <a:srgbClr val="002060"/>
-              </a:solidFill>
-            </a:endParaRPr>
           </a:p>
         </p:txBody>
       </p:sp>
@@ -5081,7 +4867,7 @@
 </file>
 
 <file path=ppt/slides/slide15.xml><?xml version="1.0" encoding="utf-8"?>
-<p:sld xmlns:a="http://schemas.openxmlformats.org/drawingml/2006/main" xmlns:r="http://schemas.openxmlformats.org/officeDocument/2006/relationships" xmlns:p="http://schemas.openxmlformats.org/presentationml/2006/main">
+<p:sld xmlns:a="http://schemas.openxmlformats.org/drawingml/2006/main" xmlns:r="http://schemas.openxmlformats.org/officeDocument/2006/relationships" xmlns:p="http://schemas.openxmlformats.org/presentationml/2006/main" show="0">
   <p:cSld>
     <p:bg>
       <p:bgPr>
@@ -5140,14 +4926,14 @@
           <a:lstStyle/>
           <a:p>
             <a:r>
-              <a:rPr lang="en-US" sz="2800" noProof="0" dirty="0">
+              <a:rPr lang="pt-PT" sz="2800" noProof="1">
                 <a:solidFill>
                   <a:srgbClr val="002060"/>
                 </a:solidFill>
               </a:rPr>
               <a:t>Cameleer</a:t>
             </a:r>
-            <a:endParaRPr lang="en-US" sz="2800" noProof="0" dirty="0"/>
+            <a:endParaRPr lang="pt-PT" sz="2800" noProof="1"/>
           </a:p>
         </p:txBody>
       </p:sp>
@@ -5173,10 +4959,10 @@
           <a:lstStyle/>
           <a:p>
             <a:fld id="{292A9FD8-515A-4698-9313-0AB17EE9632B}" type="slidenum">
-              <a:rPr lang="en-US" smtClean="0"/>
+              <a:rPr lang="pt-PT" noProof="1" smtClean="0"/>
               <a:t>15</a:t>
             </a:fld>
-            <a:endParaRPr lang="en-US"/>
+            <a:endParaRPr lang="pt-PT" noProof="1"/>
           </a:p>
         </p:txBody>
       </p:sp>
@@ -5254,14 +5040,14 @@
           <a:p>
             <a:pPr algn="ctr"/>
             <a:r>
-              <a:rPr lang="en-US" sz="4800" noProof="0" dirty="0">
+              <a:rPr lang="pt-PT" sz="4800" noProof="1">
                 <a:solidFill>
                   <a:srgbClr val="002060"/>
                 </a:solidFill>
               </a:rPr>
               <a:t>State of the Art</a:t>
             </a:r>
-            <a:endParaRPr lang="en-US" sz="4800" noProof="0" dirty="0"/>
+            <a:endParaRPr lang="pt-PT" sz="4800" noProof="1"/>
           </a:p>
         </p:txBody>
       </p:sp>
@@ -5287,10 +5073,10 @@
           <a:lstStyle/>
           <a:p>
             <a:fld id="{292A9FD8-515A-4698-9313-0AB17EE9632B}" type="slidenum">
-              <a:rPr lang="en-US" smtClean="0"/>
+              <a:rPr lang="pt-PT" noProof="1" smtClean="0"/>
               <a:t>16</a:t>
             </a:fld>
-            <a:endParaRPr lang="en-US"/>
+            <a:endParaRPr lang="pt-PT" noProof="1"/>
           </a:p>
         </p:txBody>
       </p:sp>
@@ -5367,14 +5153,14 @@
           <a:lstStyle/>
           <a:p>
             <a:r>
-              <a:rPr lang="en-US" sz="2800" noProof="0" dirty="0">
+              <a:rPr lang="pt-PT" sz="2800" noProof="1">
                 <a:solidFill>
                   <a:srgbClr val="002060"/>
                 </a:solidFill>
               </a:rPr>
               <a:t>Self-composition</a:t>
             </a:r>
-            <a:endParaRPr lang="en-US" sz="2800" noProof="0" dirty="0"/>
+            <a:endParaRPr lang="pt-PT" sz="2800" noProof="1"/>
           </a:p>
         </p:txBody>
       </p:sp>
@@ -5400,10 +5186,81 @@
           <a:lstStyle/>
           <a:p>
             <a:fld id="{292A9FD8-515A-4698-9313-0AB17EE9632B}" type="slidenum">
-              <a:rPr lang="en-US" smtClean="0"/>
+              <a:rPr lang="pt-PT" noProof="1" smtClean="0"/>
               <a:t>17</a:t>
             </a:fld>
-            <a:endParaRPr lang="en-US"/>
+            <a:endParaRPr lang="pt-PT" noProof="1"/>
+          </a:p>
+        </p:txBody>
+      </p:sp>
+      <p:sp>
+        <p:nvSpPr>
+          <p:cNvPr id="4" name="TextBox 3">
+            <a:extLst>
+              <a:ext uri="{FF2B5EF4-FFF2-40B4-BE49-F238E27FC236}">
+                <a16:creationId xmlns:a16="http://schemas.microsoft.com/office/drawing/2014/main" id="{FA310BAE-8658-5E98-07FF-83FA2CFAB5DB}"/>
+              </a:ext>
+            </a:extLst>
+          </p:cNvPr>
+          <p:cNvSpPr txBox="1"/>
+          <p:nvPr/>
+        </p:nvSpPr>
+        <p:spPr>
+          <a:xfrm>
+            <a:off x="469556" y="1964948"/>
+            <a:ext cx="7249298" cy="1785104"/>
+          </a:xfrm>
+          <a:prstGeom prst="rect">
+            <a:avLst/>
+          </a:prstGeom>
+          <a:noFill/>
+        </p:spPr>
+        <p:txBody>
+          <a:bodyPr wrap="square" rtlCol="0">
+            <a:spAutoFit/>
+          </a:bodyPr>
+          <a:lstStyle/>
+          <a:p>
+            <a:pPr marL="342900" indent="-342900">
+              <a:buFont typeface="Arial" panose="020B0604020202020204" pitchFamily="34" charset="0"/>
+              <a:buChar char="•"/>
+            </a:pPr>
+            <a:r>
+              <a:rPr lang="pt-PT" sz="2200" noProof="1">
+                <a:solidFill>
+                  <a:srgbClr val="002060"/>
+                </a:solidFill>
+              </a:rPr>
+              <a:t>Originally developed to control information flow in a more extensible and flexible way than type systems</a:t>
+            </a:r>
+          </a:p>
+          <a:p>
+            <a:pPr marL="342900" indent="-342900">
+              <a:buFont typeface="Arial" panose="020B0604020202020204" pitchFamily="34" charset="0"/>
+              <a:buChar char="•"/>
+            </a:pPr>
+            <a:r>
+              <a:rPr lang="pt-PT" sz="2200" noProof="1">
+                <a:solidFill>
+                  <a:srgbClr val="002060"/>
+                </a:solidFill>
+              </a:rPr>
+              <a:t>It is highly expressive, and there is no need to prove its soundness as one would with type systems</a:t>
+            </a:r>
+          </a:p>
+          <a:p>
+            <a:pPr marL="342900" indent="-342900">
+              <a:buFont typeface="Arial" panose="020B0604020202020204" pitchFamily="34" charset="0"/>
+              <a:buChar char="•"/>
+            </a:pPr>
+            <a:r>
+              <a:rPr lang="pt-PT" sz="2200" noProof="1">
+                <a:solidFill>
+                  <a:srgbClr val="002060"/>
+                </a:solidFill>
+              </a:rPr>
+              <a:t>Despite being considerably complete, it is impractical</a:t>
+            </a:r>
           </a:p>
         </p:txBody>
       </p:sp>
@@ -5480,14 +5337,14 @@
           <a:lstStyle/>
           <a:p>
             <a:r>
-              <a:rPr lang="en-US" sz="2800" noProof="0" dirty="0">
+              <a:rPr lang="pt-PT" sz="2800" noProof="1">
                 <a:solidFill>
                   <a:srgbClr val="002060"/>
                 </a:solidFill>
               </a:rPr>
               <a:t>Cross-products</a:t>
             </a:r>
-            <a:endParaRPr lang="en-US" sz="2800" noProof="0" dirty="0"/>
+            <a:endParaRPr lang="pt-PT" sz="2800" noProof="1"/>
           </a:p>
         </p:txBody>
       </p:sp>
@@ -5513,10 +5370,81 @@
           <a:lstStyle/>
           <a:p>
             <a:fld id="{292A9FD8-515A-4698-9313-0AB17EE9632B}" type="slidenum">
-              <a:rPr lang="en-US" smtClean="0"/>
+              <a:rPr lang="pt-PT" noProof="1" smtClean="0"/>
               <a:t>18</a:t>
             </a:fld>
-            <a:endParaRPr lang="en-US"/>
+            <a:endParaRPr lang="pt-PT" noProof="1"/>
+          </a:p>
+        </p:txBody>
+      </p:sp>
+      <p:sp>
+        <p:nvSpPr>
+          <p:cNvPr id="4" name="TextBox 3">
+            <a:extLst>
+              <a:ext uri="{FF2B5EF4-FFF2-40B4-BE49-F238E27FC236}">
+                <a16:creationId xmlns:a16="http://schemas.microsoft.com/office/drawing/2014/main" id="{79BC8E7C-0485-F468-57E1-C778AF5D85A0}"/>
+              </a:ext>
+            </a:extLst>
+          </p:cNvPr>
+          <p:cNvSpPr txBox="1"/>
+          <p:nvPr/>
+        </p:nvSpPr>
+        <p:spPr>
+          <a:xfrm>
+            <a:off x="469556" y="1964948"/>
+            <a:ext cx="7249298" cy="1785104"/>
+          </a:xfrm>
+          <a:prstGeom prst="rect">
+            <a:avLst/>
+          </a:prstGeom>
+          <a:noFill/>
+        </p:spPr>
+        <p:txBody>
+          <a:bodyPr wrap="square" rtlCol="0">
+            <a:spAutoFit/>
+          </a:bodyPr>
+          <a:lstStyle/>
+          <a:p>
+            <a:pPr marL="342900" indent="-342900">
+              <a:buFont typeface="Arial" panose="020B0604020202020204" pitchFamily="34" charset="0"/>
+              <a:buChar char="•"/>
+            </a:pPr>
+            <a:r>
+              <a:rPr lang="pt-PT" sz="2200" noProof="1">
+                <a:solidFill>
+                  <a:srgbClr val="002060"/>
+                </a:solidFill>
+              </a:rPr>
+              <a:t>Started as a method to prove program equivalence, focused on compiler optimizations</a:t>
+            </a:r>
+          </a:p>
+          <a:p>
+            <a:pPr marL="342900" indent="-342900">
+              <a:buFont typeface="Arial" panose="020B0604020202020204" pitchFamily="34" charset="0"/>
+              <a:buChar char="•"/>
+            </a:pPr>
+            <a:r>
+              <a:rPr lang="pt-PT" sz="2200" noProof="1">
+                <a:solidFill>
+                  <a:srgbClr val="002060"/>
+                </a:solidFill>
+              </a:rPr>
+              <a:t>Supports most intraprocedural compiler optimizations</a:t>
+            </a:r>
+          </a:p>
+          <a:p>
+            <a:pPr marL="342900" indent="-342900">
+              <a:buFont typeface="Arial" panose="020B0604020202020204" pitchFamily="34" charset="0"/>
+              <a:buChar char="•"/>
+            </a:pPr>
+            <a:r>
+              <a:rPr lang="pt-PT" sz="2200" noProof="1">
+                <a:solidFill>
+                  <a:srgbClr val="002060"/>
+                </a:solidFill>
+              </a:rPr>
+              <a:t>Not applicable to two programs with dissimilar structures</a:t>
+            </a:r>
           </a:p>
         </p:txBody>
       </p:sp>
@@ -5593,14 +5521,14 @@
           <a:lstStyle/>
           <a:p>
             <a:r>
-              <a:rPr lang="en-US" sz="2800" noProof="0" dirty="0">
+              <a:rPr lang="pt-PT" sz="2800" noProof="1">
                 <a:solidFill>
                   <a:srgbClr val="002060"/>
                 </a:solidFill>
               </a:rPr>
               <a:t>Product Programs</a:t>
             </a:r>
-            <a:endParaRPr lang="en-US" sz="2800" noProof="0" dirty="0"/>
+            <a:endParaRPr lang="pt-PT" sz="2800" noProof="1"/>
           </a:p>
         </p:txBody>
       </p:sp>
@@ -5626,10 +5554,131 @@
           <a:lstStyle/>
           <a:p>
             <a:fld id="{292A9FD8-515A-4698-9313-0AB17EE9632B}" type="slidenum">
-              <a:rPr lang="en-US" smtClean="0"/>
+              <a:rPr lang="pt-PT" noProof="1" smtClean="0"/>
               <a:t>19</a:t>
             </a:fld>
-            <a:endParaRPr lang="en-US"/>
+            <a:endParaRPr lang="pt-PT" noProof="1"/>
+          </a:p>
+        </p:txBody>
+      </p:sp>
+      <p:sp>
+        <p:nvSpPr>
+          <p:cNvPr id="4" name="TextBox 3">
+            <a:extLst>
+              <a:ext uri="{FF2B5EF4-FFF2-40B4-BE49-F238E27FC236}">
+                <a16:creationId xmlns:a16="http://schemas.microsoft.com/office/drawing/2014/main" id="{A939828F-55D3-1B9B-B591-306BC72A6214}"/>
+              </a:ext>
+            </a:extLst>
+          </p:cNvPr>
+          <p:cNvSpPr txBox="1"/>
+          <p:nvPr/>
+        </p:nvSpPr>
+        <p:spPr>
+          <a:xfrm>
+            <a:off x="469555" y="1948472"/>
+            <a:ext cx="8045795" cy="2800767"/>
+          </a:xfrm>
+          <a:prstGeom prst="rect">
+            <a:avLst/>
+          </a:prstGeom>
+          <a:noFill/>
+        </p:spPr>
+        <p:txBody>
+          <a:bodyPr wrap="square" rtlCol="0">
+            <a:spAutoFit/>
+          </a:bodyPr>
+          <a:lstStyle/>
+          <a:p>
+            <a:pPr marL="342900" indent="-342900">
+              <a:buFont typeface="Arial" panose="020B0604020202020204" pitchFamily="34" charset="0"/>
+              <a:buChar char="•"/>
+            </a:pPr>
+            <a:r>
+              <a:rPr lang="pt-PT" sz="2200" noProof="1">
+                <a:solidFill>
+                  <a:srgbClr val="002060"/>
+                </a:solidFill>
+              </a:rPr>
+              <a:t>Combines the best of self-composition and cross-products</a:t>
+            </a:r>
+          </a:p>
+          <a:p>
+            <a:pPr marL="800100" lvl="1" indent="-342900">
+              <a:buFont typeface="Wingdings" panose="05000000000000000000" pitchFamily="2" charset="2"/>
+              <a:buChar char="Ø"/>
+            </a:pPr>
+            <a:r>
+              <a:rPr lang="pt-PT" sz="2200" noProof="1">
+                <a:solidFill>
+                  <a:srgbClr val="002060"/>
+                </a:solidFill>
+              </a:rPr>
+              <a:t>Flexibility of self-composition for asynchronous steps</a:t>
+            </a:r>
+          </a:p>
+          <a:p>
+            <a:pPr marL="800100" lvl="1" indent="-342900">
+              <a:buFont typeface="Wingdings" panose="05000000000000000000" pitchFamily="2" charset="2"/>
+              <a:buChar char="Ø"/>
+            </a:pPr>
+            <a:r>
+              <a:rPr lang="pt-PT" sz="2200" noProof="1">
+                <a:solidFill>
+                  <a:srgbClr val="002060"/>
+                </a:solidFill>
+              </a:rPr>
+              <a:t>Efficiency of cross-products for synchronous steps</a:t>
+            </a:r>
+          </a:p>
+          <a:p>
+            <a:pPr marL="342900" indent="-342900">
+              <a:buFont typeface="Arial" panose="020B0604020202020204" pitchFamily="34" charset="0"/>
+              <a:buChar char="•"/>
+            </a:pPr>
+            <a:r>
+              <a:rPr lang="pt-PT" sz="2200" noProof="1">
+                <a:solidFill>
+                  <a:srgbClr val="002060"/>
+                </a:solidFill>
+              </a:rPr>
+              <a:t>Reduces relational verification into standard verification, therefore has extensive tool support</a:t>
+            </a:r>
+          </a:p>
+          <a:p>
+            <a:pPr marL="342900" indent="-342900">
+              <a:buFont typeface="Arial" panose="020B0604020202020204" pitchFamily="34" charset="0"/>
+              <a:buChar char="•"/>
+            </a:pPr>
+            <a:r>
+              <a:rPr lang="pt-PT" sz="2200" noProof="1">
+                <a:solidFill>
+                  <a:srgbClr val="002060"/>
+                </a:solidFill>
+              </a:rPr>
+              <a:t>Support for two programs that are structurally dissimilar</a:t>
+            </a:r>
+          </a:p>
+          <a:p>
+            <a:pPr marL="342900" indent="-342900">
+              <a:buFont typeface="Arial" panose="020B0604020202020204" pitchFamily="34" charset="0"/>
+              <a:buChar char="•"/>
+            </a:pPr>
+            <a:endParaRPr lang="pt-PT" sz="2200" noProof="1">
+              <a:solidFill>
+                <a:srgbClr val="002060"/>
+              </a:solidFill>
+            </a:endParaRPr>
+          </a:p>
+          <a:p>
+            <a:pPr marL="342900" indent="-342900">
+              <a:buFont typeface="Arial" panose="020B0604020202020204" pitchFamily="34" charset="0"/>
+              <a:buChar char="•"/>
+            </a:pPr>
+            <a:endParaRPr lang="pt-PT" sz="2200" noProof="1">
+              <a:solidFill>
+                <a:srgbClr val="002060"/>
+              </a:solidFill>
+            </a:endParaRPr>
           </a:p>
         </p:txBody>
       </p:sp>
@@ -5710,7 +5759,7 @@
               <a:buAutoNum type="arabicPeriod"/>
             </a:pPr>
             <a:r>
-              <a:rPr lang="en-US" sz="2800" noProof="0" dirty="0">
+              <a:rPr lang="pt-PT" sz="2800" noProof="1">
                 <a:solidFill>
                   <a:srgbClr val="002060"/>
                 </a:solidFill>
@@ -5724,7 +5773,7 @@
               <a:buAutoNum type="arabicPeriod"/>
             </a:pPr>
             <a:r>
-              <a:rPr lang="en-US" sz="2800" noProof="0" dirty="0">
+              <a:rPr lang="pt-PT" sz="2800" noProof="1">
                 <a:solidFill>
                   <a:srgbClr val="002060"/>
                 </a:solidFill>
@@ -5738,7 +5787,7 @@
               <a:buAutoNum type="arabicPeriod"/>
             </a:pPr>
             <a:r>
-              <a:rPr lang="en-US" sz="2800" noProof="0" dirty="0">
+              <a:rPr lang="pt-PT" sz="2800" noProof="1">
                 <a:solidFill>
                   <a:srgbClr val="002060"/>
                 </a:solidFill>
@@ -5752,7 +5801,7 @@
               <a:buAutoNum type="arabicPeriod"/>
             </a:pPr>
             <a:r>
-              <a:rPr lang="en-US" sz="2800" noProof="0" dirty="0">
+              <a:rPr lang="pt-PT" sz="2800" noProof="1">
                 <a:solidFill>
                   <a:srgbClr val="002060"/>
                 </a:solidFill>
@@ -5766,7 +5815,7 @@
               <a:buAutoNum type="arabicPeriod"/>
             </a:pPr>
             <a:r>
-              <a:rPr lang="en-US" sz="2800" noProof="0" dirty="0">
+              <a:rPr lang="pt-PT" sz="2800" noProof="1">
                 <a:solidFill>
                   <a:srgbClr val="002060"/>
                 </a:solidFill>
@@ -5806,14 +5855,14 @@
           <a:p>
             <a:pPr algn="ctr"/>
             <a:r>
-              <a:rPr lang="en-US" sz="4800" noProof="0" dirty="0">
+              <a:rPr lang="pt-PT" sz="4800" noProof="1">
                 <a:solidFill>
                   <a:srgbClr val="002060"/>
                 </a:solidFill>
               </a:rPr>
               <a:t>Presentation Structure</a:t>
             </a:r>
-            <a:endParaRPr lang="en-US" sz="4800" noProof="0" dirty="0"/>
+            <a:endParaRPr lang="pt-PT" sz="4800" noProof="1"/>
           </a:p>
         </p:txBody>
       </p:sp>
@@ -5839,10 +5888,10 @@
           <a:lstStyle/>
           <a:p>
             <a:fld id="{292A9FD8-515A-4698-9313-0AB17EE9632B}" type="slidenum">
-              <a:rPr lang="en-US" smtClean="0"/>
+              <a:rPr lang="pt-PT" noProof="1" smtClean="0"/>
               <a:t>2</a:t>
             </a:fld>
-            <a:endParaRPr lang="en-US"/>
+            <a:endParaRPr lang="pt-PT" noProof="1"/>
           </a:p>
         </p:txBody>
       </p:sp>
@@ -5860,7 +5909,7 @@
 </file>
 
 <file path=ppt/slides/slide20.xml><?xml version="1.0" encoding="utf-8"?>
-<p:sld xmlns:a="http://schemas.openxmlformats.org/drawingml/2006/main" xmlns:r="http://schemas.openxmlformats.org/officeDocument/2006/relationships" xmlns:p="http://schemas.openxmlformats.org/presentationml/2006/main">
+<p:sld xmlns:a="http://schemas.openxmlformats.org/drawingml/2006/main" xmlns:r="http://schemas.openxmlformats.org/officeDocument/2006/relationships" xmlns:p="http://schemas.openxmlformats.org/presentationml/2006/main" show="0">
   <p:cSld>
     <p:bg>
       <p:bgPr>
@@ -5919,14 +5968,14 @@
           <a:lstStyle/>
           <a:p>
             <a:r>
-              <a:rPr lang="en-US" sz="2800" noProof="0" dirty="0">
+              <a:rPr lang="pt-PT" sz="2800" noProof="1">
                 <a:solidFill>
                   <a:srgbClr val="002060"/>
                 </a:solidFill>
               </a:rPr>
               <a:t>Program Equivalence</a:t>
             </a:r>
-            <a:endParaRPr lang="en-US" sz="2800" noProof="0" dirty="0"/>
+            <a:endParaRPr lang="pt-PT" sz="2800" noProof="1"/>
           </a:p>
         </p:txBody>
       </p:sp>
@@ -5952,10 +6001,10 @@
           <a:lstStyle/>
           <a:p>
             <a:fld id="{292A9FD8-515A-4698-9313-0AB17EE9632B}" type="slidenum">
-              <a:rPr lang="en-US" smtClean="0"/>
+              <a:rPr lang="pt-PT" noProof="1" smtClean="0"/>
               <a:t>20</a:t>
             </a:fld>
-            <a:endParaRPr lang="en-US"/>
+            <a:endParaRPr lang="pt-PT" noProof="1"/>
           </a:p>
         </p:txBody>
       </p:sp>
@@ -6033,14 +6082,14 @@
           <a:p>
             <a:pPr algn="ctr"/>
             <a:r>
-              <a:rPr lang="en-US" sz="4800" noProof="0" dirty="0">
+              <a:rPr lang="pt-PT" sz="4800" noProof="1">
                 <a:solidFill>
                   <a:srgbClr val="002060"/>
                 </a:solidFill>
               </a:rPr>
               <a:t>Preliminary Results</a:t>
             </a:r>
-            <a:endParaRPr lang="en-US" sz="4800" noProof="0" dirty="0"/>
+            <a:endParaRPr lang="pt-PT" sz="4800" noProof="1"/>
           </a:p>
         </p:txBody>
       </p:sp>
@@ -6066,10 +6115,10 @@
           <a:lstStyle/>
           <a:p>
             <a:fld id="{292A9FD8-515A-4698-9313-0AB17EE9632B}" type="slidenum">
-              <a:rPr lang="en-US" smtClean="0"/>
+              <a:rPr lang="pt-PT" noProof="1" smtClean="0"/>
               <a:t>21</a:t>
             </a:fld>
-            <a:endParaRPr lang="en-US"/>
+            <a:endParaRPr lang="pt-PT" noProof="1"/>
           </a:p>
         </p:txBody>
       </p:sp>
@@ -6146,14 +6195,14 @@
           <a:lstStyle/>
           <a:p>
             <a:r>
-              <a:rPr lang="en-US" sz="2800" noProof="0" dirty="0">
+              <a:rPr lang="pt-PT" sz="2800" noProof="1">
                 <a:solidFill>
                   <a:srgbClr val="002060"/>
                 </a:solidFill>
               </a:rPr>
               <a:t>Simple Equivalence Proof</a:t>
             </a:r>
-            <a:endParaRPr lang="en-US" sz="2800" noProof="0" dirty="0"/>
+            <a:endParaRPr lang="pt-PT" sz="2800" noProof="1"/>
           </a:p>
         </p:txBody>
       </p:sp>
@@ -6179,10 +6228,10 @@
           <a:lstStyle/>
           <a:p>
             <a:fld id="{292A9FD8-515A-4698-9313-0AB17EE9632B}" type="slidenum">
-              <a:rPr lang="en-US" smtClean="0"/>
+              <a:rPr lang="pt-PT" noProof="1" smtClean="0"/>
               <a:t>22</a:t>
             </a:fld>
-            <a:endParaRPr lang="en-US"/>
+            <a:endParaRPr lang="pt-PT" noProof="1"/>
           </a:p>
         </p:txBody>
       </p:sp>
@@ -6259,14 +6308,14 @@
           <a:lstStyle/>
           <a:p>
             <a:r>
-              <a:rPr lang="en-US" sz="2800" noProof="0" dirty="0">
+              <a:rPr lang="pt-PT" sz="2800" noProof="1">
                 <a:solidFill>
                   <a:srgbClr val="002060"/>
                 </a:solidFill>
               </a:rPr>
               <a:t>Equivalence Proof using Product Programs</a:t>
             </a:r>
-            <a:endParaRPr lang="en-US" sz="2800" noProof="0" dirty="0"/>
+            <a:endParaRPr lang="pt-PT" sz="2800" noProof="1"/>
           </a:p>
         </p:txBody>
       </p:sp>
@@ -6292,10 +6341,10 @@
           <a:lstStyle/>
           <a:p>
             <a:fld id="{292A9FD8-515A-4698-9313-0AB17EE9632B}" type="slidenum">
-              <a:rPr lang="en-US" smtClean="0"/>
+              <a:rPr lang="pt-PT" noProof="1" smtClean="0"/>
               <a:t>23</a:t>
             </a:fld>
-            <a:endParaRPr lang="en-US"/>
+            <a:endParaRPr lang="pt-PT" noProof="1"/>
           </a:p>
         </p:txBody>
       </p:sp>
@@ -6373,14 +6422,14 @@
           <a:p>
             <a:pPr algn="ctr"/>
             <a:r>
-              <a:rPr lang="en-US" sz="4800" noProof="0" dirty="0">
+              <a:rPr lang="pt-PT" sz="4800" noProof="1">
                 <a:solidFill>
                   <a:srgbClr val="002060"/>
                 </a:solidFill>
               </a:rPr>
               <a:t>Work Plan</a:t>
             </a:r>
-            <a:endParaRPr lang="en-US" sz="4800" noProof="0" dirty="0"/>
+            <a:endParaRPr lang="pt-PT" sz="4800" noProof="1"/>
           </a:p>
         </p:txBody>
       </p:sp>
@@ -6406,10 +6455,10 @@
           <a:lstStyle/>
           <a:p>
             <a:fld id="{292A9FD8-515A-4698-9313-0AB17EE9632B}" type="slidenum">
-              <a:rPr lang="en-US" smtClean="0"/>
+              <a:rPr lang="pt-PT" noProof="1" smtClean="0"/>
               <a:t>24</a:t>
             </a:fld>
-            <a:endParaRPr lang="en-US"/>
+            <a:endParaRPr lang="pt-PT" noProof="1"/>
           </a:p>
         </p:txBody>
       </p:sp>
@@ -6487,14 +6536,14 @@
           <a:p>
             <a:pPr algn="ctr"/>
             <a:r>
-              <a:rPr lang="en-US" sz="2800" noProof="0" dirty="0">
+              <a:rPr lang="pt-PT" sz="2800" noProof="1">
                 <a:solidFill>
                   <a:srgbClr val="002060"/>
                 </a:solidFill>
               </a:rPr>
               <a:t>Work Plan</a:t>
             </a:r>
-            <a:endParaRPr lang="en-US" sz="2800" noProof="0" dirty="0"/>
+            <a:endParaRPr lang="pt-PT" sz="2800" noProof="1"/>
           </a:p>
         </p:txBody>
       </p:sp>
@@ -6528,85 +6577,85 @@
           <a:p>
             <a:pPr algn="r"/>
             <a:r>
-              <a:rPr lang="en-US" sz="1400" b="1" noProof="0" dirty="0"/>
+              <a:rPr lang="pt-PT" sz="1400" b="1" noProof="1"/>
               <a:t>Preliminary</a:t>
             </a:r>
           </a:p>
           <a:p>
             <a:pPr algn="r"/>
             <a:r>
-              <a:rPr lang="en-US" sz="1400" noProof="0" dirty="0"/>
+              <a:rPr lang="pt-PT" sz="1400" noProof="1"/>
               <a:t>Collection of case studies</a:t>
             </a:r>
           </a:p>
           <a:p>
             <a:pPr algn="r"/>
-            <a:endParaRPr lang="en-US" sz="1400" noProof="0" dirty="0"/>
+            <a:endParaRPr lang="pt-PT" sz="1400" noProof="1"/>
           </a:p>
           <a:p>
             <a:pPr algn="r"/>
             <a:r>
-              <a:rPr lang="en-US" sz="1400" b="1" noProof="0" dirty="0"/>
+              <a:rPr lang="pt-PT" sz="1400" b="1" noProof="1"/>
               <a:t>First-order product programs</a:t>
             </a:r>
           </a:p>
           <a:p>
             <a:pPr algn="r"/>
             <a:r>
-              <a:rPr lang="en-US" sz="1400" noProof="0" dirty="0"/>
+              <a:rPr lang="pt-PT" sz="1400" noProof="1"/>
               <a:t>Definition in OCaml</a:t>
             </a:r>
           </a:p>
           <a:p>
             <a:pPr algn="r"/>
             <a:r>
-              <a:rPr lang="en-US" sz="1400" noProof="0" dirty="0"/>
+              <a:rPr lang="pt-PT" sz="1400" noProof="1"/>
               <a:t>Implementation in Cameleer</a:t>
             </a:r>
           </a:p>
           <a:p>
             <a:pPr algn="r"/>
-            <a:endParaRPr lang="en-US" sz="1400" noProof="0" dirty="0"/>
+            <a:endParaRPr lang="pt-PT" sz="1400" noProof="1"/>
           </a:p>
           <a:p>
             <a:pPr algn="r"/>
             <a:r>
-              <a:rPr lang="en-US" sz="1400" b="1" noProof="0" dirty="0"/>
+              <a:rPr lang="pt-PT" sz="1400" b="1" noProof="1"/>
               <a:t>Extension to higher-order </a:t>
             </a:r>
             <a:r>
-              <a:rPr lang="en-US" sz="1400" noProof="0" dirty="0"/>
+              <a:rPr lang="pt-PT" sz="1400" noProof="1"/>
               <a:t>Definition in OCaml</a:t>
             </a:r>
           </a:p>
           <a:p>
             <a:pPr algn="r"/>
             <a:r>
-              <a:rPr lang="en-US" sz="1400" noProof="0" dirty="0"/>
+              <a:rPr lang="pt-PT" sz="1400" noProof="1"/>
               <a:t>Implementation in Cameleer</a:t>
             </a:r>
           </a:p>
           <a:p>
             <a:pPr algn="r"/>
-            <a:endParaRPr lang="en-US" sz="1400" noProof="0" dirty="0"/>
+            <a:endParaRPr lang="pt-PT" sz="1400" noProof="1"/>
           </a:p>
           <a:p>
             <a:pPr algn="r"/>
             <a:r>
-              <a:rPr lang="en-US" sz="1400" b="1" noProof="0" dirty="0"/>
+              <a:rPr lang="pt-PT" sz="1400" b="1" noProof="1"/>
               <a:t>Dissertation</a:t>
             </a:r>
           </a:p>
           <a:p>
             <a:pPr algn="r"/>
             <a:r>
-              <a:rPr lang="en-US" sz="1400" noProof="0" dirty="0"/>
+              <a:rPr lang="pt-PT" sz="1400" noProof="1"/>
               <a:t>Writing</a:t>
             </a:r>
           </a:p>
           <a:p>
             <a:pPr algn="r"/>
-            <a:endParaRPr lang="en-US" sz="1600" noProof="0" dirty="0"/>
+            <a:endParaRPr lang="pt-PT" sz="1600" noProof="1"/>
           </a:p>
         </p:txBody>
       </p:sp>
@@ -6668,10 +6717,10 @@
           <a:lstStyle/>
           <a:p>
             <a:fld id="{292A9FD8-515A-4698-9313-0AB17EE9632B}" type="slidenum">
-              <a:rPr lang="en-US" smtClean="0"/>
+              <a:rPr lang="pt-PT" noProof="1" smtClean="0"/>
               <a:t>25</a:t>
             </a:fld>
-            <a:endParaRPr lang="en-US"/>
+            <a:endParaRPr lang="pt-PT" noProof="1"/>
           </a:p>
         </p:txBody>
       </p:sp>
@@ -6749,14 +6798,14 @@
           <a:p>
             <a:pPr algn="ctr"/>
             <a:r>
-              <a:rPr lang="en-US" sz="4800" noProof="0" dirty="0">
+              <a:rPr lang="pt-PT" sz="4800" noProof="1">
                 <a:solidFill>
                   <a:srgbClr val="002060"/>
                 </a:solidFill>
               </a:rPr>
               <a:t>Introduction</a:t>
             </a:r>
-            <a:endParaRPr lang="en-US" sz="4800" noProof="0" dirty="0"/>
+            <a:endParaRPr lang="pt-PT" sz="4800" noProof="1"/>
           </a:p>
         </p:txBody>
       </p:sp>
@@ -6782,10 +6831,10 @@
           <a:lstStyle/>
           <a:p>
             <a:fld id="{292A9FD8-515A-4698-9313-0AB17EE9632B}" type="slidenum">
-              <a:rPr lang="en-US" smtClean="0"/>
+              <a:rPr lang="pt-PT" noProof="1" smtClean="0"/>
               <a:t>3</a:t>
             </a:fld>
-            <a:endParaRPr lang="en-US"/>
+            <a:endParaRPr lang="pt-PT" noProof="1"/>
           </a:p>
         </p:txBody>
       </p:sp>
@@ -6862,14 +6911,14 @@
           <a:lstStyle/>
           <a:p>
             <a:r>
-              <a:rPr lang="en-US" sz="2800" noProof="0" dirty="0">
+              <a:rPr lang="pt-PT" sz="2800" noProof="1">
                 <a:solidFill>
                   <a:srgbClr val="002060"/>
                 </a:solidFill>
               </a:rPr>
               <a:t>Motivation</a:t>
             </a:r>
-            <a:endParaRPr lang="en-US" sz="2800" noProof="0" dirty="0"/>
+            <a:endParaRPr lang="pt-PT" sz="2800" noProof="1"/>
           </a:p>
         </p:txBody>
       </p:sp>
@@ -6903,7 +6952,7 @@
           <a:p>
             <a:pPr algn="r"/>
             <a:r>
-              <a:rPr lang="en-US" sz="2000" noProof="0" dirty="0">
+              <a:rPr lang="pt-PT" sz="2000" noProof="1">
                 <a:solidFill>
                   <a:srgbClr val="002060"/>
                 </a:solidFill>
@@ -6914,7 +6963,7 @@
           <a:p>
             <a:pPr algn="r"/>
             <a:r>
-              <a:rPr lang="en-US" sz="2000" noProof="0" dirty="0">
+              <a:rPr lang="pt-PT" sz="2000" noProof="1">
                 <a:solidFill>
                   <a:srgbClr val="002060"/>
                 </a:solidFill>
@@ -6924,7 +6973,7 @@
           </a:p>
           <a:p>
             <a:pPr algn="r"/>
-            <a:endParaRPr lang="en-US" sz="2000" noProof="0" dirty="0">
+            <a:endParaRPr lang="pt-PT" sz="2000" noProof="1">
               <a:solidFill>
                 <a:srgbClr val="002060"/>
               </a:solidFill>
@@ -6933,7 +6982,7 @@
           <a:p>
             <a:pPr algn="r"/>
             <a:r>
-              <a:rPr lang="en-US" sz="2000" noProof="0" dirty="0">
+              <a:rPr lang="pt-PT" sz="2000" noProof="1">
                 <a:solidFill>
                   <a:srgbClr val="002060"/>
                 </a:solidFill>
@@ -6944,7 +6993,7 @@
           <a:p>
             <a:pPr algn="r"/>
             <a:r>
-              <a:rPr lang="en-US" sz="2000" noProof="0" dirty="0">
+              <a:rPr lang="pt-PT" sz="2000" noProof="1">
                 <a:solidFill>
                   <a:srgbClr val="002060"/>
                 </a:solidFill>
@@ -6955,7 +7004,7 @@
           <a:p>
             <a:pPr algn="r"/>
             <a:r>
-              <a:rPr lang="en-US" sz="2000" noProof="0" dirty="0">
+              <a:rPr lang="pt-PT" sz="2000" noProof="1">
                 <a:solidFill>
                   <a:srgbClr val="002060"/>
                 </a:solidFill>
@@ -7005,7 +7054,7 @@
           <a:lstStyle/>
           <a:p>
             <a:pPr algn="ctr"/>
-            <a:endParaRPr lang="en-US" noProof="0" dirty="0"/>
+            <a:endParaRPr lang="pt-PT" noProof="1"/>
           </a:p>
         </p:txBody>
       </p:sp>
@@ -7039,7 +7088,7 @@
           <a:p>
             <a:pPr algn="ctr"/>
             <a:r>
-              <a:rPr lang="en-US" sz="2400" b="1" noProof="0" dirty="0">
+              <a:rPr lang="pt-PT" sz="2400" b="1" noProof="1">
                 <a:solidFill>
                   <a:srgbClr val="FF0000"/>
                 </a:solidFill>
@@ -7050,7 +7099,7 @@
           <a:p>
             <a:pPr algn="ctr"/>
             <a:r>
-              <a:rPr lang="en-US" sz="2000" noProof="0" dirty="0">
+              <a:rPr lang="pt-PT" sz="2000" noProof="1">
                 <a:solidFill>
                   <a:srgbClr val="002060"/>
                 </a:solidFill>
@@ -7131,7 +7180,7 @@
           <a:p>
             <a:pPr algn="ctr"/>
             <a:r>
-              <a:rPr lang="en-US" sz="2400" u="sng" noProof="0" dirty="0">
+              <a:rPr lang="pt-PT" sz="2400" u="sng" noProof="1">
                 <a:solidFill>
                   <a:srgbClr val="002060"/>
                 </a:solidFill>
@@ -7163,10 +7212,10 @@
           <a:lstStyle/>
           <a:p>
             <a:fld id="{292A9FD8-515A-4698-9313-0AB17EE9632B}" type="slidenum">
-              <a:rPr lang="en-US" smtClean="0"/>
+              <a:rPr lang="pt-PT" noProof="1" smtClean="0"/>
               <a:t>4</a:t>
             </a:fld>
-            <a:endParaRPr lang="en-US"/>
+            <a:endParaRPr lang="pt-PT" noProof="1"/>
           </a:p>
         </p:txBody>
       </p:sp>
@@ -7243,14 +7292,14 @@
           <a:lstStyle/>
           <a:p>
             <a:r>
-              <a:rPr lang="en-US" sz="2800" noProof="0" dirty="0">
+              <a:rPr lang="pt-PT" sz="2800" noProof="1">
                 <a:solidFill>
                   <a:srgbClr val="002060"/>
                 </a:solidFill>
               </a:rPr>
               <a:t>Problem Definition</a:t>
             </a:r>
-            <a:endParaRPr lang="en-US" sz="2800" noProof="0" dirty="0"/>
+            <a:endParaRPr lang="pt-PT" sz="2800" noProof="1"/>
           </a:p>
         </p:txBody>
       </p:sp>
@@ -7284,7 +7333,7 @@
           <a:p>
             <a:pPr algn="ctr"/>
             <a:r>
-              <a:rPr lang="en-US" sz="2400" i="1" noProof="0" dirty="0">
+              <a:rPr lang="pt-PT" sz="2400" i="1" noProof="1">
                 <a:solidFill>
                   <a:srgbClr val="002060"/>
                 </a:solidFill>
@@ -7316,10 +7365,10 @@
           <a:lstStyle/>
           <a:p>
             <a:fld id="{292A9FD8-515A-4698-9313-0AB17EE9632B}" type="slidenum">
-              <a:rPr lang="en-US" smtClean="0"/>
+              <a:rPr lang="pt-PT" noProof="1" smtClean="0"/>
               <a:t>5</a:t>
             </a:fld>
-            <a:endParaRPr lang="en-US"/>
+            <a:endParaRPr lang="pt-PT" noProof="1"/>
           </a:p>
         </p:txBody>
       </p:sp>
@@ -7396,14 +7445,14 @@
           <a:lstStyle/>
           <a:p>
             <a:r>
-              <a:rPr lang="en-US" sz="2800" noProof="0" dirty="0">
+              <a:rPr lang="pt-PT" sz="2800" noProof="1">
                 <a:solidFill>
                   <a:srgbClr val="002060"/>
                 </a:solidFill>
               </a:rPr>
               <a:t>Goals and Expected Contributions</a:t>
             </a:r>
-            <a:endParaRPr lang="en-US" sz="2800" noProof="0" dirty="0"/>
+            <a:endParaRPr lang="pt-PT" sz="2800" noProof="1"/>
           </a:p>
         </p:txBody>
       </p:sp>
@@ -7440,7 +7489,7 @@
               <a:buChar char="•"/>
             </a:pPr>
             <a:r>
-              <a:rPr lang="en-US" sz="2400" noProof="0" dirty="0">
+              <a:rPr lang="pt-PT" sz="2400" noProof="1">
                 <a:solidFill>
                   <a:srgbClr val="002060"/>
                 </a:solidFill>
@@ -7454,7 +7503,7 @@
               <a:buChar char="•"/>
             </a:pPr>
             <a:r>
-              <a:rPr lang="en-US" sz="2400" noProof="0" dirty="0">
+              <a:rPr lang="pt-PT" sz="2400" noProof="1">
                 <a:solidFill>
                   <a:srgbClr val="002060"/>
                 </a:solidFill>
@@ -7486,10 +7535,10 @@
           <a:lstStyle/>
           <a:p>
             <a:fld id="{292A9FD8-515A-4698-9313-0AB17EE9632B}" type="slidenum">
-              <a:rPr lang="en-US" smtClean="0"/>
+              <a:rPr lang="pt-PT" noProof="1" smtClean="0"/>
               <a:t>6</a:t>
             </a:fld>
-            <a:endParaRPr lang="en-US"/>
+            <a:endParaRPr lang="pt-PT" noProof="1"/>
           </a:p>
         </p:txBody>
       </p:sp>
@@ -7567,14 +7616,14 @@
           <a:p>
             <a:pPr algn="ctr"/>
             <a:r>
-              <a:rPr lang="en-US" sz="4800" noProof="0" dirty="0">
+              <a:rPr lang="pt-PT" sz="4800" noProof="1">
                 <a:solidFill>
                   <a:srgbClr val="002060"/>
                 </a:solidFill>
               </a:rPr>
               <a:t>Background</a:t>
             </a:r>
-            <a:endParaRPr lang="en-US" sz="4800" noProof="0" dirty="0"/>
+            <a:endParaRPr lang="pt-PT" sz="4800" noProof="1"/>
           </a:p>
         </p:txBody>
       </p:sp>
@@ -7600,10 +7649,244 @@
           <a:lstStyle/>
           <a:p>
             <a:fld id="{292A9FD8-515A-4698-9313-0AB17EE9632B}" type="slidenum">
-              <a:rPr lang="en-US" smtClean="0"/>
+              <a:rPr lang="pt-PT" noProof="1" smtClean="0"/>
               <a:t>7</a:t>
             </a:fld>
-            <a:endParaRPr lang="en-US"/>
+            <a:endParaRPr lang="pt-PT" noProof="1"/>
+          </a:p>
+        </p:txBody>
+      </p:sp>
+      <p:sp>
+        <p:nvSpPr>
+          <p:cNvPr id="4" name="TextBox 3">
+            <a:extLst>
+              <a:ext uri="{FF2B5EF4-FFF2-40B4-BE49-F238E27FC236}">
+                <a16:creationId xmlns:a16="http://schemas.microsoft.com/office/drawing/2014/main" id="{0C887527-BA57-CF39-EA4A-982A18774BE3}"/>
+              </a:ext>
+            </a:extLst>
+          </p:cNvPr>
+          <p:cNvSpPr txBox="1"/>
+          <p:nvPr/>
+        </p:nvSpPr>
+        <p:spPr>
+          <a:xfrm>
+            <a:off x="1383957" y="939114"/>
+            <a:ext cx="1768176" cy="461665"/>
+          </a:xfrm>
+          <a:prstGeom prst="rect">
+            <a:avLst/>
+          </a:prstGeom>
+          <a:noFill/>
+        </p:spPr>
+        <p:txBody>
+          <a:bodyPr wrap="none" rtlCol="0">
+            <a:spAutoFit/>
+          </a:bodyPr>
+          <a:lstStyle/>
+          <a:p>
+            <a:r>
+              <a:rPr lang="pt-PT" sz="2400" noProof="1">
+                <a:solidFill>
+                  <a:srgbClr val="002060"/>
+                </a:solidFill>
+              </a:rPr>
+              <a:t>Hoare Logic</a:t>
+            </a:r>
+          </a:p>
+        </p:txBody>
+      </p:sp>
+      <p:sp>
+        <p:nvSpPr>
+          <p:cNvPr id="5" name="TextBox 4">
+            <a:extLst>
+              <a:ext uri="{FF2B5EF4-FFF2-40B4-BE49-F238E27FC236}">
+                <a16:creationId xmlns:a16="http://schemas.microsoft.com/office/drawing/2014/main" id="{EA078C22-F81E-4E02-CB51-15F14D176A1F}"/>
+              </a:ext>
+            </a:extLst>
+          </p:cNvPr>
+          <p:cNvSpPr txBox="1"/>
+          <p:nvPr/>
+        </p:nvSpPr>
+        <p:spPr>
+          <a:xfrm>
+            <a:off x="6890952" y="2953643"/>
+            <a:ext cx="1492716" cy="461665"/>
+          </a:xfrm>
+          <a:prstGeom prst="rect">
+            <a:avLst/>
+          </a:prstGeom>
+          <a:noFill/>
+        </p:spPr>
+        <p:txBody>
+          <a:bodyPr wrap="none" rtlCol="0">
+            <a:spAutoFit/>
+          </a:bodyPr>
+          <a:lstStyle/>
+          <a:p>
+            <a:r>
+              <a:rPr lang="pt-PT" sz="2400" noProof="1">
+                <a:solidFill>
+                  <a:srgbClr val="002060"/>
+                </a:solidFill>
+              </a:rPr>
+              <a:t>Cameleer</a:t>
+            </a:r>
+          </a:p>
+        </p:txBody>
+      </p:sp>
+      <p:sp>
+        <p:nvSpPr>
+          <p:cNvPr id="6" name="TextBox 5">
+            <a:extLst>
+              <a:ext uri="{FF2B5EF4-FFF2-40B4-BE49-F238E27FC236}">
+                <a16:creationId xmlns:a16="http://schemas.microsoft.com/office/drawing/2014/main" id="{63EA9305-D84A-B034-1322-577821CA4F4C}"/>
+              </a:ext>
+            </a:extLst>
+          </p:cNvPr>
+          <p:cNvSpPr txBox="1"/>
+          <p:nvPr/>
+        </p:nvSpPr>
+        <p:spPr>
+          <a:xfrm>
+            <a:off x="4920947" y="4077229"/>
+            <a:ext cx="1306768" cy="461665"/>
+          </a:xfrm>
+          <a:prstGeom prst="rect">
+            <a:avLst/>
+          </a:prstGeom>
+          <a:noFill/>
+        </p:spPr>
+        <p:txBody>
+          <a:bodyPr wrap="none" rtlCol="0">
+            <a:spAutoFit/>
+          </a:bodyPr>
+          <a:lstStyle/>
+          <a:p>
+            <a:r>
+              <a:rPr lang="pt-PT" sz="2400" noProof="1">
+                <a:solidFill>
+                  <a:srgbClr val="002060"/>
+                </a:solidFill>
+              </a:rPr>
+              <a:t>GOSPEL</a:t>
+            </a:r>
+          </a:p>
+        </p:txBody>
+      </p:sp>
+      <p:sp>
+        <p:nvSpPr>
+          <p:cNvPr id="7" name="TextBox 6">
+            <a:extLst>
+              <a:ext uri="{FF2B5EF4-FFF2-40B4-BE49-F238E27FC236}">
+                <a16:creationId xmlns:a16="http://schemas.microsoft.com/office/drawing/2014/main" id="{18320B3E-73D3-CD3E-C4D5-2F400BED8F2F}"/>
+              </a:ext>
+            </a:extLst>
+          </p:cNvPr>
+          <p:cNvSpPr txBox="1"/>
+          <p:nvPr/>
+        </p:nvSpPr>
+        <p:spPr>
+          <a:xfrm>
+            <a:off x="4571999" y="624012"/>
+            <a:ext cx="3176126" cy="461665"/>
+          </a:xfrm>
+          <a:prstGeom prst="rect">
+            <a:avLst/>
+          </a:prstGeom>
+          <a:noFill/>
+        </p:spPr>
+        <p:txBody>
+          <a:bodyPr wrap="none" rtlCol="0">
+            <a:spAutoFit/>
+          </a:bodyPr>
+          <a:lstStyle/>
+          <a:p>
+            <a:r>
+              <a:rPr lang="pt-PT" sz="2400" noProof="1">
+                <a:solidFill>
+                  <a:srgbClr val="002060"/>
+                </a:solidFill>
+              </a:rPr>
+              <a:t>Relational Hoare Logic</a:t>
+            </a:r>
+          </a:p>
+        </p:txBody>
+      </p:sp>
+      <p:sp>
+        <p:nvSpPr>
+          <p:cNvPr id="8" name="TextBox 7">
+            <a:extLst>
+              <a:ext uri="{FF2B5EF4-FFF2-40B4-BE49-F238E27FC236}">
+                <a16:creationId xmlns:a16="http://schemas.microsoft.com/office/drawing/2014/main" id="{FA5839CF-434B-7C6C-0F8C-58D3B336AB64}"/>
+              </a:ext>
+            </a:extLst>
+          </p:cNvPr>
+          <p:cNvSpPr txBox="1"/>
+          <p:nvPr/>
+        </p:nvSpPr>
+        <p:spPr>
+          <a:xfrm>
+            <a:off x="818738" y="2442001"/>
+            <a:ext cx="1130438" cy="461665"/>
+          </a:xfrm>
+          <a:prstGeom prst="rect">
+            <a:avLst/>
+          </a:prstGeom>
+          <a:noFill/>
+        </p:spPr>
+        <p:txBody>
+          <a:bodyPr wrap="none" rtlCol="0">
+            <a:spAutoFit/>
+          </a:bodyPr>
+          <a:lstStyle/>
+          <a:p>
+            <a:r>
+              <a:rPr lang="pt-PT" sz="2400" noProof="1">
+                <a:solidFill>
+                  <a:srgbClr val="002060"/>
+                </a:solidFill>
+              </a:rPr>
+              <a:t>OCaml</a:t>
+            </a:r>
+          </a:p>
+        </p:txBody>
+      </p:sp>
+      <p:sp>
+        <p:nvSpPr>
+          <p:cNvPr id="9" name="TextBox 8">
+            <a:extLst>
+              <a:ext uri="{FF2B5EF4-FFF2-40B4-BE49-F238E27FC236}">
+                <a16:creationId xmlns:a16="http://schemas.microsoft.com/office/drawing/2014/main" id="{C33DA7EE-8840-D0A4-AE7A-6CC9EF62FCAF}"/>
+              </a:ext>
+            </a:extLst>
+          </p:cNvPr>
+          <p:cNvSpPr txBox="1"/>
+          <p:nvPr/>
+        </p:nvSpPr>
+        <p:spPr>
+          <a:xfrm>
+            <a:off x="1801410" y="4077228"/>
+            <a:ext cx="933269" cy="461665"/>
+          </a:xfrm>
+          <a:prstGeom prst="rect">
+            <a:avLst/>
+          </a:prstGeom>
+          <a:noFill/>
+        </p:spPr>
+        <p:txBody>
+          <a:bodyPr wrap="none" rtlCol="0">
+            <a:spAutoFit/>
+          </a:bodyPr>
+          <a:lstStyle/>
+          <a:p>
+            <a:r>
+              <a:rPr lang="pt-PT" sz="2400" noProof="1">
+                <a:solidFill>
+                  <a:srgbClr val="002060"/>
+                </a:solidFill>
+              </a:rPr>
+              <a:t>Why3</a:t>
+            </a:r>
           </a:p>
         </p:txBody>
       </p:sp>
@@ -7621,7 +7904,7 @@
 </file>
 
 <file path=ppt/slides/slide8.xml><?xml version="1.0" encoding="utf-8"?>
-<p:sld xmlns:a="http://schemas.openxmlformats.org/drawingml/2006/main" xmlns:r="http://schemas.openxmlformats.org/officeDocument/2006/relationships" xmlns:p="http://schemas.openxmlformats.org/presentationml/2006/main">
+<p:sld xmlns:a="http://schemas.openxmlformats.org/drawingml/2006/main" xmlns:r="http://schemas.openxmlformats.org/officeDocument/2006/relationships" xmlns:p="http://schemas.openxmlformats.org/presentationml/2006/main" show="0">
   <p:cSld>
     <p:bg>
       <p:bgPr>
@@ -7680,14 +7963,14 @@
           <a:lstStyle/>
           <a:p>
             <a:r>
-              <a:rPr lang="en-US" sz="2800" noProof="0" dirty="0">
+              <a:rPr lang="pt-PT" sz="2800" noProof="1">
                 <a:solidFill>
                   <a:srgbClr val="002060"/>
                 </a:solidFill>
               </a:rPr>
               <a:t>Hoare Logic</a:t>
             </a:r>
-            <a:endParaRPr lang="en-US" sz="2800" noProof="0" dirty="0"/>
+            <a:endParaRPr lang="pt-PT" sz="2800" noProof="1"/>
           </a:p>
         </p:txBody>
       </p:sp>
@@ -7724,7 +8007,7 @@
               <a:buChar char="•"/>
             </a:pPr>
             <a:r>
-              <a:rPr lang="en-US" sz="2200" noProof="0" dirty="0">
+              <a:rPr lang="pt-PT" sz="2200" noProof="1">
                 <a:solidFill>
                   <a:srgbClr val="002060"/>
                 </a:solidFill>
@@ -7738,7 +8021,7 @@
               <a:buChar char="•"/>
             </a:pPr>
             <a:r>
-              <a:rPr lang="en-US" sz="2200" noProof="0" dirty="0">
+              <a:rPr lang="pt-PT" sz="2200" noProof="1">
                 <a:solidFill>
                   <a:srgbClr val="002060"/>
                 </a:solidFill>
@@ -7752,7 +8035,7 @@
               <a:buChar char="•"/>
             </a:pPr>
             <a:r>
-              <a:rPr lang="en-US" sz="2200" noProof="0" dirty="0">
+              <a:rPr lang="pt-PT" sz="2200" noProof="1">
                 <a:solidFill>
                   <a:srgbClr val="002060"/>
                 </a:solidFill>
@@ -7760,7 +8043,7 @@
               <a:t>If the pre-condition holds and the program terminates, then the post-condition also holds after the execution 							   (</a:t>
             </a:r>
             <a:r>
-              <a:rPr lang="en-US" sz="2200" b="1" noProof="0" dirty="0">
+              <a:rPr lang="pt-PT" sz="2200" b="1" noProof="1">
                 <a:solidFill>
                   <a:srgbClr val="002060"/>
                 </a:solidFill>
@@ -7768,7 +8051,7 @@
               <a:t>Hoare triple</a:t>
             </a:r>
             <a:r>
-              <a:rPr lang="en-US" sz="2200" noProof="0" dirty="0">
+              <a:rPr lang="pt-PT" sz="2200" noProof="1">
                 <a:solidFill>
                   <a:srgbClr val="002060"/>
                 </a:solidFill>
@@ -7808,7 +8091,7 @@
           <a:p>
             <a:pPr algn="ctr"/>
             <a:r>
-              <a:rPr lang="en-US" sz="2800" noProof="0" dirty="0">
+              <a:rPr lang="pt-PT" sz="2800" noProof="1">
                 <a:solidFill>
                   <a:srgbClr val="002060"/>
                 </a:solidFill>
@@ -7816,7 +8099,7 @@
               <a:t>{P} </a:t>
             </a:r>
             <a:r>
-              <a:rPr lang="en-US" sz="2800" b="1" noProof="0" dirty="0">
+              <a:rPr lang="pt-PT" sz="2800" b="1" noProof="1">
                 <a:solidFill>
                   <a:srgbClr val="002060"/>
                 </a:solidFill>
@@ -7824,7 +8107,7 @@
               <a:t>S</a:t>
             </a:r>
             <a:r>
-              <a:rPr lang="en-US" sz="2800" noProof="0" dirty="0">
+              <a:rPr lang="pt-PT" sz="2800" noProof="1">
                 <a:solidFill>
                   <a:srgbClr val="002060"/>
                 </a:solidFill>
@@ -7864,7 +8147,7 @@
           <a:p>
             <a:pPr algn="ctr"/>
             <a:r>
-              <a:rPr lang="en-US" sz="2400" noProof="0" dirty="0">
+              <a:rPr lang="pt-PT" sz="2400" noProof="1">
                 <a:solidFill>
                   <a:srgbClr val="002060"/>
                 </a:solidFill>
@@ -7904,7 +8187,7 @@
           <a:p>
             <a:pPr algn="ctr"/>
             <a:r>
-              <a:rPr lang="en-US" sz="2400" b="1" noProof="0" dirty="0">
+              <a:rPr lang="pt-PT" sz="2400" b="1" noProof="1">
                 <a:solidFill>
                   <a:srgbClr val="002060"/>
                 </a:solidFill>
@@ -7944,7 +8227,7 @@
           <a:p>
             <a:pPr algn="ctr"/>
             <a:r>
-              <a:rPr lang="en-US" sz="2400" noProof="0" dirty="0">
+              <a:rPr lang="pt-PT" sz="2400" noProof="1">
                 <a:solidFill>
                   <a:srgbClr val="002060"/>
                 </a:solidFill>
@@ -8098,10 +8381,10 @@
           <a:lstStyle/>
           <a:p>
             <a:fld id="{292A9FD8-515A-4698-9313-0AB17EE9632B}" type="slidenum">
-              <a:rPr lang="en-US" smtClean="0"/>
+              <a:rPr lang="pt-PT" noProof="1" smtClean="0"/>
               <a:t>8</a:t>
             </a:fld>
-            <a:endParaRPr lang="en-US"/>
+            <a:endParaRPr lang="pt-PT" noProof="1"/>
           </a:p>
         </p:txBody>
       </p:sp>
@@ -8119,7 +8402,7 @@
 </file>
 
 <file path=ppt/slides/slide9.xml><?xml version="1.0" encoding="utf-8"?>
-<p:sld xmlns:a="http://schemas.openxmlformats.org/drawingml/2006/main" xmlns:r="http://schemas.openxmlformats.org/officeDocument/2006/relationships" xmlns:p="http://schemas.openxmlformats.org/presentationml/2006/main">
+<p:sld xmlns:a="http://schemas.openxmlformats.org/drawingml/2006/main" xmlns:r="http://schemas.openxmlformats.org/officeDocument/2006/relationships" xmlns:p="http://schemas.openxmlformats.org/presentationml/2006/main" show="0">
   <p:cSld>
     <p:bg>
       <p:bgPr>
@@ -8178,14 +8461,14 @@
           <a:lstStyle/>
           <a:p>
             <a:r>
-              <a:rPr lang="en-US" sz="2800" noProof="0" dirty="0">
+              <a:rPr lang="pt-PT" sz="2800" noProof="1">
                 <a:solidFill>
                   <a:srgbClr val="002060"/>
                 </a:solidFill>
               </a:rPr>
               <a:t>Relational Hoare Logic (1/2)</a:t>
             </a:r>
-            <a:endParaRPr lang="en-US" sz="2800" noProof="0" dirty="0"/>
+            <a:endParaRPr lang="pt-PT" sz="2800" noProof="1"/>
           </a:p>
         </p:txBody>
       </p:sp>
@@ -8222,20 +8505,12 @@
               <a:buChar char="•"/>
             </a:pPr>
             <a:r>
-              <a:rPr lang="en-US" sz="2200" dirty="0">
-                <a:solidFill>
-                  <a:srgbClr val="002060"/>
-                </a:solidFill>
-              </a:rPr>
-              <a:t>Extension of</a:t>
-            </a:r>
-            <a:r>
-              <a:rPr lang="en-US" sz="2200" noProof="0" dirty="0">
-                <a:solidFill>
-                  <a:srgbClr val="002060"/>
-                </a:solidFill>
-              </a:rPr>
-              <a:t> Hoare Logic to reason about two different programs or different runs of the same</a:t>
+              <a:rPr lang="pt-PT" sz="2200" noProof="1">
+                <a:solidFill>
+                  <a:srgbClr val="002060"/>
+                </a:solidFill>
+              </a:rPr>
+              <a:t>Extension of Hoare Logic to reason about two different programs or different runs of the same</a:t>
             </a:r>
           </a:p>
           <a:p>
@@ -8244,18 +8519,13 @@
               <a:buChar char="•"/>
             </a:pPr>
             <a:r>
-              <a:rPr lang="en-US" sz="2200" dirty="0">
+              <a:rPr lang="pt-PT" sz="2200" noProof="1">
                 <a:solidFill>
                   <a:srgbClr val="002060"/>
                 </a:solidFill>
               </a:rPr>
               <a:t>Much better to establish that two programs are equivalent or not </a:t>
             </a:r>
-            <a:endParaRPr lang="en-US" sz="2200" noProof="0" dirty="0">
-              <a:solidFill>
-                <a:srgbClr val="002060"/>
-              </a:solidFill>
-            </a:endParaRPr>
           </a:p>
           <a:p>
             <a:pPr marL="342900" indent="-342900">
@@ -8263,7 +8533,7 @@
               <a:buChar char="•"/>
             </a:pPr>
             <a:r>
-              <a:rPr lang="en-US" sz="2200" dirty="0">
+              <a:rPr lang="pt-PT" sz="2200" noProof="1">
                 <a:solidFill>
                   <a:srgbClr val="002060"/>
                 </a:solidFill>
@@ -8271,7 +8541,7 @@
               <a:t>If both P1 and P2 respect the pre-condition, either they both terminate respecting the post-condition or neither does                             </a:t>
             </a:r>
             <a:r>
-              <a:rPr lang="en-US" sz="2200" dirty="0">
+              <a:rPr lang="pt-PT" sz="2200" noProof="1">
                 <a:solidFill>
                   <a:srgbClr val="ACCFEE"/>
                 </a:solidFill>
@@ -8279,7 +8549,7 @@
               <a:t>.</a:t>
             </a:r>
             <a:r>
-              <a:rPr lang="en-US" sz="2200" dirty="0">
+              <a:rPr lang="pt-PT" sz="2200" noProof="1">
                 <a:solidFill>
                   <a:srgbClr val="002060"/>
                 </a:solidFill>
@@ -8287,7 +8557,7 @@
               <a:t>                                          (</a:t>
             </a:r>
             <a:r>
-              <a:rPr lang="en-US" sz="2200" b="1" dirty="0">
+              <a:rPr lang="pt-PT" sz="2200" b="1" noProof="1">
                 <a:solidFill>
                   <a:srgbClr val="002060"/>
                 </a:solidFill>
@@ -8295,18 +8565,13 @@
               <a:t>Hoare quadruple</a:t>
             </a:r>
             <a:r>
-              <a:rPr lang="en-US" sz="2200" dirty="0">
+              <a:rPr lang="pt-PT" sz="2200" noProof="1">
                 <a:solidFill>
                   <a:srgbClr val="002060"/>
                 </a:solidFill>
               </a:rPr>
               <a:t>)</a:t>
             </a:r>
-            <a:endParaRPr lang="en-US" sz="2200" noProof="0" dirty="0">
-              <a:solidFill>
-                <a:srgbClr val="002060"/>
-              </a:solidFill>
-            </a:endParaRPr>
           </a:p>
         </p:txBody>
       </p:sp>
@@ -8340,31 +8605,15 @@
           <a:p>
             <a:pPr algn="ctr"/>
             <a:r>
-              <a:rPr lang="en-US" sz="2800" noProof="0" dirty="0">
-                <a:solidFill>
-                  <a:srgbClr val="002060"/>
-                </a:solidFill>
-              </a:rPr>
-              <a:t>{</a:t>
-            </a:r>
-            <a:r>
-              <a:rPr lang="el-GR" sz="2800" dirty="0">
-                <a:solidFill>
-                  <a:srgbClr val="002060"/>
-                </a:solidFill>
-              </a:rPr>
-              <a:t>Φ</a:t>
-            </a:r>
-            <a:r>
-              <a:rPr lang="en-US" sz="2800" noProof="0" dirty="0">
-                <a:solidFill>
-                  <a:srgbClr val="002060"/>
-                </a:solidFill>
-              </a:rPr>
-              <a:t>} </a:t>
-            </a:r>
-            <a:r>
-              <a:rPr lang="en-US" sz="2800" i="1" noProof="0" dirty="0">
+              <a:rPr lang="pt-PT" sz="2800" noProof="1">
+                <a:solidFill>
+                  <a:srgbClr val="002060"/>
+                </a:solidFill>
+              </a:rPr>
+              <a:t>{Φ} </a:t>
+            </a:r>
+            <a:r>
+              <a:rPr lang="pt-PT" sz="2800" i="1" noProof="1">
                 <a:solidFill>
                   <a:srgbClr val="002060"/>
                 </a:solidFill>
@@ -8372,7 +8621,7 @@
               <a:t>P1</a:t>
             </a:r>
             <a:r>
-              <a:rPr lang="en-US" sz="2800" noProof="0" dirty="0">
+              <a:rPr lang="pt-PT" sz="2800" noProof="1">
                 <a:solidFill>
                   <a:srgbClr val="002060"/>
                 </a:solidFill>
@@ -8380,7 +8629,7 @@
               <a:t> ~ </a:t>
             </a:r>
             <a:r>
-              <a:rPr lang="en-US" sz="2800" i="1" noProof="0" dirty="0">
+              <a:rPr lang="pt-PT" sz="2800" i="1" noProof="1">
                 <a:solidFill>
                   <a:srgbClr val="002060"/>
                 </a:solidFill>
@@ -8388,28 +8637,12 @@
               <a:t>P2</a:t>
             </a:r>
             <a:r>
-              <a:rPr lang="en-US" sz="2800" noProof="0" dirty="0">
-                <a:solidFill>
-                  <a:srgbClr val="002060"/>
-                </a:solidFill>
-              </a:rPr>
-              <a:t>  {</a:t>
-            </a:r>
-            <a:r>
-              <a:rPr lang="el-GR" sz="2800" dirty="0">
-                <a:solidFill>
-                  <a:srgbClr val="002060"/>
-                </a:solidFill>
-              </a:rPr>
-              <a:t>Ψ</a:t>
-            </a:r>
-            <a:r>
-              <a:rPr lang="en-US" sz="2800" noProof="0" dirty="0">
-                <a:solidFill>
-                  <a:srgbClr val="002060"/>
-                </a:solidFill>
-              </a:rPr>
-              <a:t>}</a:t>
+              <a:rPr lang="pt-PT" sz="2800" noProof="1">
+                <a:solidFill>
+                  <a:srgbClr val="002060"/>
+                </a:solidFill>
+              </a:rPr>
+              <a:t>  {Ψ}</a:t>
             </a:r>
           </a:p>
         </p:txBody>
@@ -8436,10 +8669,10 @@
           <a:lstStyle/>
           <a:p>
             <a:fld id="{292A9FD8-515A-4698-9313-0AB17EE9632B}" type="slidenum">
-              <a:rPr lang="en-US" smtClean="0"/>
+              <a:rPr lang="pt-PT" noProof="1" smtClean="0"/>
               <a:t>9</a:t>
             </a:fld>
-            <a:endParaRPr lang="en-US"/>
+            <a:endParaRPr lang="pt-PT" noProof="1"/>
           </a:p>
         </p:txBody>
       </p:sp>

</xml_diff>

<commit_message>
first complete version of the ppt
</commit_message>
<xml_diff>
--- a/Ap Prep Tese.pptx
+++ b/Ap Prep Tese.pptx
@@ -5,7 +5,7 @@
     <p:sldMasterId id="2147483672" r:id="rId1"/>
   </p:sldMasterIdLst>
   <p:notesMasterIdLst>
-    <p:notesMasterId r:id="rId27"/>
+    <p:notesMasterId r:id="rId28"/>
   </p:notesMasterIdLst>
   <p:sldIdLst>
     <p:sldId id="256" r:id="rId2"/>
@@ -19,20 +19,21 @@
     <p:sldId id="283" r:id="rId10"/>
     <p:sldId id="270" r:id="rId11"/>
     <p:sldId id="268" r:id="rId12"/>
-    <p:sldId id="271" r:id="rId13"/>
-    <p:sldId id="272" r:id="rId14"/>
-    <p:sldId id="284" r:id="rId15"/>
-    <p:sldId id="273" r:id="rId16"/>
-    <p:sldId id="260" r:id="rId17"/>
-    <p:sldId id="274" r:id="rId18"/>
-    <p:sldId id="275" r:id="rId19"/>
-    <p:sldId id="276" r:id="rId20"/>
-    <p:sldId id="277" r:id="rId21"/>
-    <p:sldId id="261" r:id="rId22"/>
-    <p:sldId id="278" r:id="rId23"/>
-    <p:sldId id="279" r:id="rId24"/>
-    <p:sldId id="262" r:id="rId25"/>
-    <p:sldId id="263" r:id="rId26"/>
+    <p:sldId id="285" r:id="rId13"/>
+    <p:sldId id="271" r:id="rId14"/>
+    <p:sldId id="272" r:id="rId15"/>
+    <p:sldId id="284" r:id="rId16"/>
+    <p:sldId id="273" r:id="rId17"/>
+    <p:sldId id="260" r:id="rId18"/>
+    <p:sldId id="274" r:id="rId19"/>
+    <p:sldId id="275" r:id="rId20"/>
+    <p:sldId id="276" r:id="rId21"/>
+    <p:sldId id="277" r:id="rId22"/>
+    <p:sldId id="261" r:id="rId23"/>
+    <p:sldId id="278" r:id="rId24"/>
+    <p:sldId id="279" r:id="rId25"/>
+    <p:sldId id="262" r:id="rId26"/>
+    <p:sldId id="263" r:id="rId27"/>
   </p:sldIdLst>
   <p:sldSz cx="9144000" cy="5715000" type="screen16x10"/>
   <p:notesSz cx="6858000" cy="9144000"/>
@@ -221,7 +222,7 @@
           <a:p>
             <a:fld id="{374D7271-F55A-4686-93D9-9528AEDA1906}" type="datetimeFigureOut">
               <a:rPr lang="en-US" smtClean="0"/>
-              <a:t>2/17/2025</a:t>
+              <a:t>2/20/2025</a:t>
             </a:fld>
             <a:endParaRPr lang="en-US"/>
           </a:p>
@@ -619,7 +620,7 @@
           <a:p>
             <a:fld id="{1E5BF2F9-84AD-46CB-8486-EB732804F762}" type="datetime1">
               <a:rPr lang="en-US" smtClean="0"/>
-              <a:t>2/17/2025</a:t>
+              <a:t>2/20/2025</a:t>
             </a:fld>
             <a:endParaRPr lang="en-US"/>
           </a:p>
@@ -798,7 +799,7 @@
           <a:p>
             <a:fld id="{23618752-90E6-4B57-86C0-C43DD2320A2D}" type="datetime1">
               <a:rPr lang="en-US" smtClean="0"/>
-              <a:t>2/17/2025</a:t>
+              <a:t>2/20/2025</a:t>
             </a:fld>
             <a:endParaRPr lang="en-US"/>
           </a:p>
@@ -978,7 +979,7 @@
           <a:p>
             <a:fld id="{85BE5269-252E-4ABC-B047-AD967E98EA5E}" type="datetime1">
               <a:rPr lang="en-US" smtClean="0"/>
-              <a:t>2/17/2025</a:t>
+              <a:t>2/20/2025</a:t>
             </a:fld>
             <a:endParaRPr lang="en-US"/>
           </a:p>
@@ -1148,7 +1149,7 @@
           <a:p>
             <a:fld id="{C4D54784-9B75-4DBC-ACA0-9F51227CD78F}" type="datetime1">
               <a:rPr lang="en-US" smtClean="0"/>
-              <a:t>2/17/2025</a:t>
+              <a:t>2/20/2025</a:t>
             </a:fld>
             <a:endParaRPr lang="en-US"/>
           </a:p>
@@ -1394,7 +1395,7 @@
           <a:p>
             <a:fld id="{3D9E4D52-32DE-4F35-8CB6-5A44573D3FC9}" type="datetime1">
               <a:rPr lang="en-US" smtClean="0"/>
-              <a:t>2/17/2025</a:t>
+              <a:t>2/20/2025</a:t>
             </a:fld>
             <a:endParaRPr lang="en-US"/>
           </a:p>
@@ -1626,7 +1627,7 @@
           <a:p>
             <a:fld id="{D0FFB22E-8A21-4AF6-BDE0-993A2F9B14BB}" type="datetime1">
               <a:rPr lang="en-US" smtClean="0"/>
-              <a:t>2/17/2025</a:t>
+              <a:t>2/20/2025</a:t>
             </a:fld>
             <a:endParaRPr lang="en-US"/>
           </a:p>
@@ -1993,7 +1994,7 @@
           <a:p>
             <a:fld id="{AC41D9E4-527D-47F1-B47F-963D62CCBC76}" type="datetime1">
               <a:rPr lang="en-US" smtClean="0"/>
-              <a:t>2/17/2025</a:t>
+              <a:t>2/20/2025</a:t>
             </a:fld>
             <a:endParaRPr lang="en-US"/>
           </a:p>
@@ -2111,7 +2112,7 @@
           <a:p>
             <a:fld id="{9906A608-925A-4874-BCA4-36BA40FADF76}" type="datetime1">
               <a:rPr lang="en-US" smtClean="0"/>
-              <a:t>2/17/2025</a:t>
+              <a:t>2/20/2025</a:t>
             </a:fld>
             <a:endParaRPr lang="en-US"/>
           </a:p>
@@ -2206,7 +2207,7 @@
           <a:p>
             <a:fld id="{45CCB426-3683-4E7C-B869-5155B20F8BC6}" type="datetime1">
               <a:rPr lang="en-US" smtClean="0"/>
-              <a:t>2/17/2025</a:t>
+              <a:t>2/20/2025</a:t>
             </a:fld>
             <a:endParaRPr lang="en-US"/>
           </a:p>
@@ -2483,7 +2484,7 @@
           <a:p>
             <a:fld id="{3351EA60-24F6-40E8-A0D7-2067F6ECA6B2}" type="datetime1">
               <a:rPr lang="en-US" smtClean="0"/>
-              <a:t>2/17/2025</a:t>
+              <a:t>2/20/2025</a:t>
             </a:fld>
             <a:endParaRPr lang="en-US"/>
           </a:p>
@@ -2740,7 +2741,7 @@
           <a:p>
             <a:fld id="{C6106440-8C5F-4111-9AD5-D0C1FDF01CE9}" type="datetime1">
               <a:rPr lang="en-US" smtClean="0"/>
-              <a:t>2/17/2025</a:t>
+              <a:t>2/20/2025</a:t>
             </a:fld>
             <a:endParaRPr lang="en-US"/>
           </a:p>
@@ -2953,7 +2954,7 @@
           <a:p>
             <a:fld id="{2A16FEB8-5B01-4F5E-B573-CC516A2AD5E4}" type="datetime1">
               <a:rPr lang="en-US" smtClean="0"/>
-              <a:t>2/17/2025</a:t>
+              <a:t>2/20/2025</a:t>
             </a:fld>
             <a:endParaRPr lang="en-US"/>
           </a:p>
@@ -3870,7 +3871,7 @@
 </file>
 
 <file path=ppt/slides/slide11.xml><?xml version="1.0" encoding="utf-8"?>
-<p:sld xmlns:a="http://schemas.openxmlformats.org/drawingml/2006/main" xmlns:r="http://schemas.openxmlformats.org/officeDocument/2006/relationships" xmlns:p="http://schemas.openxmlformats.org/presentationml/2006/main" show="0">
+<p:sld xmlns:a="http://schemas.openxmlformats.org/drawingml/2006/main" xmlns:r="http://schemas.openxmlformats.org/officeDocument/2006/relationships" xmlns:p="http://schemas.openxmlformats.org/presentationml/2006/main">
   <p:cSld>
     <p:bg>
       <p:bgPr>
@@ -3934,7 +3935,7 @@
                   <a:srgbClr val="002060"/>
                 </a:solidFill>
               </a:rPr>
-              <a:t>OCaml</a:t>
+              <a:t>Ocaml (1/2)</a:t>
             </a:r>
             <a:endParaRPr lang="pt-PT" sz="2800" noProof="1"/>
           </a:p>
@@ -3954,8 +3955,8 @@
         </p:nvSpPr>
         <p:spPr>
           <a:xfrm>
-            <a:off x="469556" y="1609536"/>
-            <a:ext cx="5132174" cy="1785104"/>
+            <a:off x="469556" y="2072670"/>
+            <a:ext cx="7430530" cy="1569660"/>
           </a:xfrm>
           <a:prstGeom prst="rect">
             <a:avLst/>
@@ -3973,12 +3974,12 @@
               <a:buChar char="•"/>
             </a:pPr>
             <a:r>
-              <a:rPr lang="pt-PT" sz="2200" noProof="1">
-                <a:solidFill>
-                  <a:srgbClr val="002060"/>
-                </a:solidFill>
-              </a:rPr>
-              <a:t>Multi-paradigm, interpreted or compiled, strongly and statically typed with type inference</a:t>
+              <a:rPr lang="pt-PT" sz="2400" noProof="1">
+                <a:solidFill>
+                  <a:srgbClr val="002060"/>
+                </a:solidFill>
+              </a:rPr>
+              <a:t>Multi-paradigm</a:t>
             </a:r>
           </a:p>
           <a:p>
@@ -3987,270 +3988,40 @@
               <a:buChar char="•"/>
             </a:pPr>
             <a:r>
-              <a:rPr lang="pt-PT" sz="2200" noProof="1">
+              <a:rPr lang="pt-PT" sz="2400" noProof="1">
+                <a:solidFill>
+                  <a:srgbClr val="002060"/>
+                </a:solidFill>
+              </a:rPr>
+              <a:t>Interpreted or compiled</a:t>
+            </a:r>
+          </a:p>
+          <a:p>
+            <a:pPr marL="342900" indent="-342900">
+              <a:buFont typeface="Arial" panose="020B0604020202020204" pitchFamily="34" charset="0"/>
+              <a:buChar char="•"/>
+            </a:pPr>
+            <a:r>
+              <a:rPr lang="pt-PT" sz="2400" noProof="1">
+                <a:solidFill>
+                  <a:srgbClr val="002060"/>
+                </a:solidFill>
+              </a:rPr>
+              <a:t>Strongly and statically typed with type inference</a:t>
+            </a:r>
+          </a:p>
+          <a:p>
+            <a:pPr marL="342900" indent="-342900">
+              <a:buFont typeface="Arial" panose="020B0604020202020204" pitchFamily="34" charset="0"/>
+              <a:buChar char="•"/>
+            </a:pPr>
+            <a:r>
+              <a:rPr lang="pt-PT" sz="2400" noProof="1">
                 <a:solidFill>
                   <a:srgbClr val="002060"/>
                 </a:solidFill>
               </a:rPr>
               <a:t>Used in: Meta, Microsoft, Bloomberg, Docker, Coq…</a:t>
-            </a:r>
-          </a:p>
-        </p:txBody>
-      </p:sp>
-      <p:sp>
-        <p:nvSpPr>
-          <p:cNvPr id="4" name="TextBox 3">
-            <a:extLst>
-              <a:ext uri="{FF2B5EF4-FFF2-40B4-BE49-F238E27FC236}">
-                <a16:creationId xmlns:a16="http://schemas.microsoft.com/office/drawing/2014/main" id="{6B2C040B-C006-E980-511D-62DEEFA598D2}"/>
-              </a:ext>
-            </a:extLst>
-          </p:cNvPr>
-          <p:cNvSpPr txBox="1"/>
-          <p:nvPr/>
-        </p:nvSpPr>
-        <p:spPr>
-          <a:xfrm>
-            <a:off x="469556" y="3714842"/>
-            <a:ext cx="4394887" cy="1107996"/>
-          </a:xfrm>
-          <a:prstGeom prst="rect">
-            <a:avLst/>
-          </a:prstGeom>
-          <a:noFill/>
-        </p:spPr>
-        <p:txBody>
-          <a:bodyPr wrap="square" rtlCol="0">
-            <a:spAutoFit/>
-          </a:bodyPr>
-          <a:lstStyle/>
-          <a:p>
-            <a:r>
-              <a:rPr lang="pt-PT" sz="2200" noProof="1">
-                <a:solidFill>
-                  <a:srgbClr val="002060"/>
-                </a:solidFill>
-              </a:rPr>
-              <a:t>let rec gcd (a: int) (b:int) : int =</a:t>
-            </a:r>
-          </a:p>
-          <a:p>
-            <a:r>
-              <a:rPr lang="pt-PT" sz="2200" noProof="1">
-                <a:solidFill>
-                  <a:srgbClr val="002060"/>
-                </a:solidFill>
-              </a:rPr>
-              <a:t>   if b = 0 then a</a:t>
-            </a:r>
-          </a:p>
-          <a:p>
-            <a:r>
-              <a:rPr lang="pt-PT" sz="2200" noProof="1">
-                <a:solidFill>
-                  <a:srgbClr val="002060"/>
-                </a:solidFill>
-              </a:rPr>
-              <a:t>   else gcd b (mod a b)</a:t>
-            </a:r>
-          </a:p>
-        </p:txBody>
-      </p:sp>
-      <p:sp>
-        <p:nvSpPr>
-          <p:cNvPr id="5" name="TextBox 4">
-            <a:extLst>
-              <a:ext uri="{FF2B5EF4-FFF2-40B4-BE49-F238E27FC236}">
-                <a16:creationId xmlns:a16="http://schemas.microsoft.com/office/drawing/2014/main" id="{6C410D09-5AEC-1BD8-E438-96931AD9F734}"/>
-              </a:ext>
-            </a:extLst>
-          </p:cNvPr>
-          <p:cNvSpPr txBox="1"/>
-          <p:nvPr/>
-        </p:nvSpPr>
-        <p:spPr>
-          <a:xfrm>
-            <a:off x="5898293" y="2023947"/>
-            <a:ext cx="3245707" cy="3539430"/>
-          </a:xfrm>
-          <a:prstGeom prst="rect">
-            <a:avLst/>
-          </a:prstGeom>
-          <a:noFill/>
-        </p:spPr>
-        <p:txBody>
-          <a:bodyPr wrap="square" rtlCol="0">
-            <a:spAutoFit/>
-          </a:bodyPr>
-          <a:lstStyle/>
-          <a:p>
-            <a:r>
-              <a:rPr lang="pt-PT" sz="2200" noProof="1">
-                <a:solidFill>
-                  <a:srgbClr val="002060"/>
-                </a:solidFill>
-              </a:rPr>
-              <a:t>let gcd_iter (a0: int)      (b0: int) : int =   </a:t>
-            </a:r>
-          </a:p>
-          <a:p>
-            <a:r>
-              <a:rPr lang="pt-PT" sz="2200" noProof="1">
-                <a:solidFill>
-                  <a:srgbClr val="002060"/>
-                </a:solidFill>
-              </a:rPr>
-              <a:t>      let b = ref b0 in</a:t>
-            </a:r>
-          </a:p>
-          <a:p>
-            <a:r>
-              <a:rPr lang="pt-PT" sz="2200" noProof="1">
-                <a:solidFill>
-                  <a:srgbClr val="002060"/>
-                </a:solidFill>
-              </a:rPr>
-              <a:t>      let a = ref a0 in</a:t>
-            </a:r>
-          </a:p>
-          <a:p>
-            <a:r>
-              <a:rPr lang="pt-PT" sz="2200" noProof="1">
-                <a:solidFill>
-                  <a:srgbClr val="002060"/>
-                </a:solidFill>
-              </a:rPr>
-              <a:t>      while !b &lt;&gt; 0 do</a:t>
-            </a:r>
-          </a:p>
-          <a:p>
-            <a:r>
-              <a:rPr lang="pt-PT" sz="2200" noProof="1">
-                <a:solidFill>
-                  <a:srgbClr val="002060"/>
-                </a:solidFill>
-              </a:rPr>
-              <a:t>          let tmp = !a in</a:t>
-            </a:r>
-          </a:p>
-          <a:p>
-            <a:r>
-              <a:rPr lang="pt-PT" sz="2200" noProof="1">
-                <a:solidFill>
-                  <a:srgbClr val="002060"/>
-                </a:solidFill>
-              </a:rPr>
-              <a:t>          a := !b;</a:t>
-            </a:r>
-          </a:p>
-          <a:p>
-            <a:r>
-              <a:rPr lang="pt-PT" sz="2200" noProof="1">
-                <a:solidFill>
-                  <a:srgbClr val="002060"/>
-                </a:solidFill>
-              </a:rPr>
-              <a:t>          b := tmp mod !b</a:t>
-            </a:r>
-          </a:p>
-          <a:p>
-            <a:r>
-              <a:rPr lang="pt-PT" sz="2200" noProof="1">
-                <a:solidFill>
-                  <a:srgbClr val="002060"/>
-                </a:solidFill>
-              </a:rPr>
-              <a:t>      done;</a:t>
-            </a:r>
-          </a:p>
-          <a:p>
-            <a:r>
-              <a:rPr lang="pt-PT" sz="2200" noProof="1">
-                <a:solidFill>
-                  <a:srgbClr val="002060"/>
-                </a:solidFill>
-              </a:rPr>
-              <a:t>      !a</a:t>
-            </a:r>
-          </a:p>
-        </p:txBody>
-      </p:sp>
-      <p:sp>
-        <p:nvSpPr>
-          <p:cNvPr id="6" name="TextBox 5">
-            <a:extLst>
-              <a:ext uri="{FF2B5EF4-FFF2-40B4-BE49-F238E27FC236}">
-                <a16:creationId xmlns:a16="http://schemas.microsoft.com/office/drawing/2014/main" id="{7DB3CD8C-EBA8-4863-BA1A-160F3A9C0CE3}"/>
-              </a:ext>
-            </a:extLst>
-          </p:cNvPr>
-          <p:cNvSpPr txBox="1"/>
-          <p:nvPr/>
-        </p:nvSpPr>
-        <p:spPr>
-          <a:xfrm>
-            <a:off x="6639696" y="1394092"/>
-            <a:ext cx="1762899" cy="430887"/>
-          </a:xfrm>
-          <a:prstGeom prst="rect">
-            <a:avLst/>
-          </a:prstGeom>
-          <a:noFill/>
-        </p:spPr>
-        <p:txBody>
-          <a:bodyPr wrap="square" rtlCol="0">
-            <a:spAutoFit/>
-          </a:bodyPr>
-          <a:lstStyle/>
-          <a:p>
-            <a:pPr algn="ctr"/>
-            <a:r>
-              <a:rPr lang="pt-PT" sz="2200" b="1" noProof="1">
-                <a:solidFill>
-                  <a:srgbClr val="002060"/>
-                </a:solidFill>
-              </a:rPr>
-              <a:t>Imperative</a:t>
-            </a:r>
-          </a:p>
-        </p:txBody>
-      </p:sp>
-      <p:sp>
-        <p:nvSpPr>
-          <p:cNvPr id="7" name="TextBox 6">
-            <a:extLst>
-              <a:ext uri="{FF2B5EF4-FFF2-40B4-BE49-F238E27FC236}">
-                <a16:creationId xmlns:a16="http://schemas.microsoft.com/office/drawing/2014/main" id="{94072401-A1C1-359C-C546-091985F0A347}"/>
-              </a:ext>
-            </a:extLst>
-          </p:cNvPr>
-          <p:cNvSpPr txBox="1"/>
-          <p:nvPr/>
-        </p:nvSpPr>
-        <p:spPr>
-          <a:xfrm>
-            <a:off x="1396312" y="4927596"/>
-            <a:ext cx="1762899" cy="430887"/>
-          </a:xfrm>
-          <a:prstGeom prst="rect">
-            <a:avLst/>
-          </a:prstGeom>
-          <a:noFill/>
-        </p:spPr>
-        <p:txBody>
-          <a:bodyPr wrap="square" rtlCol="0">
-            <a:spAutoFit/>
-          </a:bodyPr>
-          <a:lstStyle/>
-          <a:p>
-            <a:pPr algn="ctr"/>
-            <a:r>
-              <a:rPr lang="pt-PT" sz="2200" b="1" noProof="1">
-                <a:solidFill>
-                  <a:srgbClr val="002060"/>
-                </a:solidFill>
-              </a:rPr>
-              <a:t>Functional</a:t>
             </a:r>
           </a:p>
         </p:txBody>
@@ -4298,7 +4069,378 @@
 </file>
 
 <file path=ppt/slides/slide12.xml><?xml version="1.0" encoding="utf-8"?>
-<p:sld xmlns:a="http://schemas.openxmlformats.org/drawingml/2006/main" xmlns:r="http://schemas.openxmlformats.org/officeDocument/2006/relationships" xmlns:p="http://schemas.openxmlformats.org/presentationml/2006/main" show="0">
+<p:sld xmlns:a="http://schemas.openxmlformats.org/drawingml/2006/main" xmlns:r="http://schemas.openxmlformats.org/officeDocument/2006/relationships" xmlns:p="http://schemas.openxmlformats.org/presentationml/2006/main">
+  <p:cSld>
+    <p:bg>
+      <p:bgPr>
+        <a:solidFill>
+          <a:srgbClr val="ACCFEE"/>
+        </a:solidFill>
+        <a:effectLst/>
+      </p:bgPr>
+    </p:bg>
+    <p:spTree>
+      <p:nvGrpSpPr>
+        <p:cNvPr id="1" name="">
+          <a:extLst>
+            <a:ext uri="{FF2B5EF4-FFF2-40B4-BE49-F238E27FC236}">
+              <a16:creationId xmlns:a16="http://schemas.microsoft.com/office/drawing/2014/main" id="{FCF8EE8F-22A6-F1D4-FBBB-BCC8F7947E63}"/>
+            </a:ext>
+          </a:extLst>
+        </p:cNvPr>
+        <p:cNvGrpSpPr/>
+        <p:nvPr/>
+      </p:nvGrpSpPr>
+      <p:grpSpPr>
+        <a:xfrm>
+          <a:off x="0" y="0"/>
+          <a:ext cx="0" cy="0"/>
+          <a:chOff x="0" y="0"/>
+          <a:chExt cx="0" cy="0"/>
+        </a:xfrm>
+      </p:grpSpPr>
+      <p:sp>
+        <p:nvSpPr>
+          <p:cNvPr id="2" name="TextBox 1">
+            <a:extLst>
+              <a:ext uri="{FF2B5EF4-FFF2-40B4-BE49-F238E27FC236}">
+                <a16:creationId xmlns:a16="http://schemas.microsoft.com/office/drawing/2014/main" id="{7B6E19D4-30CF-86A0-73E1-139F833182D9}"/>
+              </a:ext>
+            </a:extLst>
+          </p:cNvPr>
+          <p:cNvSpPr txBox="1"/>
+          <p:nvPr/>
+        </p:nvSpPr>
+        <p:spPr>
+          <a:xfrm>
+            <a:off x="469556" y="626071"/>
+            <a:ext cx="4572000" cy="523220"/>
+          </a:xfrm>
+          <a:prstGeom prst="rect">
+            <a:avLst/>
+          </a:prstGeom>
+          <a:noFill/>
+        </p:spPr>
+        <p:txBody>
+          <a:bodyPr wrap="square" rtlCol="0">
+            <a:spAutoFit/>
+          </a:bodyPr>
+          <a:lstStyle/>
+          <a:p>
+            <a:r>
+              <a:rPr lang="pt-PT" sz="2800" noProof="1">
+                <a:solidFill>
+                  <a:srgbClr val="002060"/>
+                </a:solidFill>
+              </a:rPr>
+              <a:t>Ocaml (2/2)</a:t>
+            </a:r>
+            <a:endParaRPr lang="pt-PT" sz="2800" noProof="1"/>
+          </a:p>
+        </p:txBody>
+      </p:sp>
+      <p:sp>
+        <p:nvSpPr>
+          <p:cNvPr id="4" name="TextBox 3">
+            <a:extLst>
+              <a:ext uri="{FF2B5EF4-FFF2-40B4-BE49-F238E27FC236}">
+                <a16:creationId xmlns:a16="http://schemas.microsoft.com/office/drawing/2014/main" id="{FA91A7A2-7DB7-9936-26EC-F405DD78909E}"/>
+              </a:ext>
+            </a:extLst>
+          </p:cNvPr>
+          <p:cNvSpPr txBox="1"/>
+          <p:nvPr/>
+        </p:nvSpPr>
+        <p:spPr>
+          <a:xfrm>
+            <a:off x="469556" y="2491518"/>
+            <a:ext cx="4394887" cy="1107996"/>
+          </a:xfrm>
+          <a:prstGeom prst="rect">
+            <a:avLst/>
+          </a:prstGeom>
+          <a:noFill/>
+        </p:spPr>
+        <p:txBody>
+          <a:bodyPr wrap="square" rtlCol="0">
+            <a:spAutoFit/>
+          </a:bodyPr>
+          <a:lstStyle/>
+          <a:p>
+            <a:r>
+              <a:rPr lang="pt-PT" sz="2200" noProof="1">
+                <a:solidFill>
+                  <a:srgbClr val="002060"/>
+                </a:solidFill>
+              </a:rPr>
+              <a:t>let rec gcd (a: int) (b:int) : int =</a:t>
+            </a:r>
+          </a:p>
+          <a:p>
+            <a:r>
+              <a:rPr lang="pt-PT" sz="2200" noProof="1">
+                <a:solidFill>
+                  <a:srgbClr val="002060"/>
+                </a:solidFill>
+              </a:rPr>
+              <a:t>   if b = 0 then a</a:t>
+            </a:r>
+          </a:p>
+          <a:p>
+            <a:r>
+              <a:rPr lang="pt-PT" sz="2200" noProof="1">
+                <a:solidFill>
+                  <a:srgbClr val="002060"/>
+                </a:solidFill>
+              </a:rPr>
+              <a:t>   else gcd b (mod a b)</a:t>
+            </a:r>
+          </a:p>
+        </p:txBody>
+      </p:sp>
+      <p:sp>
+        <p:nvSpPr>
+          <p:cNvPr id="5" name="TextBox 4">
+            <a:extLst>
+              <a:ext uri="{FF2B5EF4-FFF2-40B4-BE49-F238E27FC236}">
+                <a16:creationId xmlns:a16="http://schemas.microsoft.com/office/drawing/2014/main" id="{1ECEEEF9-24CA-62A0-4225-AB0A6AC0D0E4}"/>
+              </a:ext>
+            </a:extLst>
+          </p:cNvPr>
+          <p:cNvSpPr txBox="1"/>
+          <p:nvPr/>
+        </p:nvSpPr>
+        <p:spPr>
+          <a:xfrm>
+            <a:off x="4572000" y="1900043"/>
+            <a:ext cx="4394887" cy="3139321"/>
+          </a:xfrm>
+          <a:prstGeom prst="rect">
+            <a:avLst/>
+          </a:prstGeom>
+          <a:noFill/>
+        </p:spPr>
+        <p:txBody>
+          <a:bodyPr wrap="square" rtlCol="0">
+            <a:spAutoFit/>
+          </a:bodyPr>
+          <a:lstStyle/>
+          <a:p>
+            <a:r>
+              <a:rPr lang="pt-PT" sz="2200" noProof="1">
+                <a:solidFill>
+                  <a:srgbClr val="002060"/>
+                </a:solidFill>
+              </a:rPr>
+              <a:t>let gcd_iter (a0: int) (b0: int) : int =   </a:t>
+            </a:r>
+          </a:p>
+          <a:p>
+            <a:r>
+              <a:rPr lang="pt-PT" sz="2200" noProof="1">
+                <a:solidFill>
+                  <a:srgbClr val="002060"/>
+                </a:solidFill>
+              </a:rPr>
+              <a:t>      let b = ref b0 in</a:t>
+            </a:r>
+          </a:p>
+          <a:p>
+            <a:r>
+              <a:rPr lang="pt-PT" sz="2200" noProof="1">
+                <a:solidFill>
+                  <a:srgbClr val="002060"/>
+                </a:solidFill>
+              </a:rPr>
+              <a:t>      let a = ref a0 in</a:t>
+            </a:r>
+          </a:p>
+          <a:p>
+            <a:r>
+              <a:rPr lang="pt-PT" sz="2200" noProof="1">
+                <a:solidFill>
+                  <a:srgbClr val="002060"/>
+                </a:solidFill>
+              </a:rPr>
+              <a:t>      while !b &lt;&gt; 0 do</a:t>
+            </a:r>
+          </a:p>
+          <a:p>
+            <a:r>
+              <a:rPr lang="pt-PT" sz="2200" noProof="1">
+                <a:solidFill>
+                  <a:srgbClr val="002060"/>
+                </a:solidFill>
+              </a:rPr>
+              <a:t>          let tmp = !a in</a:t>
+            </a:r>
+          </a:p>
+          <a:p>
+            <a:r>
+              <a:rPr lang="pt-PT" sz="2200" noProof="1">
+                <a:solidFill>
+                  <a:srgbClr val="002060"/>
+                </a:solidFill>
+              </a:rPr>
+              <a:t>          a := !b;</a:t>
+            </a:r>
+          </a:p>
+          <a:p>
+            <a:r>
+              <a:rPr lang="pt-PT" sz="2200" noProof="1">
+                <a:solidFill>
+                  <a:srgbClr val="002060"/>
+                </a:solidFill>
+              </a:rPr>
+              <a:t>          b := tmp mod !b</a:t>
+            </a:r>
+          </a:p>
+          <a:p>
+            <a:r>
+              <a:rPr lang="pt-PT" sz="2200" noProof="1">
+                <a:solidFill>
+                  <a:srgbClr val="002060"/>
+                </a:solidFill>
+              </a:rPr>
+              <a:t>      done;</a:t>
+            </a:r>
+          </a:p>
+          <a:p>
+            <a:r>
+              <a:rPr lang="pt-PT" sz="2200" noProof="1">
+                <a:solidFill>
+                  <a:srgbClr val="002060"/>
+                </a:solidFill>
+              </a:rPr>
+              <a:t>      !a</a:t>
+            </a:r>
+          </a:p>
+        </p:txBody>
+      </p:sp>
+      <p:sp>
+        <p:nvSpPr>
+          <p:cNvPr id="6" name="TextBox 5">
+            <a:extLst>
+              <a:ext uri="{FF2B5EF4-FFF2-40B4-BE49-F238E27FC236}">
+                <a16:creationId xmlns:a16="http://schemas.microsoft.com/office/drawing/2014/main" id="{C217E93C-AEE3-2272-5E9C-219FFD409691}"/>
+              </a:ext>
+            </a:extLst>
+          </p:cNvPr>
+          <p:cNvSpPr txBox="1"/>
+          <p:nvPr/>
+        </p:nvSpPr>
+        <p:spPr>
+          <a:xfrm>
+            <a:off x="5576500" y="1211561"/>
+            <a:ext cx="1762899" cy="430887"/>
+          </a:xfrm>
+          <a:prstGeom prst="rect">
+            <a:avLst/>
+          </a:prstGeom>
+          <a:noFill/>
+        </p:spPr>
+        <p:txBody>
+          <a:bodyPr wrap="square" rtlCol="0">
+            <a:spAutoFit/>
+          </a:bodyPr>
+          <a:lstStyle/>
+          <a:p>
+            <a:pPr algn="ctr"/>
+            <a:r>
+              <a:rPr lang="pt-PT" sz="2200" b="1" noProof="1">
+                <a:solidFill>
+                  <a:srgbClr val="002060"/>
+                </a:solidFill>
+              </a:rPr>
+              <a:t>Imperative</a:t>
+            </a:r>
+          </a:p>
+        </p:txBody>
+      </p:sp>
+      <p:sp>
+        <p:nvSpPr>
+          <p:cNvPr id="7" name="TextBox 6">
+            <a:extLst>
+              <a:ext uri="{FF2B5EF4-FFF2-40B4-BE49-F238E27FC236}">
+                <a16:creationId xmlns:a16="http://schemas.microsoft.com/office/drawing/2014/main" id="{7226EC03-05AA-307E-2F02-421AA59FED2C}"/>
+              </a:ext>
+            </a:extLst>
+          </p:cNvPr>
+          <p:cNvSpPr txBox="1"/>
+          <p:nvPr/>
+        </p:nvSpPr>
+        <p:spPr>
+          <a:xfrm>
+            <a:off x="1297458" y="1881534"/>
+            <a:ext cx="1762899" cy="430887"/>
+          </a:xfrm>
+          <a:prstGeom prst="rect">
+            <a:avLst/>
+          </a:prstGeom>
+          <a:noFill/>
+        </p:spPr>
+        <p:txBody>
+          <a:bodyPr wrap="square" rtlCol="0">
+            <a:spAutoFit/>
+          </a:bodyPr>
+          <a:lstStyle/>
+          <a:p>
+            <a:pPr algn="ctr"/>
+            <a:r>
+              <a:rPr lang="pt-PT" sz="2200" b="1" noProof="1">
+                <a:solidFill>
+                  <a:srgbClr val="002060"/>
+                </a:solidFill>
+              </a:rPr>
+              <a:t>Functional</a:t>
+            </a:r>
+          </a:p>
+        </p:txBody>
+      </p:sp>
+      <p:sp>
+        <p:nvSpPr>
+          <p:cNvPr id="8" name="Slide Number Placeholder 7">
+            <a:extLst>
+              <a:ext uri="{FF2B5EF4-FFF2-40B4-BE49-F238E27FC236}">
+                <a16:creationId xmlns:a16="http://schemas.microsoft.com/office/drawing/2014/main" id="{1CF94898-EF21-D9A6-C498-CE061B5AD95E}"/>
+              </a:ext>
+            </a:extLst>
+          </p:cNvPr>
+          <p:cNvSpPr>
+            <a:spLocks noGrp="1"/>
+          </p:cNvSpPr>
+          <p:nvPr>
+            <p:ph type="sldNum" sz="quarter" idx="12"/>
+          </p:nvPr>
+        </p:nvSpPr>
+        <p:spPr/>
+        <p:txBody>
+          <a:bodyPr/>
+          <a:lstStyle/>
+          <a:p>
+            <a:fld id="{292A9FD8-515A-4698-9313-0AB17EE9632B}" type="slidenum">
+              <a:rPr lang="pt-PT" noProof="1" smtClean="0"/>
+              <a:t>12</a:t>
+            </a:fld>
+            <a:endParaRPr lang="pt-PT" noProof="1"/>
+          </a:p>
+        </p:txBody>
+      </p:sp>
+    </p:spTree>
+    <p:extLst>
+      <p:ext uri="{BB962C8B-B14F-4D97-AF65-F5344CB8AC3E}">
+        <p14:creationId xmlns:p14="http://schemas.microsoft.com/office/powerpoint/2010/main" val="1450241943"/>
+      </p:ext>
+    </p:extLst>
+  </p:cSld>
+  <p:clrMapOvr>
+    <a:masterClrMapping/>
+  </p:clrMapOvr>
+</p:sld>
+</file>
+
+<file path=ppt/slides/slide13.xml><?xml version="1.0" encoding="utf-8"?>
+<p:sld xmlns:a="http://schemas.openxmlformats.org/drawingml/2006/main" xmlns:r="http://schemas.openxmlformats.org/officeDocument/2006/relationships" xmlns:p="http://schemas.openxmlformats.org/presentationml/2006/main">
   <p:cSld>
     <p:bg>
       <p:bgPr>
@@ -4391,7 +4533,7 @@
           <a:p>
             <a:fld id="{292A9FD8-515A-4698-9313-0AB17EE9632B}" type="slidenum">
               <a:rPr lang="pt-PT" noProof="1" smtClean="0"/>
-              <a:t>12</a:t>
+              <a:t>13</a:t>
             </a:fld>
             <a:endParaRPr lang="pt-PT" noProof="1"/>
           </a:p>
@@ -4516,8 +4658,8 @@
 </p:sld>
 </file>
 
-<file path=ppt/slides/slide13.xml><?xml version="1.0" encoding="utf-8"?>
-<p:sld xmlns:a="http://schemas.openxmlformats.org/drawingml/2006/main" xmlns:r="http://schemas.openxmlformats.org/officeDocument/2006/relationships" xmlns:p="http://schemas.openxmlformats.org/presentationml/2006/main" show="0">
+<file path=ppt/slides/slide14.xml><?xml version="1.0" encoding="utf-8"?>
+<p:sld xmlns:a="http://schemas.openxmlformats.org/drawingml/2006/main" xmlns:r="http://schemas.openxmlformats.org/officeDocument/2006/relationships" xmlns:p="http://schemas.openxmlformats.org/presentationml/2006/main">
   <p:cSld>
     <p:bg>
       <p:bgPr>
@@ -4581,7 +4723,7 @@
                   <a:srgbClr val="002060"/>
                 </a:solidFill>
               </a:rPr>
-              <a:t>GOSPEL (1/2)</a:t>
+              <a:t>GOSPEL</a:t>
             </a:r>
             <a:endParaRPr lang="pt-PT" sz="2800" noProof="1"/>
           </a:p>
@@ -4610,7 +4752,7 @@
           <a:p>
             <a:fld id="{292A9FD8-515A-4698-9313-0AB17EE9632B}" type="slidenum">
               <a:rPr lang="pt-PT" noProof="1" smtClean="0"/>
-              <a:t>13</a:t>
+              <a:t>14</a:t>
             </a:fld>
             <a:endParaRPr lang="pt-PT" noProof="1"/>
           </a:p>
@@ -4714,7 +4856,7 @@
 </p:sld>
 </file>
 
-<file path=ppt/slides/slide14.xml><?xml version="1.0" encoding="utf-8"?>
+<file path=ppt/slides/slide15.xml><?xml version="1.0" encoding="utf-8"?>
 <p:sld xmlns:a="http://schemas.openxmlformats.org/drawingml/2006/main" xmlns:r="http://schemas.openxmlformats.org/officeDocument/2006/relationships" xmlns:p="http://schemas.openxmlformats.org/presentationml/2006/main" show="0">
   <p:cSld>
     <p:bg>
@@ -4808,7 +4950,7 @@
           <a:p>
             <a:fld id="{292A9FD8-515A-4698-9313-0AB17EE9632B}" type="slidenum">
               <a:rPr lang="pt-PT" noProof="1" smtClean="0"/>
-              <a:t>14</a:t>
+              <a:t>15</a:t>
             </a:fld>
             <a:endParaRPr lang="pt-PT" noProof="1"/>
           </a:p>
@@ -4866,8 +5008,8 @@
 </p:sld>
 </file>
 
-<file path=ppt/slides/slide15.xml><?xml version="1.0" encoding="utf-8"?>
-<p:sld xmlns:a="http://schemas.openxmlformats.org/drawingml/2006/main" xmlns:r="http://schemas.openxmlformats.org/officeDocument/2006/relationships" xmlns:p="http://schemas.openxmlformats.org/presentationml/2006/main" show="0">
+<file path=ppt/slides/slide16.xml><?xml version="1.0" encoding="utf-8"?>
+<p:sld xmlns:a="http://schemas.openxmlformats.org/drawingml/2006/main" xmlns:r="http://schemas.openxmlformats.org/officeDocument/2006/relationships" xmlns:p="http://schemas.openxmlformats.org/presentationml/2006/main">
   <p:cSld>
     <p:bg>
       <p:bgPr>
@@ -4960,9 +5102,80 @@
           <a:p>
             <a:fld id="{292A9FD8-515A-4698-9313-0AB17EE9632B}" type="slidenum">
               <a:rPr lang="pt-PT" noProof="1" smtClean="0"/>
-              <a:t>15</a:t>
+              <a:t>16</a:t>
             </a:fld>
             <a:endParaRPr lang="pt-PT" noProof="1"/>
+          </a:p>
+        </p:txBody>
+      </p:sp>
+      <p:sp>
+        <p:nvSpPr>
+          <p:cNvPr id="4" name="TextBox 3">
+            <a:extLst>
+              <a:ext uri="{FF2B5EF4-FFF2-40B4-BE49-F238E27FC236}">
+                <a16:creationId xmlns:a16="http://schemas.microsoft.com/office/drawing/2014/main" id="{CCD2D323-831C-F0D5-6D63-C25F3131331C}"/>
+              </a:ext>
+            </a:extLst>
+          </p:cNvPr>
+          <p:cNvSpPr txBox="1"/>
+          <p:nvPr/>
+        </p:nvSpPr>
+        <p:spPr>
+          <a:xfrm>
+            <a:off x="469556" y="2072670"/>
+            <a:ext cx="7191633" cy="1569660"/>
+          </a:xfrm>
+          <a:prstGeom prst="rect">
+            <a:avLst/>
+          </a:prstGeom>
+          <a:noFill/>
+        </p:spPr>
+        <p:txBody>
+          <a:bodyPr wrap="square" rtlCol="0">
+            <a:spAutoFit/>
+          </a:bodyPr>
+          <a:lstStyle/>
+          <a:p>
+            <a:pPr marL="342900" indent="-342900">
+              <a:buFont typeface="Arial" panose="020B0604020202020204" pitchFamily="34" charset="0"/>
+              <a:buChar char="•"/>
+            </a:pPr>
+            <a:r>
+              <a:rPr lang="pt-PT" sz="2400" noProof="1">
+                <a:solidFill>
+                  <a:srgbClr val="002060"/>
+                </a:solidFill>
+              </a:rPr>
+              <a:t>An evolution from Why3 with the help of GOSPEL</a:t>
+            </a:r>
+          </a:p>
+          <a:p>
+            <a:pPr marL="342900" indent="-342900">
+              <a:buFont typeface="Arial" panose="020B0604020202020204" pitchFamily="34" charset="0"/>
+              <a:buChar char="•"/>
+            </a:pPr>
+            <a:r>
+              <a:rPr lang="pt-PT" sz="2400" noProof="1">
+                <a:solidFill>
+                  <a:srgbClr val="002060"/>
+                </a:solidFill>
+              </a:rPr>
+              <a:t>Directly accepts GOSPEL-annotated OCaml code</a:t>
+            </a:r>
+          </a:p>
+          <a:p>
+            <a:pPr marL="342900" indent="-342900">
+              <a:buFont typeface="Arial" panose="020B0604020202020204" pitchFamily="34" charset="0"/>
+              <a:buChar char="•"/>
+            </a:pPr>
+            <a:r>
+              <a:rPr lang="pt-PT" sz="2400" noProof="1">
+                <a:solidFill>
+                  <a:srgbClr val="002060"/>
+                </a:solidFill>
+              </a:rPr>
+              <a:t>Translates it to WhyML and uses the Why3 tool to perform the actual verification</a:t>
+            </a:r>
           </a:p>
         </p:txBody>
       </p:sp>
@@ -4979,7 +5192,7 @@
 </p:sld>
 </file>
 
-<file path=ppt/slides/slide16.xml><?xml version="1.0" encoding="utf-8"?>
+<file path=ppt/slides/slide17.xml><?xml version="1.0" encoding="utf-8"?>
 <p:sld xmlns:a="http://schemas.openxmlformats.org/drawingml/2006/main" xmlns:r="http://schemas.openxmlformats.org/officeDocument/2006/relationships" xmlns:p="http://schemas.openxmlformats.org/presentationml/2006/main">
   <p:cSld>
     <p:bg>
@@ -5074,7 +5287,7 @@
           <a:p>
             <a:fld id="{292A9FD8-515A-4698-9313-0AB17EE9632B}" type="slidenum">
               <a:rPr lang="pt-PT" noProof="1" smtClean="0"/>
-              <a:t>16</a:t>
+              <a:t>17</a:t>
             </a:fld>
             <a:endParaRPr lang="pt-PT" noProof="1"/>
           </a:p>
@@ -5093,7 +5306,7 @@
 </p:sld>
 </file>
 
-<file path=ppt/slides/slide17.xml><?xml version="1.0" encoding="utf-8"?>
+<file path=ppt/slides/slide18.xml><?xml version="1.0" encoding="utf-8"?>
 <p:sld xmlns:a="http://schemas.openxmlformats.org/drawingml/2006/main" xmlns:r="http://schemas.openxmlformats.org/officeDocument/2006/relationships" xmlns:p="http://schemas.openxmlformats.org/presentationml/2006/main">
   <p:cSld>
     <p:bg>
@@ -5187,7 +5400,7 @@
           <a:p>
             <a:fld id="{292A9FD8-515A-4698-9313-0AB17EE9632B}" type="slidenum">
               <a:rPr lang="pt-PT" noProof="1" smtClean="0"/>
-              <a:t>17</a:t>
+              <a:t>18</a:t>
             </a:fld>
             <a:endParaRPr lang="pt-PT" noProof="1"/>
           </a:p>
@@ -5277,7 +5490,7 @@
 </p:sld>
 </file>
 
-<file path=ppt/slides/slide18.xml><?xml version="1.0" encoding="utf-8"?>
+<file path=ppt/slides/slide19.xml><?xml version="1.0" encoding="utf-8"?>
 <p:sld xmlns:a="http://schemas.openxmlformats.org/drawingml/2006/main" xmlns:r="http://schemas.openxmlformats.org/officeDocument/2006/relationships" xmlns:p="http://schemas.openxmlformats.org/presentationml/2006/main">
   <p:cSld>
     <p:bg>
@@ -5371,7 +5584,7 @@
           <a:p>
             <a:fld id="{292A9FD8-515A-4698-9313-0AB17EE9632B}" type="slidenum">
               <a:rPr lang="pt-PT" noProof="1" smtClean="0"/>
-              <a:t>18</a:t>
+              <a:t>19</a:t>
             </a:fld>
             <a:endParaRPr lang="pt-PT" noProof="1"/>
           </a:p>
@@ -5452,240 +5665,6 @@
     <p:extLst>
       <p:ext uri="{BB962C8B-B14F-4D97-AF65-F5344CB8AC3E}">
         <p14:creationId xmlns:p14="http://schemas.microsoft.com/office/powerpoint/2010/main" val="1284077204"/>
-      </p:ext>
-    </p:extLst>
-  </p:cSld>
-  <p:clrMapOvr>
-    <a:masterClrMapping/>
-  </p:clrMapOvr>
-</p:sld>
-</file>
-
-<file path=ppt/slides/slide19.xml><?xml version="1.0" encoding="utf-8"?>
-<p:sld xmlns:a="http://schemas.openxmlformats.org/drawingml/2006/main" xmlns:r="http://schemas.openxmlformats.org/officeDocument/2006/relationships" xmlns:p="http://schemas.openxmlformats.org/presentationml/2006/main">
-  <p:cSld>
-    <p:bg>
-      <p:bgPr>
-        <a:solidFill>
-          <a:srgbClr val="ACCFEE"/>
-        </a:solidFill>
-        <a:effectLst/>
-      </p:bgPr>
-    </p:bg>
-    <p:spTree>
-      <p:nvGrpSpPr>
-        <p:cNvPr id="1" name="">
-          <a:extLst>
-            <a:ext uri="{FF2B5EF4-FFF2-40B4-BE49-F238E27FC236}">
-              <a16:creationId xmlns:a16="http://schemas.microsoft.com/office/drawing/2014/main" id="{FB70B375-E31E-3F2F-AFC0-C0FC522398E6}"/>
-            </a:ext>
-          </a:extLst>
-        </p:cNvPr>
-        <p:cNvGrpSpPr/>
-        <p:nvPr/>
-      </p:nvGrpSpPr>
-      <p:grpSpPr>
-        <a:xfrm>
-          <a:off x="0" y="0"/>
-          <a:ext cx="0" cy="0"/>
-          <a:chOff x="0" y="0"/>
-          <a:chExt cx="0" cy="0"/>
-        </a:xfrm>
-      </p:grpSpPr>
-      <p:sp>
-        <p:nvSpPr>
-          <p:cNvPr id="2" name="TextBox 1">
-            <a:extLst>
-              <a:ext uri="{FF2B5EF4-FFF2-40B4-BE49-F238E27FC236}">
-                <a16:creationId xmlns:a16="http://schemas.microsoft.com/office/drawing/2014/main" id="{9F772E8C-2DF6-2B93-C9C8-35422A79FD2A}"/>
-              </a:ext>
-            </a:extLst>
-          </p:cNvPr>
-          <p:cNvSpPr txBox="1"/>
-          <p:nvPr/>
-        </p:nvSpPr>
-        <p:spPr>
-          <a:xfrm>
-            <a:off x="469556" y="626071"/>
-            <a:ext cx="4572000" cy="523220"/>
-          </a:xfrm>
-          <a:prstGeom prst="rect">
-            <a:avLst/>
-          </a:prstGeom>
-          <a:noFill/>
-        </p:spPr>
-        <p:txBody>
-          <a:bodyPr wrap="square" rtlCol="0">
-            <a:spAutoFit/>
-          </a:bodyPr>
-          <a:lstStyle/>
-          <a:p>
-            <a:r>
-              <a:rPr lang="pt-PT" sz="2800" noProof="1">
-                <a:solidFill>
-                  <a:srgbClr val="002060"/>
-                </a:solidFill>
-              </a:rPr>
-              <a:t>Product Programs</a:t>
-            </a:r>
-            <a:endParaRPr lang="pt-PT" sz="2800" noProof="1"/>
-          </a:p>
-        </p:txBody>
-      </p:sp>
-      <p:sp>
-        <p:nvSpPr>
-          <p:cNvPr id="3" name="Slide Number Placeholder 2">
-            <a:extLst>
-              <a:ext uri="{FF2B5EF4-FFF2-40B4-BE49-F238E27FC236}">
-                <a16:creationId xmlns:a16="http://schemas.microsoft.com/office/drawing/2014/main" id="{C00DCCA8-A512-AF89-8E53-0E47BD0D13BB}"/>
-              </a:ext>
-            </a:extLst>
-          </p:cNvPr>
-          <p:cNvSpPr>
-            <a:spLocks noGrp="1"/>
-          </p:cNvSpPr>
-          <p:nvPr>
-            <p:ph type="sldNum" sz="quarter" idx="12"/>
-          </p:nvPr>
-        </p:nvSpPr>
-        <p:spPr/>
-        <p:txBody>
-          <a:bodyPr/>
-          <a:lstStyle/>
-          <a:p>
-            <a:fld id="{292A9FD8-515A-4698-9313-0AB17EE9632B}" type="slidenum">
-              <a:rPr lang="pt-PT" noProof="1" smtClean="0"/>
-              <a:t>19</a:t>
-            </a:fld>
-            <a:endParaRPr lang="pt-PT" noProof="1"/>
-          </a:p>
-        </p:txBody>
-      </p:sp>
-      <p:sp>
-        <p:nvSpPr>
-          <p:cNvPr id="4" name="TextBox 3">
-            <a:extLst>
-              <a:ext uri="{FF2B5EF4-FFF2-40B4-BE49-F238E27FC236}">
-                <a16:creationId xmlns:a16="http://schemas.microsoft.com/office/drawing/2014/main" id="{A939828F-55D3-1B9B-B591-306BC72A6214}"/>
-              </a:ext>
-            </a:extLst>
-          </p:cNvPr>
-          <p:cNvSpPr txBox="1"/>
-          <p:nvPr/>
-        </p:nvSpPr>
-        <p:spPr>
-          <a:xfrm>
-            <a:off x="469555" y="1948472"/>
-            <a:ext cx="8045795" cy="2800767"/>
-          </a:xfrm>
-          <a:prstGeom prst="rect">
-            <a:avLst/>
-          </a:prstGeom>
-          <a:noFill/>
-        </p:spPr>
-        <p:txBody>
-          <a:bodyPr wrap="square" rtlCol="0">
-            <a:spAutoFit/>
-          </a:bodyPr>
-          <a:lstStyle/>
-          <a:p>
-            <a:pPr marL="342900" indent="-342900">
-              <a:buFont typeface="Arial" panose="020B0604020202020204" pitchFamily="34" charset="0"/>
-              <a:buChar char="•"/>
-            </a:pPr>
-            <a:r>
-              <a:rPr lang="pt-PT" sz="2200" noProof="1">
-                <a:solidFill>
-                  <a:srgbClr val="002060"/>
-                </a:solidFill>
-              </a:rPr>
-              <a:t>Combines the best of self-composition and cross-products</a:t>
-            </a:r>
-          </a:p>
-          <a:p>
-            <a:pPr marL="800100" lvl="1" indent="-342900">
-              <a:buFont typeface="Wingdings" panose="05000000000000000000" pitchFamily="2" charset="2"/>
-              <a:buChar char="Ø"/>
-            </a:pPr>
-            <a:r>
-              <a:rPr lang="pt-PT" sz="2200" noProof="1">
-                <a:solidFill>
-                  <a:srgbClr val="002060"/>
-                </a:solidFill>
-              </a:rPr>
-              <a:t>Flexibility of self-composition for asynchronous steps</a:t>
-            </a:r>
-          </a:p>
-          <a:p>
-            <a:pPr marL="800100" lvl="1" indent="-342900">
-              <a:buFont typeface="Wingdings" panose="05000000000000000000" pitchFamily="2" charset="2"/>
-              <a:buChar char="Ø"/>
-            </a:pPr>
-            <a:r>
-              <a:rPr lang="pt-PT" sz="2200" noProof="1">
-                <a:solidFill>
-                  <a:srgbClr val="002060"/>
-                </a:solidFill>
-              </a:rPr>
-              <a:t>Efficiency of cross-products for synchronous steps</a:t>
-            </a:r>
-          </a:p>
-          <a:p>
-            <a:pPr marL="342900" indent="-342900">
-              <a:buFont typeface="Arial" panose="020B0604020202020204" pitchFamily="34" charset="0"/>
-              <a:buChar char="•"/>
-            </a:pPr>
-            <a:r>
-              <a:rPr lang="pt-PT" sz="2200" noProof="1">
-                <a:solidFill>
-                  <a:srgbClr val="002060"/>
-                </a:solidFill>
-              </a:rPr>
-              <a:t>Reduces relational verification into standard verification, therefore has extensive tool support</a:t>
-            </a:r>
-          </a:p>
-          <a:p>
-            <a:pPr marL="342900" indent="-342900">
-              <a:buFont typeface="Arial" panose="020B0604020202020204" pitchFamily="34" charset="0"/>
-              <a:buChar char="•"/>
-            </a:pPr>
-            <a:r>
-              <a:rPr lang="pt-PT" sz="2200" noProof="1">
-                <a:solidFill>
-                  <a:srgbClr val="002060"/>
-                </a:solidFill>
-              </a:rPr>
-              <a:t>Support for two programs that are structurally dissimilar</a:t>
-            </a:r>
-          </a:p>
-          <a:p>
-            <a:pPr marL="342900" indent="-342900">
-              <a:buFont typeface="Arial" panose="020B0604020202020204" pitchFamily="34" charset="0"/>
-              <a:buChar char="•"/>
-            </a:pPr>
-            <a:endParaRPr lang="pt-PT" sz="2200" noProof="1">
-              <a:solidFill>
-                <a:srgbClr val="002060"/>
-              </a:solidFill>
-            </a:endParaRPr>
-          </a:p>
-          <a:p>
-            <a:pPr marL="342900" indent="-342900">
-              <a:buFont typeface="Arial" panose="020B0604020202020204" pitchFamily="34" charset="0"/>
-              <a:buChar char="•"/>
-            </a:pPr>
-            <a:endParaRPr lang="pt-PT" sz="2200" noProof="1">
-              <a:solidFill>
-                <a:srgbClr val="002060"/>
-              </a:solidFill>
-            </a:endParaRPr>
-          </a:p>
-        </p:txBody>
-      </p:sp>
-    </p:spTree>
-    <p:extLst>
-      <p:ext uri="{BB962C8B-B14F-4D97-AF65-F5344CB8AC3E}">
-        <p14:creationId xmlns:p14="http://schemas.microsoft.com/office/powerpoint/2010/main" val="3095269486"/>
       </p:ext>
     </p:extLst>
   </p:cSld>
@@ -5909,6 +5888,240 @@
 </file>
 
 <file path=ppt/slides/slide20.xml><?xml version="1.0" encoding="utf-8"?>
+<p:sld xmlns:a="http://schemas.openxmlformats.org/drawingml/2006/main" xmlns:r="http://schemas.openxmlformats.org/officeDocument/2006/relationships" xmlns:p="http://schemas.openxmlformats.org/presentationml/2006/main">
+  <p:cSld>
+    <p:bg>
+      <p:bgPr>
+        <a:solidFill>
+          <a:srgbClr val="ACCFEE"/>
+        </a:solidFill>
+        <a:effectLst/>
+      </p:bgPr>
+    </p:bg>
+    <p:spTree>
+      <p:nvGrpSpPr>
+        <p:cNvPr id="1" name="">
+          <a:extLst>
+            <a:ext uri="{FF2B5EF4-FFF2-40B4-BE49-F238E27FC236}">
+              <a16:creationId xmlns:a16="http://schemas.microsoft.com/office/drawing/2014/main" id="{FB70B375-E31E-3F2F-AFC0-C0FC522398E6}"/>
+            </a:ext>
+          </a:extLst>
+        </p:cNvPr>
+        <p:cNvGrpSpPr/>
+        <p:nvPr/>
+      </p:nvGrpSpPr>
+      <p:grpSpPr>
+        <a:xfrm>
+          <a:off x="0" y="0"/>
+          <a:ext cx="0" cy="0"/>
+          <a:chOff x="0" y="0"/>
+          <a:chExt cx="0" cy="0"/>
+        </a:xfrm>
+      </p:grpSpPr>
+      <p:sp>
+        <p:nvSpPr>
+          <p:cNvPr id="2" name="TextBox 1">
+            <a:extLst>
+              <a:ext uri="{FF2B5EF4-FFF2-40B4-BE49-F238E27FC236}">
+                <a16:creationId xmlns:a16="http://schemas.microsoft.com/office/drawing/2014/main" id="{9F772E8C-2DF6-2B93-C9C8-35422A79FD2A}"/>
+              </a:ext>
+            </a:extLst>
+          </p:cNvPr>
+          <p:cNvSpPr txBox="1"/>
+          <p:nvPr/>
+        </p:nvSpPr>
+        <p:spPr>
+          <a:xfrm>
+            <a:off x="469556" y="626071"/>
+            <a:ext cx="4572000" cy="523220"/>
+          </a:xfrm>
+          <a:prstGeom prst="rect">
+            <a:avLst/>
+          </a:prstGeom>
+          <a:noFill/>
+        </p:spPr>
+        <p:txBody>
+          <a:bodyPr wrap="square" rtlCol="0">
+            <a:spAutoFit/>
+          </a:bodyPr>
+          <a:lstStyle/>
+          <a:p>
+            <a:r>
+              <a:rPr lang="pt-PT" sz="2800" noProof="1">
+                <a:solidFill>
+                  <a:srgbClr val="002060"/>
+                </a:solidFill>
+              </a:rPr>
+              <a:t>Product Programs</a:t>
+            </a:r>
+            <a:endParaRPr lang="pt-PT" sz="2800" noProof="1"/>
+          </a:p>
+        </p:txBody>
+      </p:sp>
+      <p:sp>
+        <p:nvSpPr>
+          <p:cNvPr id="3" name="Slide Number Placeholder 2">
+            <a:extLst>
+              <a:ext uri="{FF2B5EF4-FFF2-40B4-BE49-F238E27FC236}">
+                <a16:creationId xmlns:a16="http://schemas.microsoft.com/office/drawing/2014/main" id="{C00DCCA8-A512-AF89-8E53-0E47BD0D13BB}"/>
+              </a:ext>
+            </a:extLst>
+          </p:cNvPr>
+          <p:cNvSpPr>
+            <a:spLocks noGrp="1"/>
+          </p:cNvSpPr>
+          <p:nvPr>
+            <p:ph type="sldNum" sz="quarter" idx="12"/>
+          </p:nvPr>
+        </p:nvSpPr>
+        <p:spPr/>
+        <p:txBody>
+          <a:bodyPr/>
+          <a:lstStyle/>
+          <a:p>
+            <a:fld id="{292A9FD8-515A-4698-9313-0AB17EE9632B}" type="slidenum">
+              <a:rPr lang="pt-PT" noProof="1" smtClean="0"/>
+              <a:t>20</a:t>
+            </a:fld>
+            <a:endParaRPr lang="pt-PT" noProof="1"/>
+          </a:p>
+        </p:txBody>
+      </p:sp>
+      <p:sp>
+        <p:nvSpPr>
+          <p:cNvPr id="4" name="TextBox 3">
+            <a:extLst>
+              <a:ext uri="{FF2B5EF4-FFF2-40B4-BE49-F238E27FC236}">
+                <a16:creationId xmlns:a16="http://schemas.microsoft.com/office/drawing/2014/main" id="{A939828F-55D3-1B9B-B591-306BC72A6214}"/>
+              </a:ext>
+            </a:extLst>
+          </p:cNvPr>
+          <p:cNvSpPr txBox="1"/>
+          <p:nvPr/>
+        </p:nvSpPr>
+        <p:spPr>
+          <a:xfrm>
+            <a:off x="469555" y="1948472"/>
+            <a:ext cx="8045795" cy="2800767"/>
+          </a:xfrm>
+          <a:prstGeom prst="rect">
+            <a:avLst/>
+          </a:prstGeom>
+          <a:noFill/>
+        </p:spPr>
+        <p:txBody>
+          <a:bodyPr wrap="square" rtlCol="0">
+            <a:spAutoFit/>
+          </a:bodyPr>
+          <a:lstStyle/>
+          <a:p>
+            <a:pPr marL="342900" indent="-342900">
+              <a:buFont typeface="Arial" panose="020B0604020202020204" pitchFamily="34" charset="0"/>
+              <a:buChar char="•"/>
+            </a:pPr>
+            <a:r>
+              <a:rPr lang="pt-PT" sz="2200" noProof="1">
+                <a:solidFill>
+                  <a:srgbClr val="002060"/>
+                </a:solidFill>
+              </a:rPr>
+              <a:t>Combines the best of self-composition and cross-products</a:t>
+            </a:r>
+          </a:p>
+          <a:p>
+            <a:pPr marL="800100" lvl="1" indent="-342900">
+              <a:buFont typeface="Wingdings" panose="05000000000000000000" pitchFamily="2" charset="2"/>
+              <a:buChar char="Ø"/>
+            </a:pPr>
+            <a:r>
+              <a:rPr lang="pt-PT" sz="2200" noProof="1">
+                <a:solidFill>
+                  <a:srgbClr val="002060"/>
+                </a:solidFill>
+              </a:rPr>
+              <a:t>Flexibility of self-composition for asynchronous steps</a:t>
+            </a:r>
+          </a:p>
+          <a:p>
+            <a:pPr marL="800100" lvl="1" indent="-342900">
+              <a:buFont typeface="Wingdings" panose="05000000000000000000" pitchFamily="2" charset="2"/>
+              <a:buChar char="Ø"/>
+            </a:pPr>
+            <a:r>
+              <a:rPr lang="pt-PT" sz="2200" noProof="1">
+                <a:solidFill>
+                  <a:srgbClr val="002060"/>
+                </a:solidFill>
+              </a:rPr>
+              <a:t>Efficiency of cross-products for synchronous steps</a:t>
+            </a:r>
+          </a:p>
+          <a:p>
+            <a:pPr marL="342900" indent="-342900">
+              <a:buFont typeface="Arial" panose="020B0604020202020204" pitchFamily="34" charset="0"/>
+              <a:buChar char="•"/>
+            </a:pPr>
+            <a:r>
+              <a:rPr lang="pt-PT" sz="2200" noProof="1">
+                <a:solidFill>
+                  <a:srgbClr val="002060"/>
+                </a:solidFill>
+              </a:rPr>
+              <a:t>Reduces relational verification into standard verification, therefore has extensive tool support</a:t>
+            </a:r>
+          </a:p>
+          <a:p>
+            <a:pPr marL="342900" indent="-342900">
+              <a:buFont typeface="Arial" panose="020B0604020202020204" pitchFamily="34" charset="0"/>
+              <a:buChar char="•"/>
+            </a:pPr>
+            <a:r>
+              <a:rPr lang="pt-PT" sz="2200" noProof="1">
+                <a:solidFill>
+                  <a:srgbClr val="002060"/>
+                </a:solidFill>
+              </a:rPr>
+              <a:t>Support for two programs that are structurally dissimilar</a:t>
+            </a:r>
+          </a:p>
+          <a:p>
+            <a:pPr marL="342900" indent="-342900">
+              <a:buFont typeface="Arial" panose="020B0604020202020204" pitchFamily="34" charset="0"/>
+              <a:buChar char="•"/>
+            </a:pPr>
+            <a:endParaRPr lang="pt-PT" sz="2200" noProof="1">
+              <a:solidFill>
+                <a:srgbClr val="002060"/>
+              </a:solidFill>
+            </a:endParaRPr>
+          </a:p>
+          <a:p>
+            <a:pPr marL="342900" indent="-342900">
+              <a:buFont typeface="Arial" panose="020B0604020202020204" pitchFamily="34" charset="0"/>
+              <a:buChar char="•"/>
+            </a:pPr>
+            <a:endParaRPr lang="pt-PT" sz="2200" noProof="1">
+              <a:solidFill>
+                <a:srgbClr val="002060"/>
+              </a:solidFill>
+            </a:endParaRPr>
+          </a:p>
+        </p:txBody>
+      </p:sp>
+    </p:spTree>
+    <p:extLst>
+      <p:ext uri="{BB962C8B-B14F-4D97-AF65-F5344CB8AC3E}">
+        <p14:creationId xmlns:p14="http://schemas.microsoft.com/office/powerpoint/2010/main" val="3095269486"/>
+      </p:ext>
+    </p:extLst>
+  </p:cSld>
+  <p:clrMapOvr>
+    <a:masterClrMapping/>
+  </p:clrMapOvr>
+</p:sld>
+</file>
+
+<file path=ppt/slides/slide21.xml><?xml version="1.0" encoding="utf-8"?>
 <p:sld xmlns:a="http://schemas.openxmlformats.org/drawingml/2006/main" xmlns:r="http://schemas.openxmlformats.org/officeDocument/2006/relationships" xmlns:p="http://schemas.openxmlformats.org/presentationml/2006/main" show="0">
   <p:cSld>
     <p:bg>
@@ -6002,7 +6215,7 @@
           <a:p>
             <a:fld id="{292A9FD8-515A-4698-9313-0AB17EE9632B}" type="slidenum">
               <a:rPr lang="pt-PT" noProof="1" smtClean="0"/>
-              <a:t>20</a:t>
+              <a:t>21</a:t>
             </a:fld>
             <a:endParaRPr lang="pt-PT" noProof="1"/>
           </a:p>
@@ -6021,7 +6234,7 @@
 </p:sld>
 </file>
 
-<file path=ppt/slides/slide21.xml><?xml version="1.0" encoding="utf-8"?>
+<file path=ppt/slides/slide22.xml><?xml version="1.0" encoding="utf-8"?>
 <p:sld xmlns:a="http://schemas.openxmlformats.org/drawingml/2006/main" xmlns:r="http://schemas.openxmlformats.org/officeDocument/2006/relationships" xmlns:p="http://schemas.openxmlformats.org/presentationml/2006/main">
   <p:cSld>
     <p:bg>
@@ -6116,7 +6329,7 @@
           <a:p>
             <a:fld id="{292A9FD8-515A-4698-9313-0AB17EE9632B}" type="slidenum">
               <a:rPr lang="pt-PT" noProof="1" smtClean="0"/>
-              <a:t>21</a:t>
+              <a:t>22</a:t>
             </a:fld>
             <a:endParaRPr lang="pt-PT" noProof="1"/>
           </a:p>
@@ -6135,7 +6348,7 @@
 </p:sld>
 </file>
 
-<file path=ppt/slides/slide22.xml><?xml version="1.0" encoding="utf-8"?>
+<file path=ppt/slides/slide23.xml><?xml version="1.0" encoding="utf-8"?>
 <p:sld xmlns:a="http://schemas.openxmlformats.org/drawingml/2006/main" xmlns:r="http://schemas.openxmlformats.org/officeDocument/2006/relationships" xmlns:p="http://schemas.openxmlformats.org/presentationml/2006/main">
   <p:cSld>
     <p:bg>
@@ -6180,8 +6393,8 @@
         </p:nvSpPr>
         <p:spPr>
           <a:xfrm>
-            <a:off x="469556" y="626071"/>
-            <a:ext cx="4572000" cy="523220"/>
+            <a:off x="469555" y="626071"/>
+            <a:ext cx="5791201" cy="523220"/>
           </a:xfrm>
           <a:prstGeom prst="rect">
             <a:avLst/>
@@ -6200,7 +6413,7 @@
                   <a:srgbClr val="002060"/>
                 </a:solidFill>
               </a:rPr>
-              <a:t>Simple Equivalence Proof</a:t>
+              <a:t>Simple Equivalence Proof - Factorial</a:t>
             </a:r>
             <a:endParaRPr lang="pt-PT" sz="2800" noProof="1"/>
           </a:p>
@@ -6229,9 +6442,392 @@
           <a:p>
             <a:fld id="{292A9FD8-515A-4698-9313-0AB17EE9632B}" type="slidenum">
               <a:rPr lang="pt-PT" noProof="1" smtClean="0"/>
-              <a:t>22</a:t>
+              <a:t>23</a:t>
             </a:fld>
             <a:endParaRPr lang="pt-PT" noProof="1"/>
+          </a:p>
+        </p:txBody>
+      </p:sp>
+      <p:sp>
+        <p:nvSpPr>
+          <p:cNvPr id="5" name="TextBox 4">
+            <a:extLst>
+              <a:ext uri="{FF2B5EF4-FFF2-40B4-BE49-F238E27FC236}">
+                <a16:creationId xmlns:a16="http://schemas.microsoft.com/office/drawing/2014/main" id="{8275FE50-C5C1-4BBA-BE15-47E90825F906}"/>
+              </a:ext>
+            </a:extLst>
+          </p:cNvPr>
+          <p:cNvSpPr txBox="1"/>
+          <p:nvPr/>
+        </p:nvSpPr>
+        <p:spPr>
+          <a:xfrm>
+            <a:off x="734969" y="2507100"/>
+            <a:ext cx="2825580" cy="2215991"/>
+          </a:xfrm>
+          <a:prstGeom prst="rect">
+            <a:avLst/>
+          </a:prstGeom>
+          <a:noFill/>
+        </p:spPr>
+        <p:txBody>
+          <a:bodyPr wrap="square" rtlCol="0">
+            <a:spAutoFit/>
+          </a:bodyPr>
+          <a:lstStyle/>
+          <a:p>
+            <a:r>
+              <a:rPr lang="en-US" sz="2000" dirty="0">
+                <a:solidFill>
+                  <a:srgbClr val="002060"/>
+                </a:solidFill>
+              </a:rPr>
+              <a:t>(*@ function rec fact </a:t>
+            </a:r>
+          </a:p>
+          <a:p>
+            <a:r>
+              <a:rPr lang="en-US" sz="2000" dirty="0">
+                <a:solidFill>
+                  <a:srgbClr val="002060"/>
+                </a:solidFill>
+              </a:rPr>
+              <a:t>(n: integer) : integer =</a:t>
+            </a:r>
+          </a:p>
+          <a:p>
+            <a:r>
+              <a:rPr lang="en-US" sz="2000" dirty="0">
+                <a:solidFill>
+                  <a:srgbClr val="002060"/>
+                </a:solidFill>
+              </a:rPr>
+              <a:t>   if n = 0 then 1</a:t>
+            </a:r>
+          </a:p>
+          <a:p>
+            <a:r>
+              <a:rPr lang="en-US" sz="2000" dirty="0">
+                <a:solidFill>
+                  <a:srgbClr val="002060"/>
+                </a:solidFill>
+              </a:rPr>
+              <a:t>   else n * fact (n-1) *)</a:t>
+            </a:r>
+          </a:p>
+          <a:p>
+            <a:r>
+              <a:rPr lang="en-US" sz="2000" dirty="0">
+                <a:solidFill>
+                  <a:srgbClr val="002060"/>
+                </a:solidFill>
+              </a:rPr>
+              <a:t>(*@ requires n &gt;= 0 </a:t>
+            </a:r>
+          </a:p>
+          <a:p>
+            <a:r>
+              <a:rPr lang="en-US" sz="2000" dirty="0">
+                <a:solidFill>
+                  <a:srgbClr val="002060"/>
+                </a:solidFill>
+              </a:rPr>
+              <a:t>         variant n *)</a:t>
+            </a:r>
+          </a:p>
+          <a:p>
+            <a:endParaRPr lang="en-US" dirty="0"/>
+          </a:p>
+        </p:txBody>
+      </p:sp>
+      <p:sp>
+        <p:nvSpPr>
+          <p:cNvPr id="6" name="TextBox 5">
+            <a:extLst>
+              <a:ext uri="{FF2B5EF4-FFF2-40B4-BE49-F238E27FC236}">
+                <a16:creationId xmlns:a16="http://schemas.microsoft.com/office/drawing/2014/main" id="{19D423E8-4811-F466-CDE5-58EFB6506D4D}"/>
+              </a:ext>
+            </a:extLst>
+          </p:cNvPr>
+          <p:cNvSpPr txBox="1"/>
+          <p:nvPr/>
+        </p:nvSpPr>
+        <p:spPr>
+          <a:xfrm>
+            <a:off x="1056175" y="1932168"/>
+            <a:ext cx="1762899" cy="430887"/>
+          </a:xfrm>
+          <a:prstGeom prst="rect">
+            <a:avLst/>
+          </a:prstGeom>
+          <a:noFill/>
+        </p:spPr>
+        <p:txBody>
+          <a:bodyPr wrap="square" rtlCol="0">
+            <a:spAutoFit/>
+          </a:bodyPr>
+          <a:lstStyle/>
+          <a:p>
+            <a:pPr algn="ctr"/>
+            <a:r>
+              <a:rPr lang="pt-PT" sz="2200" b="1" noProof="1">
+                <a:solidFill>
+                  <a:srgbClr val="002060"/>
+                </a:solidFill>
+              </a:rPr>
+              <a:t>Functional</a:t>
+            </a:r>
+          </a:p>
+        </p:txBody>
+      </p:sp>
+      <p:sp>
+        <p:nvSpPr>
+          <p:cNvPr id="7" name="TextBox 6">
+            <a:extLst>
+              <a:ext uri="{FF2B5EF4-FFF2-40B4-BE49-F238E27FC236}">
+                <a16:creationId xmlns:a16="http://schemas.microsoft.com/office/drawing/2014/main" id="{0A7CBF11-B5F6-F95A-E926-7A3107FA9818}"/>
+              </a:ext>
+            </a:extLst>
+          </p:cNvPr>
+          <p:cNvSpPr txBox="1"/>
+          <p:nvPr/>
+        </p:nvSpPr>
+        <p:spPr>
+          <a:xfrm>
+            <a:off x="4112480" y="1597539"/>
+            <a:ext cx="4296551" cy="3785652"/>
+          </a:xfrm>
+          <a:prstGeom prst="rect">
+            <a:avLst/>
+          </a:prstGeom>
+          <a:noFill/>
+        </p:spPr>
+        <p:txBody>
+          <a:bodyPr wrap="square" rtlCol="0">
+            <a:spAutoFit/>
+          </a:bodyPr>
+          <a:lstStyle/>
+          <a:p>
+            <a:r>
+              <a:rPr lang="en-US" sz="2000" dirty="0">
+                <a:solidFill>
+                  <a:srgbClr val="002060"/>
+                </a:solidFill>
+              </a:rPr>
+              <a:t>let </a:t>
+            </a:r>
+            <a:r>
+              <a:rPr lang="en-US" sz="2000" dirty="0" err="1">
+                <a:solidFill>
+                  <a:srgbClr val="002060"/>
+                </a:solidFill>
+              </a:rPr>
+              <a:t>fact_iter</a:t>
+            </a:r>
+            <a:r>
+              <a:rPr lang="en-US" sz="2000" dirty="0">
+                <a:solidFill>
+                  <a:srgbClr val="002060"/>
+                </a:solidFill>
+              </a:rPr>
+              <a:t> (n: int) : int =</a:t>
+            </a:r>
+          </a:p>
+          <a:p>
+            <a:r>
+              <a:rPr lang="en-US" sz="2000" dirty="0">
+                <a:solidFill>
+                  <a:srgbClr val="002060"/>
+                </a:solidFill>
+              </a:rPr>
+              <a:t>    if n &lt;= 1 then 1</a:t>
+            </a:r>
+          </a:p>
+          <a:p>
+            <a:r>
+              <a:rPr lang="en-US" sz="2000" dirty="0">
+                <a:solidFill>
+                  <a:srgbClr val="002060"/>
+                </a:solidFill>
+              </a:rPr>
+              <a:t>    else begin </a:t>
+            </a:r>
+          </a:p>
+          <a:p>
+            <a:r>
+              <a:rPr lang="en-US" sz="2000" dirty="0">
+                <a:solidFill>
+                  <a:srgbClr val="002060"/>
+                </a:solidFill>
+              </a:rPr>
+              <a:t>        let res = ref 1 in</a:t>
+            </a:r>
+          </a:p>
+          <a:p>
+            <a:r>
+              <a:rPr lang="en-US" sz="2000" dirty="0">
+                <a:solidFill>
+                  <a:srgbClr val="002060"/>
+                </a:solidFill>
+              </a:rPr>
+              <a:t>        for </a:t>
+            </a:r>
+            <a:r>
+              <a:rPr lang="en-US" sz="2000" dirty="0" err="1">
+                <a:solidFill>
+                  <a:srgbClr val="002060"/>
+                </a:solidFill>
+              </a:rPr>
+              <a:t>i</a:t>
+            </a:r>
+            <a:r>
+              <a:rPr lang="en-US" sz="2000" dirty="0">
+                <a:solidFill>
+                  <a:srgbClr val="002060"/>
+                </a:solidFill>
+              </a:rPr>
+              <a:t> = 2 to n do</a:t>
+            </a:r>
+          </a:p>
+          <a:p>
+            <a:r>
+              <a:rPr lang="en-US" sz="2000" dirty="0">
+                <a:solidFill>
+                  <a:srgbClr val="002060"/>
+                </a:solidFill>
+              </a:rPr>
+              <a:t>          (*@ invariant !res = fact (i-1) *)</a:t>
+            </a:r>
+          </a:p>
+          <a:p>
+            <a:r>
+              <a:rPr lang="en-US" sz="2000" dirty="0">
+                <a:solidFill>
+                  <a:srgbClr val="002060"/>
+                </a:solidFill>
+              </a:rPr>
+              <a:t>          res := !res * </a:t>
+            </a:r>
+            <a:r>
+              <a:rPr lang="en-US" sz="2000" dirty="0" err="1">
+                <a:solidFill>
+                  <a:srgbClr val="002060"/>
+                </a:solidFill>
+              </a:rPr>
+              <a:t>i</a:t>
+            </a:r>
+            <a:endParaRPr lang="en-US" sz="2000" dirty="0">
+              <a:solidFill>
+                <a:srgbClr val="002060"/>
+              </a:solidFill>
+            </a:endParaRPr>
+          </a:p>
+          <a:p>
+            <a:r>
+              <a:rPr lang="en-US" sz="2000" dirty="0">
+                <a:solidFill>
+                  <a:srgbClr val="002060"/>
+                </a:solidFill>
+              </a:rPr>
+              <a:t>        done;</a:t>
+            </a:r>
+          </a:p>
+          <a:p>
+            <a:r>
+              <a:rPr lang="en-US" sz="2000" dirty="0">
+                <a:solidFill>
+                  <a:srgbClr val="002060"/>
+                </a:solidFill>
+              </a:rPr>
+              <a:t>        !res end</a:t>
+            </a:r>
+          </a:p>
+          <a:p>
+            <a:r>
+              <a:rPr lang="en-US" sz="2000" dirty="0">
+                <a:solidFill>
+                  <a:srgbClr val="002060"/>
+                </a:solidFill>
+              </a:rPr>
+              <a:t>  (*@ result = </a:t>
+            </a:r>
+            <a:r>
+              <a:rPr lang="en-US" sz="2000" dirty="0" err="1">
+                <a:solidFill>
+                  <a:srgbClr val="002060"/>
+                </a:solidFill>
+              </a:rPr>
+              <a:t>fact_iter</a:t>
+            </a:r>
+            <a:r>
+              <a:rPr lang="en-US" sz="2000" dirty="0">
+                <a:solidFill>
+                  <a:srgbClr val="002060"/>
+                </a:solidFill>
+              </a:rPr>
+              <a:t> n</a:t>
+            </a:r>
+          </a:p>
+          <a:p>
+            <a:r>
+              <a:rPr lang="en-US" sz="2000" dirty="0">
+                <a:solidFill>
+                  <a:srgbClr val="002060"/>
+                </a:solidFill>
+              </a:rPr>
+              <a:t>    requires n &gt;= 0 </a:t>
+            </a:r>
+          </a:p>
+          <a:p>
+            <a:r>
+              <a:rPr lang="en-US" sz="2000" dirty="0">
+                <a:solidFill>
+                  <a:srgbClr val="002060"/>
+                </a:solidFill>
+              </a:rPr>
+              <a:t>    ensures result = fact n *)</a:t>
+            </a:r>
+            <a:endParaRPr lang="en-US" sz="2000" dirty="0"/>
+          </a:p>
+        </p:txBody>
+      </p:sp>
+      <p:sp>
+        <p:nvSpPr>
+          <p:cNvPr id="8" name="TextBox 7">
+            <a:extLst>
+              <a:ext uri="{FF2B5EF4-FFF2-40B4-BE49-F238E27FC236}">
+                <a16:creationId xmlns:a16="http://schemas.microsoft.com/office/drawing/2014/main" id="{9D01534C-AA84-24D3-3A83-A31FBA2EE35A}"/>
+              </a:ext>
+            </a:extLst>
+          </p:cNvPr>
+          <p:cNvSpPr txBox="1"/>
+          <p:nvPr/>
+        </p:nvSpPr>
+        <p:spPr>
+          <a:xfrm>
+            <a:off x="6699291" y="2248330"/>
+            <a:ext cx="1762899" cy="430887"/>
+          </a:xfrm>
+          <a:prstGeom prst="rect">
+            <a:avLst/>
+          </a:prstGeom>
+          <a:noFill/>
+        </p:spPr>
+        <p:txBody>
+          <a:bodyPr wrap="square" rtlCol="0">
+            <a:spAutoFit/>
+          </a:bodyPr>
+          <a:lstStyle/>
+          <a:p>
+            <a:pPr algn="ctr"/>
+            <a:r>
+              <a:rPr lang="pt-PT" sz="2200" b="1" noProof="1">
+                <a:solidFill>
+                  <a:srgbClr val="002060"/>
+                </a:solidFill>
+              </a:rPr>
+              <a:t>Imperative</a:t>
+            </a:r>
           </a:p>
         </p:txBody>
       </p:sp>
@@ -6248,7 +6844,7 @@
 </p:sld>
 </file>
 
-<file path=ppt/slides/slide23.xml><?xml version="1.0" encoding="utf-8"?>
+<file path=ppt/slides/slide24.xml><?xml version="1.0" encoding="utf-8"?>
 <p:sld xmlns:a="http://schemas.openxmlformats.org/drawingml/2006/main" xmlns:r="http://schemas.openxmlformats.org/officeDocument/2006/relationships" xmlns:p="http://schemas.openxmlformats.org/presentationml/2006/main">
   <p:cSld>
     <p:bg>
@@ -6342,9 +6938,479 @@
           <a:p>
             <a:fld id="{292A9FD8-515A-4698-9313-0AB17EE9632B}" type="slidenum">
               <a:rPr lang="pt-PT" noProof="1" smtClean="0"/>
-              <a:t>23</a:t>
+              <a:t>24</a:t>
             </a:fld>
             <a:endParaRPr lang="pt-PT" noProof="1"/>
+          </a:p>
+        </p:txBody>
+      </p:sp>
+      <p:sp>
+        <p:nvSpPr>
+          <p:cNvPr id="4" name="TextBox 3">
+            <a:extLst>
+              <a:ext uri="{FF2B5EF4-FFF2-40B4-BE49-F238E27FC236}">
+                <a16:creationId xmlns:a16="http://schemas.microsoft.com/office/drawing/2014/main" id="{337D949A-38E4-6435-CD39-34D6E452C940}"/>
+              </a:ext>
+            </a:extLst>
+          </p:cNvPr>
+          <p:cNvSpPr txBox="1"/>
+          <p:nvPr/>
+        </p:nvSpPr>
+        <p:spPr>
+          <a:xfrm>
+            <a:off x="469556" y="1971219"/>
+            <a:ext cx="2181226" cy="2246769"/>
+          </a:xfrm>
+          <a:prstGeom prst="rect">
+            <a:avLst/>
+          </a:prstGeom>
+          <a:noFill/>
+        </p:spPr>
+        <p:txBody>
+          <a:bodyPr wrap="square" rtlCol="0">
+            <a:spAutoFit/>
+          </a:bodyPr>
+          <a:lstStyle/>
+          <a:p>
+            <a:r>
+              <a:rPr lang="nn-NO" sz="2000" dirty="0">
+                <a:solidFill>
+                  <a:srgbClr val="002060"/>
+                </a:solidFill>
+              </a:rPr>
+              <a:t>val ref x : int</a:t>
+            </a:r>
+          </a:p>
+          <a:p>
+            <a:r>
+              <a:rPr lang="nn-NO" sz="2000" dirty="0">
+                <a:solidFill>
+                  <a:srgbClr val="002060"/>
+                </a:solidFill>
+              </a:rPr>
+              <a:t>val ref y : int</a:t>
+            </a:r>
+          </a:p>
+          <a:p>
+            <a:r>
+              <a:rPr lang="nn-NO" sz="2000" dirty="0">
+                <a:solidFill>
+                  <a:srgbClr val="002060"/>
+                </a:solidFill>
+              </a:rPr>
+              <a:t>val ref z : int</a:t>
+            </a:r>
+          </a:p>
+          <a:p>
+            <a:endParaRPr lang="nn-NO" sz="2000" dirty="0">
+              <a:solidFill>
+                <a:srgbClr val="002060"/>
+              </a:solidFill>
+            </a:endParaRPr>
+          </a:p>
+          <a:p>
+            <a:r>
+              <a:rPr lang="nn-NO" sz="2000" dirty="0">
+                <a:solidFill>
+                  <a:srgbClr val="002060"/>
+                </a:solidFill>
+              </a:rPr>
+              <a:t>let original () =</a:t>
+            </a:r>
+          </a:p>
+          <a:p>
+            <a:r>
+              <a:rPr lang="nn-NO" sz="2000" dirty="0">
+                <a:solidFill>
+                  <a:srgbClr val="002060"/>
+                </a:solidFill>
+              </a:rPr>
+              <a:t>    y &lt;- x + 1; </a:t>
+            </a:r>
+          </a:p>
+          <a:p>
+            <a:r>
+              <a:rPr lang="nn-NO" sz="2000" dirty="0">
+                <a:solidFill>
+                  <a:srgbClr val="002060"/>
+                </a:solidFill>
+              </a:rPr>
+              <a:t>    z &lt;- y + 1;</a:t>
+            </a:r>
+            <a:endParaRPr lang="en-US" dirty="0"/>
+          </a:p>
+        </p:txBody>
+      </p:sp>
+      <p:sp>
+        <p:nvSpPr>
+          <p:cNvPr id="5" name="TextBox 4">
+            <a:extLst>
+              <a:ext uri="{FF2B5EF4-FFF2-40B4-BE49-F238E27FC236}">
+                <a16:creationId xmlns:a16="http://schemas.microsoft.com/office/drawing/2014/main" id="{42D647A4-9760-5FD9-452D-5BE8515A49FF}"/>
+              </a:ext>
+            </a:extLst>
+          </p:cNvPr>
+          <p:cNvSpPr txBox="1"/>
+          <p:nvPr/>
+        </p:nvSpPr>
+        <p:spPr>
+          <a:xfrm>
+            <a:off x="469556" y="1409004"/>
+            <a:ext cx="1762899" cy="430887"/>
+          </a:xfrm>
+          <a:prstGeom prst="rect">
+            <a:avLst/>
+          </a:prstGeom>
+          <a:noFill/>
+        </p:spPr>
+        <p:txBody>
+          <a:bodyPr wrap="square" rtlCol="0">
+            <a:spAutoFit/>
+          </a:bodyPr>
+          <a:lstStyle/>
+          <a:p>
+            <a:pPr algn="ctr"/>
+            <a:r>
+              <a:rPr lang="pt-PT" sz="2200" b="1" noProof="1">
+                <a:solidFill>
+                  <a:srgbClr val="002060"/>
+                </a:solidFill>
+              </a:rPr>
+              <a:t>Original</a:t>
+            </a:r>
+          </a:p>
+        </p:txBody>
+      </p:sp>
+      <p:sp>
+        <p:nvSpPr>
+          <p:cNvPr id="6" name="TextBox 5">
+            <a:extLst>
+              <a:ext uri="{FF2B5EF4-FFF2-40B4-BE49-F238E27FC236}">
+                <a16:creationId xmlns:a16="http://schemas.microsoft.com/office/drawing/2014/main" id="{C1BE2CDF-15DB-17AA-BDEC-6B0FDC33B650}"/>
+              </a:ext>
+            </a:extLst>
+          </p:cNvPr>
+          <p:cNvSpPr txBox="1"/>
+          <p:nvPr/>
+        </p:nvSpPr>
+        <p:spPr>
+          <a:xfrm>
+            <a:off x="3055045" y="1971218"/>
+            <a:ext cx="2443101" cy="2246769"/>
+          </a:xfrm>
+          <a:prstGeom prst="rect">
+            <a:avLst/>
+          </a:prstGeom>
+          <a:noFill/>
+        </p:spPr>
+        <p:txBody>
+          <a:bodyPr wrap="square" rtlCol="0">
+            <a:spAutoFit/>
+          </a:bodyPr>
+          <a:lstStyle/>
+          <a:p>
+            <a:r>
+              <a:rPr lang="nn-NO" sz="2000" dirty="0">
+                <a:solidFill>
+                  <a:srgbClr val="002060"/>
+                </a:solidFill>
+              </a:rPr>
+              <a:t>val ref x : int</a:t>
+            </a:r>
+          </a:p>
+          <a:p>
+            <a:r>
+              <a:rPr lang="nn-NO" sz="2000" dirty="0">
+                <a:solidFill>
+                  <a:srgbClr val="002060"/>
+                </a:solidFill>
+              </a:rPr>
+              <a:t>val ref y : int</a:t>
+            </a:r>
+          </a:p>
+          <a:p>
+            <a:r>
+              <a:rPr lang="nn-NO" sz="2000" dirty="0">
+                <a:solidFill>
+                  <a:srgbClr val="002060"/>
+                </a:solidFill>
+              </a:rPr>
+              <a:t>val ref z : int</a:t>
+            </a:r>
+          </a:p>
+          <a:p>
+            <a:endParaRPr lang="nn-NO" sz="2000" dirty="0">
+              <a:solidFill>
+                <a:srgbClr val="002060"/>
+              </a:solidFill>
+            </a:endParaRPr>
+          </a:p>
+          <a:p>
+            <a:r>
+              <a:rPr lang="nn-NO" sz="2000" dirty="0">
+                <a:solidFill>
+                  <a:srgbClr val="002060"/>
+                </a:solidFill>
+              </a:rPr>
+              <a:t>let transformed () =</a:t>
+            </a:r>
+          </a:p>
+          <a:p>
+            <a:r>
+              <a:rPr lang="nn-NO" sz="2000" dirty="0">
+                <a:solidFill>
+                  <a:srgbClr val="002060"/>
+                </a:solidFill>
+              </a:rPr>
+              <a:t>    z &lt;- x + 2; </a:t>
+            </a:r>
+          </a:p>
+          <a:p>
+            <a:r>
+              <a:rPr lang="nn-NO" sz="2000" dirty="0">
+                <a:solidFill>
+                  <a:srgbClr val="002060"/>
+                </a:solidFill>
+              </a:rPr>
+              <a:t>    y &lt;- z - 1;</a:t>
+            </a:r>
+            <a:endParaRPr lang="en-US" sz="2000" dirty="0"/>
+          </a:p>
+        </p:txBody>
+      </p:sp>
+      <p:sp>
+        <p:nvSpPr>
+          <p:cNvPr id="7" name="TextBox 6">
+            <a:extLst>
+              <a:ext uri="{FF2B5EF4-FFF2-40B4-BE49-F238E27FC236}">
+                <a16:creationId xmlns:a16="http://schemas.microsoft.com/office/drawing/2014/main" id="{AAEAFED1-B1C3-074F-FABF-01CC640A4942}"/>
+              </a:ext>
+            </a:extLst>
+          </p:cNvPr>
+          <p:cNvSpPr txBox="1"/>
+          <p:nvPr/>
+        </p:nvSpPr>
+        <p:spPr>
+          <a:xfrm>
+            <a:off x="3152706" y="1406265"/>
+            <a:ext cx="1850047" cy="430887"/>
+          </a:xfrm>
+          <a:prstGeom prst="rect">
+            <a:avLst/>
+          </a:prstGeom>
+          <a:noFill/>
+        </p:spPr>
+        <p:txBody>
+          <a:bodyPr wrap="square" rtlCol="0">
+            <a:spAutoFit/>
+          </a:bodyPr>
+          <a:lstStyle/>
+          <a:p>
+            <a:pPr algn="ctr"/>
+            <a:r>
+              <a:rPr lang="pt-PT" sz="2200" b="1" noProof="1">
+                <a:solidFill>
+                  <a:srgbClr val="002060"/>
+                </a:solidFill>
+              </a:rPr>
+              <a:t>Transformed</a:t>
+            </a:r>
+          </a:p>
+        </p:txBody>
+      </p:sp>
+      <p:sp>
+        <p:nvSpPr>
+          <p:cNvPr id="8" name="TextBox 7">
+            <a:extLst>
+              <a:ext uri="{FF2B5EF4-FFF2-40B4-BE49-F238E27FC236}">
+                <a16:creationId xmlns:a16="http://schemas.microsoft.com/office/drawing/2014/main" id="{7CE8A61B-3F7F-A926-EB4E-C7E2EF324B04}"/>
+              </a:ext>
+            </a:extLst>
+          </p:cNvPr>
+          <p:cNvSpPr txBox="1"/>
+          <p:nvPr/>
+        </p:nvSpPr>
+        <p:spPr>
+          <a:xfrm>
+            <a:off x="5848864" y="1971218"/>
+            <a:ext cx="2825580" cy="3477875"/>
+          </a:xfrm>
+          <a:prstGeom prst="rect">
+            <a:avLst/>
+          </a:prstGeom>
+          <a:noFill/>
+        </p:spPr>
+        <p:txBody>
+          <a:bodyPr wrap="square" rtlCol="0">
+            <a:spAutoFit/>
+          </a:bodyPr>
+          <a:lstStyle/>
+          <a:p>
+            <a:r>
+              <a:rPr lang="en-US" sz="2000" dirty="0" err="1">
+                <a:solidFill>
+                  <a:srgbClr val="002060"/>
+                </a:solidFill>
+              </a:rPr>
+              <a:t>val</a:t>
+            </a:r>
+            <a:r>
+              <a:rPr lang="en-US" sz="2000" dirty="0">
+                <a:solidFill>
+                  <a:srgbClr val="002060"/>
+                </a:solidFill>
+              </a:rPr>
+              <a:t> ref x1, y1, z1 : int</a:t>
+            </a:r>
+          </a:p>
+          <a:p>
+            <a:r>
+              <a:rPr lang="en-US" sz="2000" dirty="0" err="1">
+                <a:solidFill>
+                  <a:srgbClr val="002060"/>
+                </a:solidFill>
+              </a:rPr>
+              <a:t>val</a:t>
+            </a:r>
+            <a:r>
+              <a:rPr lang="en-US" sz="2000" dirty="0">
+                <a:solidFill>
+                  <a:srgbClr val="002060"/>
+                </a:solidFill>
+              </a:rPr>
+              <a:t> ref x2, y2, z2 : int</a:t>
+            </a:r>
+          </a:p>
+          <a:p>
+            <a:r>
+              <a:rPr lang="en-US" sz="2000" dirty="0">
+                <a:solidFill>
+                  <a:srgbClr val="002060"/>
+                </a:solidFill>
+              </a:rPr>
+              <a:t>      </a:t>
+            </a:r>
+          </a:p>
+          <a:p>
+            <a:r>
+              <a:rPr lang="en-US" sz="2000" dirty="0">
+                <a:solidFill>
+                  <a:srgbClr val="002060"/>
+                </a:solidFill>
+              </a:rPr>
+              <a:t>let product ()</a:t>
+            </a:r>
+          </a:p>
+          <a:p>
+            <a:r>
+              <a:rPr lang="en-US" sz="2000" dirty="0">
+                <a:solidFill>
+                  <a:srgbClr val="002060"/>
+                </a:solidFill>
+              </a:rPr>
+              <a:t>    requires { x1 = x2 }</a:t>
+            </a:r>
+          </a:p>
+          <a:p>
+            <a:r>
+              <a:rPr lang="en-US" sz="2000" dirty="0">
+                <a:solidFill>
+                  <a:srgbClr val="002060"/>
+                </a:solidFill>
+              </a:rPr>
+              <a:t>    ensures { y1 = y2 }</a:t>
+            </a:r>
+          </a:p>
+          <a:p>
+            <a:r>
+              <a:rPr lang="en-US" sz="2000" dirty="0">
+                <a:solidFill>
+                  <a:srgbClr val="002060"/>
+                </a:solidFill>
+              </a:rPr>
+              <a:t>    ensures { z1 = z2 } =</a:t>
+            </a:r>
+          </a:p>
+          <a:p>
+            <a:r>
+              <a:rPr lang="en-US" sz="2000" dirty="0">
+                <a:solidFill>
+                  <a:srgbClr val="002060"/>
+                </a:solidFill>
+              </a:rPr>
+              <a:t>          y1 &lt;- x1 + 1; </a:t>
+            </a:r>
+          </a:p>
+          <a:p>
+            <a:r>
+              <a:rPr lang="en-US" sz="2000" dirty="0">
+                <a:solidFill>
+                  <a:srgbClr val="002060"/>
+                </a:solidFill>
+              </a:rPr>
+              <a:t>          z2 &lt;- x2 + 2;</a:t>
+            </a:r>
+          </a:p>
+          <a:p>
+            <a:r>
+              <a:rPr lang="en-US" sz="2000" dirty="0">
+                <a:solidFill>
+                  <a:srgbClr val="002060"/>
+                </a:solidFill>
+              </a:rPr>
+              <a:t>          z1 &lt;- y1 + 1;</a:t>
+            </a:r>
+          </a:p>
+          <a:p>
+            <a:r>
+              <a:rPr lang="en-US" sz="2000" dirty="0">
+                <a:solidFill>
+                  <a:srgbClr val="002060"/>
+                </a:solidFill>
+              </a:rPr>
+              <a:t>          y2 &lt;- z2 - 1;</a:t>
+            </a:r>
+            <a:endParaRPr lang="en-US" dirty="0"/>
+          </a:p>
+        </p:txBody>
+      </p:sp>
+      <p:sp>
+        <p:nvSpPr>
+          <p:cNvPr id="9" name="TextBox 8">
+            <a:extLst>
+              <a:ext uri="{FF2B5EF4-FFF2-40B4-BE49-F238E27FC236}">
+                <a16:creationId xmlns:a16="http://schemas.microsoft.com/office/drawing/2014/main" id="{0693B13C-A56F-280A-96AA-2FC544F3C61E}"/>
+              </a:ext>
+            </a:extLst>
+          </p:cNvPr>
+          <p:cNvSpPr txBox="1"/>
+          <p:nvPr/>
+        </p:nvSpPr>
+        <p:spPr>
+          <a:xfrm>
+            <a:off x="5923004" y="1406264"/>
+            <a:ext cx="2387891" cy="430887"/>
+          </a:xfrm>
+          <a:prstGeom prst="rect">
+            <a:avLst/>
+          </a:prstGeom>
+          <a:noFill/>
+        </p:spPr>
+        <p:txBody>
+          <a:bodyPr wrap="square" rtlCol="0">
+            <a:spAutoFit/>
+          </a:bodyPr>
+          <a:lstStyle/>
+          <a:p>
+            <a:pPr algn="ctr"/>
+            <a:r>
+              <a:rPr lang="pt-PT" sz="2200" b="1" noProof="1">
+                <a:solidFill>
+                  <a:srgbClr val="002060"/>
+                </a:solidFill>
+              </a:rPr>
+              <a:t>Product Program</a:t>
+            </a:r>
           </a:p>
         </p:txBody>
       </p:sp>
@@ -6361,7 +7427,7 @@
 </p:sld>
 </file>
 
-<file path=ppt/slides/slide24.xml><?xml version="1.0" encoding="utf-8"?>
+<file path=ppt/slides/slide25.xml><?xml version="1.0" encoding="utf-8"?>
 <p:sld xmlns:a="http://schemas.openxmlformats.org/drawingml/2006/main" xmlns:r="http://schemas.openxmlformats.org/officeDocument/2006/relationships" xmlns:p="http://schemas.openxmlformats.org/presentationml/2006/main">
   <p:cSld>
     <p:bg>
@@ -6456,7 +7522,7 @@
           <a:p>
             <a:fld id="{292A9FD8-515A-4698-9313-0AB17EE9632B}" type="slidenum">
               <a:rPr lang="pt-PT" noProof="1" smtClean="0"/>
-              <a:t>24</a:t>
+              <a:t>25</a:t>
             </a:fld>
             <a:endParaRPr lang="pt-PT" noProof="1"/>
           </a:p>
@@ -6475,7 +7541,7 @@
 </p:sld>
 </file>
 
-<file path=ppt/slides/slide25.xml><?xml version="1.0" encoding="utf-8"?>
+<file path=ppt/slides/slide26.xml><?xml version="1.0" encoding="utf-8"?>
 <p:sld xmlns:a="http://schemas.openxmlformats.org/drawingml/2006/main" xmlns:r="http://schemas.openxmlformats.org/officeDocument/2006/relationships" xmlns:p="http://schemas.openxmlformats.org/presentationml/2006/main">
   <p:cSld>
     <p:bg>
@@ -6718,7 +7784,7 @@
           <a:p>
             <a:fld id="{292A9FD8-515A-4698-9313-0AB17EE9632B}" type="slidenum">
               <a:rPr lang="pt-PT" noProof="1" smtClean="0"/>
-              <a:t>25</a:t>
+              <a:t>26</a:t>
             </a:fld>
             <a:endParaRPr lang="pt-PT" noProof="1"/>
           </a:p>
@@ -7687,7 +8753,7 @@
             <a:r>
               <a:rPr lang="pt-PT" sz="2400" noProof="1">
                 <a:solidFill>
-                  <a:srgbClr val="002060"/>
+                  <a:srgbClr val="00B050"/>
                 </a:solidFill>
               </a:rPr>
               <a:t>Hoare Logic</a:t>
@@ -7726,7 +8792,7 @@
             <a:r>
               <a:rPr lang="pt-PT" sz="2400" noProof="1">
                 <a:solidFill>
-                  <a:srgbClr val="002060"/>
+                  <a:srgbClr val="7030A0"/>
                 </a:solidFill>
               </a:rPr>
               <a:t>Cameleer</a:t>
@@ -7765,7 +8831,7 @@
             <a:r>
               <a:rPr lang="pt-PT" sz="2400" noProof="1">
                 <a:solidFill>
-                  <a:srgbClr val="002060"/>
+                  <a:srgbClr val="C00000"/>
                 </a:solidFill>
               </a:rPr>
               <a:t>GOSPEL</a:t>
@@ -7787,7 +8853,7 @@
         </p:nvSpPr>
         <p:spPr>
           <a:xfrm>
-            <a:off x="4571999" y="624012"/>
+            <a:off x="4639652" y="724141"/>
             <a:ext cx="3176126" cy="461665"/>
           </a:xfrm>
           <a:prstGeom prst="rect">
@@ -7804,7 +8870,7 @@
             <a:r>
               <a:rPr lang="pt-PT" sz="2400" noProof="1">
                 <a:solidFill>
-                  <a:srgbClr val="002060"/>
+                  <a:srgbClr val="00B050"/>
                 </a:solidFill>
               </a:rPr>
               <a:t>Relational Hoare Logic</a:t>
@@ -7843,7 +8909,7 @@
             <a:r>
               <a:rPr lang="pt-PT" sz="2400" noProof="1">
                 <a:solidFill>
-                  <a:srgbClr val="002060"/>
+                  <a:srgbClr val="C00000"/>
                 </a:solidFill>
               </a:rPr>
               <a:t>OCaml</a:t>
@@ -7882,7 +8948,7 @@
             <a:r>
               <a:rPr lang="pt-PT" sz="2400" noProof="1">
                 <a:solidFill>
-                  <a:srgbClr val="002060"/>
+                  <a:srgbClr val="7030A0"/>
                 </a:solidFill>
               </a:rPr>
               <a:t>Why3</a:t>
@@ -7904,7 +8970,7 @@
 </file>
 
 <file path=ppt/slides/slide8.xml><?xml version="1.0" encoding="utf-8"?>
-<p:sld xmlns:a="http://schemas.openxmlformats.org/drawingml/2006/main" xmlns:r="http://schemas.openxmlformats.org/officeDocument/2006/relationships" xmlns:p="http://schemas.openxmlformats.org/presentationml/2006/main" show="0">
+<p:sld xmlns:a="http://schemas.openxmlformats.org/drawingml/2006/main" xmlns:r="http://schemas.openxmlformats.org/officeDocument/2006/relationships" xmlns:p="http://schemas.openxmlformats.org/presentationml/2006/main">
   <p:cSld>
     <p:bg>
       <p:bgPr>
@@ -8402,7 +9468,7 @@
 </file>
 
 <file path=ppt/slides/slide9.xml><?xml version="1.0" encoding="utf-8"?>
-<p:sld xmlns:a="http://schemas.openxmlformats.org/drawingml/2006/main" xmlns:r="http://schemas.openxmlformats.org/officeDocument/2006/relationships" xmlns:p="http://schemas.openxmlformats.org/presentationml/2006/main" show="0">
+<p:sld xmlns:a="http://schemas.openxmlformats.org/drawingml/2006/main" xmlns:r="http://schemas.openxmlformats.org/officeDocument/2006/relationships" xmlns:p="http://schemas.openxmlformats.org/presentationml/2006/main">
   <p:cSld>
     <p:bg>
       <p:bgPr>
@@ -8466,7 +9532,7 @@
                   <a:srgbClr val="002060"/>
                 </a:solidFill>
               </a:rPr>
-              <a:t>Relational Hoare Logic (1/2)</a:t>
+              <a:t>Relational Hoare Logic</a:t>
             </a:r>
             <a:endParaRPr lang="pt-PT" sz="2800" noProof="1"/>
           </a:p>

</xml_diff>